<commit_message>
Nu med indlagte videoer
</commit_message>
<xml_diff>
--- a/Kicad Schematic.pptx
+++ b/Kicad Schematic.pptx
@@ -8,18 +8,27 @@
     <p:sldId id="256" r:id="rId2"/>
     <p:sldId id="257" r:id="rId3"/>
     <p:sldId id="258" r:id="rId4"/>
-    <p:sldId id="259" r:id="rId5"/>
-    <p:sldId id="260" r:id="rId6"/>
-    <p:sldId id="261" r:id="rId7"/>
-    <p:sldId id="262" r:id="rId8"/>
-    <p:sldId id="263" r:id="rId9"/>
-    <p:sldId id="264" r:id="rId10"/>
-    <p:sldId id="265" r:id="rId11"/>
-    <p:sldId id="266" r:id="rId12"/>
-    <p:sldId id="267" r:id="rId13"/>
-    <p:sldId id="268" r:id="rId14"/>
-    <p:sldId id="270" r:id="rId15"/>
-    <p:sldId id="269" r:id="rId16"/>
+    <p:sldId id="271" r:id="rId5"/>
+    <p:sldId id="259" r:id="rId6"/>
+    <p:sldId id="272" r:id="rId7"/>
+    <p:sldId id="260" r:id="rId8"/>
+    <p:sldId id="261" r:id="rId9"/>
+    <p:sldId id="262" r:id="rId10"/>
+    <p:sldId id="273" r:id="rId11"/>
+    <p:sldId id="263" r:id="rId12"/>
+    <p:sldId id="274" r:id="rId13"/>
+    <p:sldId id="264" r:id="rId14"/>
+    <p:sldId id="275" r:id="rId15"/>
+    <p:sldId id="265" r:id="rId16"/>
+    <p:sldId id="276" r:id="rId17"/>
+    <p:sldId id="266" r:id="rId18"/>
+    <p:sldId id="277" r:id="rId19"/>
+    <p:sldId id="267" r:id="rId20"/>
+    <p:sldId id="278" r:id="rId21"/>
+    <p:sldId id="268" r:id="rId22"/>
+    <p:sldId id="270" r:id="rId23"/>
+    <p:sldId id="279" r:id="rId24"/>
+    <p:sldId id="269" r:id="rId25"/>
   </p:sldIdLst>
   <p:sldSz cx="12192000" cy="6858000"/>
   <p:notesSz cx="6858000" cy="9144000"/>
@@ -176,7 +185,7 @@
           <a:noFill/>
           <a:extLst>
             <a:ext uri="{909E8E84-426E-40dd-AFC4-6F175D3DCCD1}">
-              <a14:hiddenFill xmlns="" xmlns:a14="http://schemas.microsoft.com/office/drawing/2010/main">
+              <a14:hiddenFill xmlns:a14="http://schemas.microsoft.com/office/drawing/2010/main" xmlns="">
                 <a:solidFill>
                   <a:srgbClr val="FFFFFF"/>
                 </a:solidFill>
@@ -236,7 +245,7 @@
             </a:ln>
             <a:extLst>
               <a:ext uri="{91240B29-F687-4f45-9708-019B960494DF}">
-                <a14:hiddenLine xmlns="" xmlns:a14="http://schemas.microsoft.com/office/drawing/2010/main" w="9525">
+                <a14:hiddenLine xmlns:a14="http://schemas.microsoft.com/office/drawing/2010/main" xmlns="" w="9525">
                   <a:solidFill>
                     <a:srgbClr val="000000"/>
                   </a:solidFill>
@@ -326,7 +335,7 @@
             </a:ln>
             <a:extLst>
               <a:ext uri="{91240B29-F687-4f45-9708-019B960494DF}">
-                <a14:hiddenLine xmlns="" xmlns:a14="http://schemas.microsoft.com/office/drawing/2010/main" w="9525">
+                <a14:hiddenLine xmlns:a14="http://schemas.microsoft.com/office/drawing/2010/main" xmlns="" w="9525">
                   <a:solidFill>
                     <a:srgbClr val="000000"/>
                   </a:solidFill>
@@ -416,7 +425,7 @@
             </a:ln>
             <a:extLst>
               <a:ext uri="{91240B29-F687-4f45-9708-019B960494DF}">
-                <a14:hiddenLine xmlns="" xmlns:a14="http://schemas.microsoft.com/office/drawing/2010/main" w="9525">
+                <a14:hiddenLine xmlns:a14="http://schemas.microsoft.com/office/drawing/2010/main" xmlns="" w="9525">
                   <a:solidFill>
                     <a:srgbClr val="000000"/>
                   </a:solidFill>
@@ -450,7 +459,7 @@
             </a:ln>
             <a:extLst>
               <a:ext uri="{91240B29-F687-4f45-9708-019B960494DF}">
-                <a14:hiddenLine xmlns="" xmlns:a14="http://schemas.microsoft.com/office/drawing/2010/main" w="9525">
+                <a14:hiddenLine xmlns:a14="http://schemas.microsoft.com/office/drawing/2010/main" xmlns="" w="9525">
                   <a:solidFill>
                     <a:srgbClr val="000000"/>
                   </a:solidFill>
@@ -540,7 +549,7 @@
             </a:ln>
             <a:extLst>
               <a:ext uri="{91240B29-F687-4f45-9708-019B960494DF}">
-                <a14:hiddenLine xmlns="" xmlns:a14="http://schemas.microsoft.com/office/drawing/2010/main" w="9525">
+                <a14:hiddenLine xmlns:a14="http://schemas.microsoft.com/office/drawing/2010/main" xmlns="" w="9525">
                   <a:solidFill>
                     <a:srgbClr val="000000"/>
                   </a:solidFill>
@@ -602,7 +611,7 @@
             </a:ln>
             <a:extLst>
               <a:ext uri="{91240B29-F687-4f45-9708-019B960494DF}">
-                <a14:hiddenLine xmlns="" xmlns:a14="http://schemas.microsoft.com/office/drawing/2010/main" w="9525">
+                <a14:hiddenLine xmlns:a14="http://schemas.microsoft.com/office/drawing/2010/main" xmlns="" w="9525">
                   <a:solidFill>
                     <a:srgbClr val="000000"/>
                   </a:solidFill>
@@ -664,7 +673,7 @@
             </a:ln>
             <a:extLst>
               <a:ext uri="{91240B29-F687-4f45-9708-019B960494DF}">
-                <a14:hiddenLine xmlns="" xmlns:a14="http://schemas.microsoft.com/office/drawing/2010/main" w="9525">
+                <a14:hiddenLine xmlns:a14="http://schemas.microsoft.com/office/drawing/2010/main" xmlns="" w="9525">
                   <a:solidFill>
                     <a:srgbClr val="000000"/>
                   </a:solidFill>
@@ -754,7 +763,7 @@
             </a:ln>
             <a:extLst>
               <a:ext uri="{91240B29-F687-4f45-9708-019B960494DF}">
-                <a14:hiddenLine xmlns="" xmlns:a14="http://schemas.microsoft.com/office/drawing/2010/main" w="9525">
+                <a14:hiddenLine xmlns:a14="http://schemas.microsoft.com/office/drawing/2010/main" xmlns="" w="9525">
                   <a:solidFill>
                     <a:srgbClr val="000000"/>
                   </a:solidFill>
@@ -816,7 +825,7 @@
             </a:ln>
             <a:extLst>
               <a:ext uri="{91240B29-F687-4f45-9708-019B960494DF}">
-                <a14:hiddenLine xmlns="" xmlns:a14="http://schemas.microsoft.com/office/drawing/2010/main" w="9525">
+                <a14:hiddenLine xmlns:a14="http://schemas.microsoft.com/office/drawing/2010/main" xmlns="" w="9525">
                   <a:solidFill>
                     <a:srgbClr val="000000"/>
                   </a:solidFill>
@@ -878,7 +887,7 @@
             </a:ln>
             <a:extLst>
               <a:ext uri="{91240B29-F687-4f45-9708-019B960494DF}">
-                <a14:hiddenLine xmlns="" xmlns:a14="http://schemas.microsoft.com/office/drawing/2010/main" w="9525">
+                <a14:hiddenLine xmlns:a14="http://schemas.microsoft.com/office/drawing/2010/main" xmlns="" w="9525">
                   <a:solidFill>
                     <a:srgbClr val="000000"/>
                   </a:solidFill>
@@ -968,7 +977,7 @@
             </a:ln>
             <a:extLst>
               <a:ext uri="{91240B29-F687-4f45-9708-019B960494DF}">
-                <a14:hiddenLine xmlns="" xmlns:a14="http://schemas.microsoft.com/office/drawing/2010/main" w="9525">
+                <a14:hiddenLine xmlns:a14="http://schemas.microsoft.com/office/drawing/2010/main" xmlns="" w="9525">
                   <a:solidFill>
                     <a:srgbClr val="000000"/>
                   </a:solidFill>
@@ -1058,7 +1067,7 @@
             </a:ln>
             <a:extLst>
               <a:ext uri="{91240B29-F687-4f45-9708-019B960494DF}">
-                <a14:hiddenLine xmlns="" xmlns:a14="http://schemas.microsoft.com/office/drawing/2010/main" w="9525">
+                <a14:hiddenLine xmlns:a14="http://schemas.microsoft.com/office/drawing/2010/main" xmlns="" w="9525">
                   <a:solidFill>
                     <a:srgbClr val="000000"/>
                   </a:solidFill>
@@ -1120,7 +1129,7 @@
             </a:ln>
             <a:extLst>
               <a:ext uri="{91240B29-F687-4f45-9708-019B960494DF}">
-                <a14:hiddenLine xmlns="" xmlns:a14="http://schemas.microsoft.com/office/drawing/2010/main" w="9525">
+                <a14:hiddenLine xmlns:a14="http://schemas.microsoft.com/office/drawing/2010/main" xmlns="" w="9525">
                   <a:solidFill>
                     <a:srgbClr val="000000"/>
                   </a:solidFill>
@@ -1230,7 +1239,7 @@
             </a:ln>
             <a:extLst>
               <a:ext uri="{91240B29-F687-4f45-9708-019B960494DF}">
-                <a14:hiddenLine xmlns="" xmlns:a14="http://schemas.microsoft.com/office/drawing/2010/main" w="9525">
+                <a14:hiddenLine xmlns:a14="http://schemas.microsoft.com/office/drawing/2010/main" xmlns="" w="9525">
                   <a:solidFill>
                     <a:srgbClr val="000000"/>
                   </a:solidFill>
@@ -1292,7 +1301,7 @@
             </a:ln>
             <a:extLst>
               <a:ext uri="{91240B29-F687-4f45-9708-019B960494DF}">
-                <a14:hiddenLine xmlns="" xmlns:a14="http://schemas.microsoft.com/office/drawing/2010/main" w="9525">
+                <a14:hiddenLine xmlns:a14="http://schemas.microsoft.com/office/drawing/2010/main" xmlns="" w="9525">
                   <a:solidFill>
                     <a:srgbClr val="000000"/>
                   </a:solidFill>
@@ -1382,7 +1391,7 @@
             </a:ln>
             <a:extLst>
               <a:ext uri="{91240B29-F687-4f45-9708-019B960494DF}">
-                <a14:hiddenLine xmlns="" xmlns:a14="http://schemas.microsoft.com/office/drawing/2010/main" w="9525">
+                <a14:hiddenLine xmlns:a14="http://schemas.microsoft.com/office/drawing/2010/main" xmlns="" w="9525">
                   <a:solidFill>
                     <a:srgbClr val="000000"/>
                   </a:solidFill>
@@ -1472,7 +1481,7 @@
             </a:ln>
             <a:extLst>
               <a:ext uri="{91240B29-F687-4f45-9708-019B960494DF}">
-                <a14:hiddenLine xmlns="" xmlns:a14="http://schemas.microsoft.com/office/drawing/2010/main" w="9525">
+                <a14:hiddenLine xmlns:a14="http://schemas.microsoft.com/office/drawing/2010/main" xmlns="" w="9525">
                   <a:solidFill>
                     <a:srgbClr val="000000"/>
                   </a:solidFill>
@@ -1534,7 +1543,7 @@
             </a:ln>
             <a:extLst>
               <a:ext uri="{91240B29-F687-4f45-9708-019B960494DF}">
-                <a14:hiddenLine xmlns="" xmlns:a14="http://schemas.microsoft.com/office/drawing/2010/main" w="9525">
+                <a14:hiddenLine xmlns:a14="http://schemas.microsoft.com/office/drawing/2010/main" xmlns="" w="9525">
                   <a:solidFill>
                     <a:srgbClr val="000000"/>
                   </a:solidFill>
@@ -1624,7 +1633,7 @@
             </a:ln>
             <a:extLst>
               <a:ext uri="{91240B29-F687-4f45-9708-019B960494DF}">
-                <a14:hiddenLine xmlns="" xmlns:a14="http://schemas.microsoft.com/office/drawing/2010/main" w="9525">
+                <a14:hiddenLine xmlns:a14="http://schemas.microsoft.com/office/drawing/2010/main" xmlns="" w="9525">
                   <a:solidFill>
                     <a:srgbClr val="000000"/>
                   </a:solidFill>
@@ -1714,7 +1723,7 @@
             </a:ln>
             <a:extLst>
               <a:ext uri="{91240B29-F687-4f45-9708-019B960494DF}">
-                <a14:hiddenLine xmlns="" xmlns:a14="http://schemas.microsoft.com/office/drawing/2010/main" w="9525">
+                <a14:hiddenLine xmlns:a14="http://schemas.microsoft.com/office/drawing/2010/main" xmlns="" w="9525">
                   <a:solidFill>
                     <a:srgbClr val="000000"/>
                   </a:solidFill>
@@ -1770,7 +1779,7 @@
             </a:ln>
             <a:extLst>
               <a:ext uri="{91240B29-F687-4f45-9708-019B960494DF}">
-                <a14:hiddenLine xmlns="" xmlns:a14="http://schemas.microsoft.com/office/drawing/2010/main" w="9525">
+                <a14:hiddenLine xmlns:a14="http://schemas.microsoft.com/office/drawing/2010/main" xmlns="" w="9525">
                   <a:solidFill>
                     <a:srgbClr val="000000"/>
                   </a:solidFill>
@@ -1860,7 +1869,7 @@
             </a:ln>
             <a:extLst>
               <a:ext uri="{91240B29-F687-4f45-9708-019B960494DF}">
-                <a14:hiddenLine xmlns="" xmlns:a14="http://schemas.microsoft.com/office/drawing/2010/main" w="9525">
+                <a14:hiddenLine xmlns:a14="http://schemas.microsoft.com/office/drawing/2010/main" xmlns="" w="9525">
                   <a:solidFill>
                     <a:srgbClr val="000000"/>
                   </a:solidFill>
@@ -1916,7 +1925,7 @@
             </a:ln>
             <a:extLst>
               <a:ext uri="{91240B29-F687-4f45-9708-019B960494DF}">
-                <a14:hiddenLine xmlns="" xmlns:a14="http://schemas.microsoft.com/office/drawing/2010/main" w="9525">
+                <a14:hiddenLine xmlns:a14="http://schemas.microsoft.com/office/drawing/2010/main" xmlns="" w="9525">
                   <a:solidFill>
                     <a:srgbClr val="000000"/>
                   </a:solidFill>
@@ -2006,7 +2015,7 @@
             </a:ln>
             <a:extLst>
               <a:ext uri="{91240B29-F687-4f45-9708-019B960494DF}">
-                <a14:hiddenLine xmlns="" xmlns:a14="http://schemas.microsoft.com/office/drawing/2010/main" w="9525">
+                <a14:hiddenLine xmlns:a14="http://schemas.microsoft.com/office/drawing/2010/main" xmlns="" w="9525">
                   <a:solidFill>
                     <a:srgbClr val="000000"/>
                   </a:solidFill>
@@ -2074,7 +2083,7 @@
             </a:ln>
             <a:extLst>
               <a:ext uri="{91240B29-F687-4f45-9708-019B960494DF}">
-                <a14:hiddenLine xmlns="" xmlns:a14="http://schemas.microsoft.com/office/drawing/2010/main" w="9525">
+                <a14:hiddenLine xmlns:a14="http://schemas.microsoft.com/office/drawing/2010/main" xmlns="" w="9525">
                   <a:solidFill>
                     <a:srgbClr val="000000"/>
                   </a:solidFill>
@@ -2164,7 +2173,7 @@
             </a:ln>
             <a:extLst>
               <a:ext uri="{91240B29-F687-4f45-9708-019B960494DF}">
-                <a14:hiddenLine xmlns="" xmlns:a14="http://schemas.microsoft.com/office/drawing/2010/main" w="9525">
+                <a14:hiddenLine xmlns:a14="http://schemas.microsoft.com/office/drawing/2010/main" xmlns="" w="9525">
                   <a:solidFill>
                     <a:srgbClr val="000000"/>
                   </a:solidFill>
@@ -2232,7 +2241,7 @@
             </a:ln>
             <a:extLst>
               <a:ext uri="{91240B29-F687-4f45-9708-019B960494DF}">
-                <a14:hiddenLine xmlns="" xmlns:a14="http://schemas.microsoft.com/office/drawing/2010/main" w="9525">
+                <a14:hiddenLine xmlns:a14="http://schemas.microsoft.com/office/drawing/2010/main" xmlns="" w="9525">
                   <a:solidFill>
                     <a:srgbClr val="000000"/>
                   </a:solidFill>
@@ -2322,7 +2331,7 @@
             </a:ln>
             <a:extLst>
               <a:ext uri="{91240B29-F687-4f45-9708-019B960494DF}">
-                <a14:hiddenLine xmlns="" xmlns:a14="http://schemas.microsoft.com/office/drawing/2010/main" w="9525">
+                <a14:hiddenLine xmlns:a14="http://schemas.microsoft.com/office/drawing/2010/main" xmlns="" w="9525">
                   <a:solidFill>
                     <a:srgbClr val="000000"/>
                   </a:solidFill>
@@ -2356,7 +2365,7 @@
             </a:ln>
             <a:extLst>
               <a:ext uri="{91240B29-F687-4f45-9708-019B960494DF}">
-                <a14:hiddenLine xmlns="" xmlns:a14="http://schemas.microsoft.com/office/drawing/2010/main" w="9525">
+                <a14:hiddenLine xmlns:a14="http://schemas.microsoft.com/office/drawing/2010/main" xmlns="" w="9525">
                   <a:solidFill>
                     <a:srgbClr val="000000"/>
                   </a:solidFill>
@@ -2446,7 +2455,7 @@
             </a:ln>
             <a:extLst>
               <a:ext uri="{91240B29-F687-4f45-9708-019B960494DF}">
-                <a14:hiddenLine xmlns="" xmlns:a14="http://schemas.microsoft.com/office/drawing/2010/main" w="9525">
+                <a14:hiddenLine xmlns:a14="http://schemas.microsoft.com/office/drawing/2010/main" xmlns="" w="9525">
                   <a:solidFill>
                     <a:srgbClr val="000000"/>
                   </a:solidFill>
@@ -2508,7 +2517,7 @@
             </a:ln>
             <a:extLst>
               <a:ext uri="{91240B29-F687-4f45-9708-019B960494DF}">
-                <a14:hiddenLine xmlns="" xmlns:a14="http://schemas.microsoft.com/office/drawing/2010/main" w="9525">
+                <a14:hiddenLine xmlns:a14="http://schemas.microsoft.com/office/drawing/2010/main" xmlns="" w="9525">
                   <a:solidFill>
                     <a:srgbClr val="000000"/>
                   </a:solidFill>
@@ -2570,7 +2579,7 @@
             </a:ln>
             <a:extLst>
               <a:ext uri="{91240B29-F687-4f45-9708-019B960494DF}">
-                <a14:hiddenLine xmlns="" xmlns:a14="http://schemas.microsoft.com/office/drawing/2010/main" w="9525">
+                <a14:hiddenLine xmlns:a14="http://schemas.microsoft.com/office/drawing/2010/main" xmlns="" w="9525">
                   <a:solidFill>
                     <a:srgbClr val="000000"/>
                   </a:solidFill>
@@ -2660,7 +2669,7 @@
             </a:ln>
             <a:extLst>
               <a:ext uri="{91240B29-F687-4f45-9708-019B960494DF}">
-                <a14:hiddenLine xmlns="" xmlns:a14="http://schemas.microsoft.com/office/drawing/2010/main" w="9525">
+                <a14:hiddenLine xmlns:a14="http://schemas.microsoft.com/office/drawing/2010/main" xmlns="" w="9525">
                   <a:solidFill>
                     <a:srgbClr val="000000"/>
                   </a:solidFill>
@@ -2728,7 +2737,7 @@
             </a:ln>
             <a:extLst>
               <a:ext uri="{91240B29-F687-4f45-9708-019B960494DF}">
-                <a14:hiddenLine xmlns="" xmlns:a14="http://schemas.microsoft.com/office/drawing/2010/main" w="9525">
+                <a14:hiddenLine xmlns:a14="http://schemas.microsoft.com/office/drawing/2010/main" xmlns="" w="9525">
                   <a:solidFill>
                     <a:srgbClr val="000000"/>
                   </a:solidFill>
@@ -2790,7 +2799,7 @@
             </a:ln>
             <a:extLst>
               <a:ext uri="{91240B29-F687-4f45-9708-019B960494DF}">
-                <a14:hiddenLine xmlns="" xmlns:a14="http://schemas.microsoft.com/office/drawing/2010/main" w="9525">
+                <a14:hiddenLine xmlns:a14="http://schemas.microsoft.com/office/drawing/2010/main" xmlns="" w="9525">
                   <a:solidFill>
                     <a:srgbClr val="000000"/>
                   </a:solidFill>
@@ -2880,7 +2889,7 @@
             </a:ln>
             <a:extLst>
               <a:ext uri="{91240B29-F687-4f45-9708-019B960494DF}">
-                <a14:hiddenLine xmlns="" xmlns:a14="http://schemas.microsoft.com/office/drawing/2010/main" w="9525">
+                <a14:hiddenLine xmlns:a14="http://schemas.microsoft.com/office/drawing/2010/main" xmlns="" w="9525">
                   <a:solidFill>
                     <a:srgbClr val="000000"/>
                   </a:solidFill>
@@ -2942,7 +2951,7 @@
             </a:ln>
             <a:extLst>
               <a:ext uri="{91240B29-F687-4f45-9708-019B960494DF}">
-                <a14:hiddenLine xmlns="" xmlns:a14="http://schemas.microsoft.com/office/drawing/2010/main" w="9525">
+                <a14:hiddenLine xmlns:a14="http://schemas.microsoft.com/office/drawing/2010/main" xmlns="" w="9525">
                   <a:solidFill>
                     <a:srgbClr val="000000"/>
                   </a:solidFill>
@@ -3032,7 +3041,7 @@
             </a:ln>
             <a:extLst>
               <a:ext uri="{91240B29-F687-4f45-9708-019B960494DF}">
-                <a14:hiddenLine xmlns="" xmlns:a14="http://schemas.microsoft.com/office/drawing/2010/main" w="9525">
+                <a14:hiddenLine xmlns:a14="http://schemas.microsoft.com/office/drawing/2010/main" xmlns="" w="9525">
                   <a:solidFill>
                     <a:srgbClr val="000000"/>
                   </a:solidFill>
@@ -3094,7 +3103,7 @@
             </a:ln>
             <a:extLst>
               <a:ext uri="{91240B29-F687-4f45-9708-019B960494DF}">
-                <a14:hiddenLine xmlns="" xmlns:a14="http://schemas.microsoft.com/office/drawing/2010/main" w="9525">
+                <a14:hiddenLine xmlns:a14="http://schemas.microsoft.com/office/drawing/2010/main" xmlns="" w="9525">
                   <a:solidFill>
                     <a:srgbClr val="000000"/>
                   </a:solidFill>
@@ -3184,7 +3193,7 @@
             </a:ln>
             <a:extLst>
               <a:ext uri="{91240B29-F687-4f45-9708-019B960494DF}">
-                <a14:hiddenLine xmlns="" xmlns:a14="http://schemas.microsoft.com/office/drawing/2010/main" w="9525">
+                <a14:hiddenLine xmlns:a14="http://schemas.microsoft.com/office/drawing/2010/main" xmlns="" w="9525">
                   <a:solidFill>
                     <a:srgbClr val="000000"/>
                   </a:solidFill>
@@ -3218,7 +3227,7 @@
             </a:ln>
             <a:extLst>
               <a:ext uri="{91240B29-F687-4f45-9708-019B960494DF}">
-                <a14:hiddenLine xmlns="" xmlns:a14="http://schemas.microsoft.com/office/drawing/2010/main" w="9525">
+                <a14:hiddenLine xmlns:a14="http://schemas.microsoft.com/office/drawing/2010/main" xmlns="" w="9525">
                   <a:solidFill>
                     <a:srgbClr val="000000"/>
                   </a:solidFill>
@@ -3283,7 +3292,7 @@
             </a:ln>
             <a:extLst>
               <a:ext uri="{91240B29-F687-4f45-9708-019B960494DF}">
-                <a14:hiddenLine xmlns="" xmlns:a14="http://schemas.microsoft.com/office/drawing/2010/main" w="9525">
+                <a14:hiddenLine xmlns:a14="http://schemas.microsoft.com/office/drawing/2010/main" xmlns="" w="9525">
                   <a:solidFill>
                     <a:srgbClr val="000000"/>
                   </a:solidFill>
@@ -3373,7 +3382,7 @@
             </a:ln>
             <a:extLst>
               <a:ext uri="{91240B29-F687-4f45-9708-019B960494DF}">
-                <a14:hiddenLine xmlns="" xmlns:a14="http://schemas.microsoft.com/office/drawing/2010/main" w="9525">
+                <a14:hiddenLine xmlns:a14="http://schemas.microsoft.com/office/drawing/2010/main" xmlns="" w="9525">
                   <a:solidFill>
                     <a:srgbClr val="000000"/>
                   </a:solidFill>
@@ -3435,7 +3444,7 @@
             </a:ln>
             <a:extLst>
               <a:ext uri="{91240B29-F687-4f45-9708-019B960494DF}">
-                <a14:hiddenLine xmlns="" xmlns:a14="http://schemas.microsoft.com/office/drawing/2010/main" w="9525">
+                <a14:hiddenLine xmlns:a14="http://schemas.microsoft.com/office/drawing/2010/main" xmlns="" w="9525">
                   <a:solidFill>
                     <a:srgbClr val="000000"/>
                   </a:solidFill>
@@ -3525,7 +3534,7 @@
             </a:ln>
             <a:extLst>
               <a:ext uri="{91240B29-F687-4f45-9708-019B960494DF}">
-                <a14:hiddenLine xmlns="" xmlns:a14="http://schemas.microsoft.com/office/drawing/2010/main" w="9525">
+                <a14:hiddenLine xmlns:a14="http://schemas.microsoft.com/office/drawing/2010/main" xmlns="" w="9525">
                   <a:solidFill>
                     <a:srgbClr val="000000"/>
                   </a:solidFill>
@@ -3615,7 +3624,7 @@
             </a:ln>
             <a:extLst>
               <a:ext uri="{91240B29-F687-4f45-9708-019B960494DF}">
-                <a14:hiddenLine xmlns="" xmlns:a14="http://schemas.microsoft.com/office/drawing/2010/main" w="9525">
+                <a14:hiddenLine xmlns:a14="http://schemas.microsoft.com/office/drawing/2010/main" xmlns="" w="9525">
                   <a:solidFill>
                     <a:srgbClr val="000000"/>
                   </a:solidFill>
@@ -3680,7 +3689,7 @@
             </a:ln>
             <a:extLst>
               <a:ext uri="{91240B29-F687-4f45-9708-019B960494DF}">
-                <a14:hiddenLine xmlns="" xmlns:a14="http://schemas.microsoft.com/office/drawing/2010/main" w="9525">
+                <a14:hiddenLine xmlns:a14="http://schemas.microsoft.com/office/drawing/2010/main" xmlns="" w="9525">
                   <a:solidFill>
                     <a:srgbClr val="000000"/>
                   </a:solidFill>
@@ -3742,7 +3751,7 @@
             </a:ln>
             <a:extLst>
               <a:ext uri="{91240B29-F687-4f45-9708-019B960494DF}">
-                <a14:hiddenLine xmlns="" xmlns:a14="http://schemas.microsoft.com/office/drawing/2010/main" w="9525">
+                <a14:hiddenLine xmlns:a14="http://schemas.microsoft.com/office/drawing/2010/main" xmlns="" w="9525">
                   <a:solidFill>
                     <a:srgbClr val="000000"/>
                   </a:solidFill>
@@ -3832,7 +3841,7 @@
             </a:ln>
             <a:extLst>
               <a:ext uri="{91240B29-F687-4f45-9708-019B960494DF}">
-                <a14:hiddenLine xmlns="" xmlns:a14="http://schemas.microsoft.com/office/drawing/2010/main" w="9525">
+                <a14:hiddenLine xmlns:a14="http://schemas.microsoft.com/office/drawing/2010/main" xmlns="" w="9525">
                   <a:solidFill>
                     <a:srgbClr val="000000"/>
                   </a:solidFill>
@@ -3922,7 +3931,7 @@
             </a:ln>
             <a:extLst>
               <a:ext uri="{91240B29-F687-4f45-9708-019B960494DF}">
-                <a14:hiddenLine xmlns="" xmlns:a14="http://schemas.microsoft.com/office/drawing/2010/main" w="9525">
+                <a14:hiddenLine xmlns:a14="http://schemas.microsoft.com/office/drawing/2010/main" xmlns="" w="9525">
                   <a:solidFill>
                     <a:srgbClr val="000000"/>
                   </a:solidFill>
@@ -3984,7 +3993,7 @@
             </a:ln>
             <a:extLst>
               <a:ext uri="{91240B29-F687-4f45-9708-019B960494DF}">
-                <a14:hiddenLine xmlns="" xmlns:a14="http://schemas.microsoft.com/office/drawing/2010/main" w="9525">
+                <a14:hiddenLine xmlns:a14="http://schemas.microsoft.com/office/drawing/2010/main" xmlns="" w="9525">
                   <a:solidFill>
                     <a:srgbClr val="000000"/>
                   </a:solidFill>
@@ -4104,7 +4113,7 @@
             </a:ln>
             <a:extLst>
               <a:ext uri="{91240B29-F687-4f45-9708-019B960494DF}">
-                <a14:hiddenLine xmlns="" xmlns:a14="http://schemas.microsoft.com/office/drawing/2010/main" w="9525">
+                <a14:hiddenLine xmlns:a14="http://schemas.microsoft.com/office/drawing/2010/main" xmlns="" w="9525">
                   <a:solidFill>
                     <a:srgbClr val="000000"/>
                   </a:solidFill>
@@ -4172,7 +4181,7 @@
             </a:ln>
             <a:extLst>
               <a:ext uri="{91240B29-F687-4f45-9708-019B960494DF}">
-                <a14:hiddenLine xmlns="" xmlns:a14="http://schemas.microsoft.com/office/drawing/2010/main" w="9525">
+                <a14:hiddenLine xmlns:a14="http://schemas.microsoft.com/office/drawing/2010/main" xmlns="" w="9525">
                   <a:solidFill>
                     <a:srgbClr val="000000"/>
                   </a:solidFill>
@@ -4262,7 +4271,7 @@
             </a:ln>
             <a:extLst>
               <a:ext uri="{91240B29-F687-4f45-9708-019B960494DF}">
-                <a14:hiddenLine xmlns="" xmlns:a14="http://schemas.microsoft.com/office/drawing/2010/main" w="9525">
+                <a14:hiddenLine xmlns:a14="http://schemas.microsoft.com/office/drawing/2010/main" xmlns="" w="9525">
                   <a:solidFill>
                     <a:srgbClr val="000000"/>
                   </a:solidFill>
@@ -4404,7 +4413,7 @@
             <a:fld id="{A37D6D71-8B28-4ED6-B932-04B197003D23}" type="datetimeFigureOut">
               <a:rPr lang="en-US" smtClean="0"/>
               <a:pPr algn="r"/>
-              <a:t>2/16/2021</a:t>
+              <a:t>2/20/2021</a:t>
             </a:fld>
             <a:endParaRPr lang="en-US" spc="50" dirty="0"/>
           </a:p>
@@ -4675,7 +4684,7 @@
             <a:fld id="{A37D6D71-8B28-4ED6-B932-04B197003D23}" type="datetimeFigureOut">
               <a:rPr lang="en-US" smtClean="0"/>
               <a:pPr algn="r"/>
-              <a:t>2/16/2021</a:t>
+              <a:t>2/20/2021</a:t>
             </a:fld>
             <a:endParaRPr lang="en-US" spc="50" dirty="0"/>
           </a:p>
@@ -4875,7 +4884,7 @@
             <a:fld id="{A37D6D71-8B28-4ED6-B932-04B197003D23}" type="datetimeFigureOut">
               <a:rPr lang="en-US" smtClean="0"/>
               <a:pPr algn="r"/>
-              <a:t>2/16/2021</a:t>
+              <a:t>2/20/2021</a:t>
             </a:fld>
             <a:endParaRPr lang="en-US" spc="50" dirty="0"/>
           </a:p>
@@ -5142,7 +5151,7 @@
             <a:fld id="{A37D6D71-8B28-4ED6-B932-04B197003D23}" type="datetimeFigureOut">
               <a:rPr lang="en-US" smtClean="0"/>
               <a:pPr algn="r"/>
-              <a:t>2/16/2021</a:t>
+              <a:t>2/20/2021</a:t>
             </a:fld>
             <a:endParaRPr lang="en-US" spc="50" dirty="0"/>
           </a:p>
@@ -5580,7 +5589,7 @@
             <a:fld id="{A37D6D71-8B28-4ED6-B932-04B197003D23}" type="datetimeFigureOut">
               <a:rPr lang="en-US" smtClean="0"/>
               <a:pPr algn="r"/>
-              <a:t>2/16/2021</a:t>
+              <a:t>2/20/2021</a:t>
             </a:fld>
             <a:endParaRPr lang="en-US" spc="50" dirty="0"/>
           </a:p>
@@ -6130,7 +6139,7 @@
             <a:fld id="{A37D6D71-8B28-4ED6-B932-04B197003D23}" type="datetimeFigureOut">
               <a:rPr lang="en-US" smtClean="0"/>
               <a:pPr algn="r"/>
-              <a:t>2/16/2021</a:t>
+              <a:t>2/20/2021</a:t>
             </a:fld>
             <a:endParaRPr lang="en-US" spc="50" dirty="0"/>
           </a:p>
@@ -6854,7 +6863,7 @@
             <a:fld id="{A37D6D71-8B28-4ED6-B932-04B197003D23}" type="datetimeFigureOut">
               <a:rPr lang="en-US" smtClean="0"/>
               <a:pPr algn="r"/>
-              <a:t>2/16/2021</a:t>
+              <a:t>2/20/2021</a:t>
             </a:fld>
             <a:endParaRPr lang="en-US" spc="50" dirty="0"/>
           </a:p>
@@ -7028,7 +7037,7 @@
             <a:fld id="{A37D6D71-8B28-4ED6-B932-04B197003D23}" type="datetimeFigureOut">
               <a:rPr lang="en-US" smtClean="0"/>
               <a:pPr algn="r"/>
-              <a:t>2/16/2021</a:t>
+              <a:t>2/20/2021</a:t>
             </a:fld>
             <a:endParaRPr lang="en-US" spc="50" dirty="0"/>
           </a:p>
@@ -7212,7 +7221,7 @@
             <a:fld id="{A37D6D71-8B28-4ED6-B932-04B197003D23}" type="datetimeFigureOut">
               <a:rPr lang="en-US" smtClean="0"/>
               <a:pPr algn="r"/>
-              <a:t>2/16/2021</a:t>
+              <a:t>2/20/2021</a:t>
             </a:fld>
             <a:endParaRPr lang="en-US" spc="50" dirty="0"/>
           </a:p>
@@ -7386,7 +7395,7 @@
             <a:fld id="{A37D6D71-8B28-4ED6-B932-04B197003D23}" type="datetimeFigureOut">
               <a:rPr lang="en-US" smtClean="0"/>
               <a:pPr algn="r"/>
-              <a:t>2/16/2021</a:t>
+              <a:t>2/20/2021</a:t>
             </a:fld>
             <a:endParaRPr lang="en-US" spc="50" dirty="0"/>
           </a:p>
@@ -7640,7 +7649,7 @@
             <a:fld id="{A37D6D71-8B28-4ED6-B932-04B197003D23}" type="datetimeFigureOut">
               <a:rPr lang="en-US" smtClean="0"/>
               <a:pPr algn="r"/>
-              <a:t>2/16/2021</a:t>
+              <a:t>2/20/2021</a:t>
             </a:fld>
             <a:endParaRPr lang="en-US" spc="50" dirty="0"/>
           </a:p>
@@ -7876,7 +7885,7 @@
             <a:fld id="{A37D6D71-8B28-4ED6-B932-04B197003D23}" type="datetimeFigureOut">
               <a:rPr lang="en-US" smtClean="0"/>
               <a:pPr algn="r"/>
-              <a:t>2/16/2021</a:t>
+              <a:t>2/20/2021</a:t>
             </a:fld>
             <a:endParaRPr lang="en-US" spc="50" dirty="0"/>
           </a:p>
@@ -8261,7 +8270,7 @@
             <a:fld id="{A37D6D71-8B28-4ED6-B932-04B197003D23}" type="datetimeFigureOut">
               <a:rPr lang="en-US" smtClean="0"/>
               <a:pPr algn="r"/>
-              <a:t>2/16/2021</a:t>
+              <a:t>2/20/2021</a:t>
             </a:fld>
             <a:endParaRPr lang="en-US" spc="50" dirty="0"/>
           </a:p>
@@ -8383,7 +8392,7 @@
             <a:fld id="{A37D6D71-8B28-4ED6-B932-04B197003D23}" type="datetimeFigureOut">
               <a:rPr lang="en-US" smtClean="0"/>
               <a:pPr algn="r"/>
-              <a:t>2/16/2021</a:t>
+              <a:t>2/20/2021</a:t>
             </a:fld>
             <a:endParaRPr lang="en-US" spc="50" dirty="0"/>
           </a:p>
@@ -8482,7 +8491,7 @@
             <a:fld id="{A37D6D71-8B28-4ED6-B932-04B197003D23}" type="datetimeFigureOut">
               <a:rPr lang="en-US" smtClean="0"/>
               <a:pPr algn="r"/>
-              <a:t>2/16/2021</a:t>
+              <a:t>2/20/2021</a:t>
             </a:fld>
             <a:endParaRPr lang="en-US" spc="50" dirty="0"/>
           </a:p>
@@ -8735,7 +8744,7 @@
             <a:fld id="{A37D6D71-8B28-4ED6-B932-04B197003D23}" type="datetimeFigureOut">
               <a:rPr lang="en-US" smtClean="0"/>
               <a:pPr algn="r"/>
-              <a:t>2/16/2021</a:t>
+              <a:t>2/20/2021</a:t>
             </a:fld>
             <a:endParaRPr lang="en-US" spc="50" dirty="0"/>
           </a:p>
@@ -9019,7 +9028,7 @@
             <a:fld id="{A37D6D71-8B28-4ED6-B932-04B197003D23}" type="datetimeFigureOut">
               <a:rPr lang="en-US" smtClean="0"/>
               <a:pPr algn="r"/>
-              <a:t>2/16/2021</a:t>
+              <a:t>2/20/2021</a:t>
             </a:fld>
             <a:endParaRPr lang="en-US" spc="50" dirty="0"/>
           </a:p>
@@ -9137,7 +9146,7 @@
           <a:noFill/>
           <a:extLst>
             <a:ext uri="{909E8E84-426E-40dd-AFC4-6F175D3DCCD1}">
-              <a14:hiddenFill xmlns="" xmlns:a14="http://schemas.microsoft.com/office/drawing/2010/main">
+              <a14:hiddenFill xmlns:a14="http://schemas.microsoft.com/office/drawing/2010/main" xmlns="">
                 <a:solidFill>
                   <a:srgbClr val="FFFFFF"/>
                 </a:solidFill>
@@ -9211,7 +9220,7 @@
               </a:ln>
               <a:extLst>
                 <a:ext uri="{91240B29-F687-4f45-9708-019B960494DF}">
-                  <a14:hiddenLine xmlns="" xmlns:a14="http://schemas.microsoft.com/office/drawing/2010/main" w="9525">
+                  <a14:hiddenLine xmlns:a14="http://schemas.microsoft.com/office/drawing/2010/main" xmlns="" w="9525">
                     <a:solidFill>
                       <a:srgbClr val="000000"/>
                     </a:solidFill>
@@ -9301,7 +9310,7 @@
               </a:ln>
               <a:extLst>
                 <a:ext uri="{91240B29-F687-4f45-9708-019B960494DF}">
-                  <a14:hiddenLine xmlns="" xmlns:a14="http://schemas.microsoft.com/office/drawing/2010/main" w="9525">
+                  <a14:hiddenLine xmlns:a14="http://schemas.microsoft.com/office/drawing/2010/main" xmlns="" w="9525">
                     <a:solidFill>
                       <a:srgbClr val="000000"/>
                     </a:solidFill>
@@ -9391,7 +9400,7 @@
               </a:ln>
               <a:extLst>
                 <a:ext uri="{91240B29-F687-4f45-9708-019B960494DF}">
-                  <a14:hiddenLine xmlns="" xmlns:a14="http://schemas.microsoft.com/office/drawing/2010/main" w="9525">
+                  <a14:hiddenLine xmlns:a14="http://schemas.microsoft.com/office/drawing/2010/main" xmlns="" w="9525">
                     <a:solidFill>
                       <a:srgbClr val="000000"/>
                     </a:solidFill>
@@ -9453,7 +9462,7 @@
               </a:ln>
               <a:extLst>
                 <a:ext uri="{91240B29-F687-4f45-9708-019B960494DF}">
-                  <a14:hiddenLine xmlns="" xmlns:a14="http://schemas.microsoft.com/office/drawing/2010/main" w="9525">
+                  <a14:hiddenLine xmlns:a14="http://schemas.microsoft.com/office/drawing/2010/main" xmlns="" w="9525">
                     <a:solidFill>
                       <a:srgbClr val="000000"/>
                     </a:solidFill>
@@ -9543,7 +9552,7 @@
               </a:ln>
               <a:extLst>
                 <a:ext uri="{91240B29-F687-4f45-9708-019B960494DF}">
-                  <a14:hiddenLine xmlns="" xmlns:a14="http://schemas.microsoft.com/office/drawing/2010/main" w="9525">
+                  <a14:hiddenLine xmlns:a14="http://schemas.microsoft.com/office/drawing/2010/main" xmlns="" w="9525">
                     <a:solidFill>
                       <a:srgbClr val="000000"/>
                     </a:solidFill>
@@ -9605,7 +9614,7 @@
               </a:ln>
               <a:extLst>
                 <a:ext uri="{91240B29-F687-4f45-9708-019B960494DF}">
-                  <a14:hiddenLine xmlns="" xmlns:a14="http://schemas.microsoft.com/office/drawing/2010/main" w="9525">
+                  <a14:hiddenLine xmlns:a14="http://schemas.microsoft.com/office/drawing/2010/main" xmlns="" w="9525">
                     <a:solidFill>
                       <a:srgbClr val="000000"/>
                     </a:solidFill>
@@ -9667,7 +9676,7 @@
               </a:ln>
               <a:extLst>
                 <a:ext uri="{91240B29-F687-4f45-9708-019B960494DF}">
-                  <a14:hiddenLine xmlns="" xmlns:a14="http://schemas.microsoft.com/office/drawing/2010/main" w="9525">
+                  <a14:hiddenLine xmlns:a14="http://schemas.microsoft.com/office/drawing/2010/main" xmlns="" w="9525">
                     <a:solidFill>
                       <a:srgbClr val="000000"/>
                     </a:solidFill>
@@ -9757,7 +9766,7 @@
               </a:ln>
               <a:extLst>
                 <a:ext uri="{91240B29-F687-4f45-9708-019B960494DF}">
-                  <a14:hiddenLine xmlns="" xmlns:a14="http://schemas.microsoft.com/office/drawing/2010/main" w="9525">
+                  <a14:hiddenLine xmlns:a14="http://schemas.microsoft.com/office/drawing/2010/main" xmlns="" w="9525">
                     <a:solidFill>
                       <a:srgbClr val="000000"/>
                     </a:solidFill>
@@ -9847,7 +9856,7 @@
               </a:ln>
               <a:extLst>
                 <a:ext uri="{91240B29-F687-4f45-9708-019B960494DF}">
-                  <a14:hiddenLine xmlns="" xmlns:a14="http://schemas.microsoft.com/office/drawing/2010/main" w="9525">
+                  <a14:hiddenLine xmlns:a14="http://schemas.microsoft.com/office/drawing/2010/main" xmlns="" w="9525">
                     <a:solidFill>
                       <a:srgbClr val="000000"/>
                     </a:solidFill>
@@ -9909,7 +9918,7 @@
               </a:ln>
               <a:extLst>
                 <a:ext uri="{91240B29-F687-4f45-9708-019B960494DF}">
-                  <a14:hiddenLine xmlns="" xmlns:a14="http://schemas.microsoft.com/office/drawing/2010/main" w="9525">
+                  <a14:hiddenLine xmlns:a14="http://schemas.microsoft.com/office/drawing/2010/main" xmlns="" w="9525">
                     <a:solidFill>
                       <a:srgbClr val="000000"/>
                     </a:solidFill>
@@ -10019,7 +10028,7 @@
               </a:ln>
               <a:extLst>
                 <a:ext uri="{91240B29-F687-4f45-9708-019B960494DF}">
-                  <a14:hiddenLine xmlns="" xmlns:a14="http://schemas.microsoft.com/office/drawing/2010/main" w="9525">
+                  <a14:hiddenLine xmlns:a14="http://schemas.microsoft.com/office/drawing/2010/main" xmlns="" w="9525">
                     <a:solidFill>
                       <a:srgbClr val="000000"/>
                     </a:solidFill>
@@ -10103,7 +10112,7 @@
               </a:ln>
               <a:extLst>
                 <a:ext uri="{91240B29-F687-4f45-9708-019B960494DF}">
-                  <a14:hiddenLine xmlns="" xmlns:a14="http://schemas.microsoft.com/office/drawing/2010/main" w="9525">
+                  <a14:hiddenLine xmlns:a14="http://schemas.microsoft.com/office/drawing/2010/main" xmlns="" w="9525">
                     <a:solidFill>
                       <a:srgbClr val="000000"/>
                     </a:solidFill>
@@ -10165,7 +10174,7 @@
               </a:ln>
               <a:extLst>
                 <a:ext uri="{91240B29-F687-4f45-9708-019B960494DF}">
-                  <a14:hiddenLine xmlns="" xmlns:a14="http://schemas.microsoft.com/office/drawing/2010/main" w="9525">
+                  <a14:hiddenLine xmlns:a14="http://schemas.microsoft.com/office/drawing/2010/main" xmlns="" w="9525">
                     <a:solidFill>
                       <a:srgbClr val="000000"/>
                     </a:solidFill>
@@ -10227,7 +10236,7 @@
               </a:ln>
               <a:extLst>
                 <a:ext uri="{91240B29-F687-4f45-9708-019B960494DF}">
-                  <a14:hiddenLine xmlns="" xmlns:a14="http://schemas.microsoft.com/office/drawing/2010/main" w="9525">
+                  <a14:hiddenLine xmlns:a14="http://schemas.microsoft.com/office/drawing/2010/main" xmlns="" w="9525">
                     <a:solidFill>
                       <a:srgbClr val="000000"/>
                     </a:solidFill>
@@ -10317,7 +10326,7 @@
               </a:ln>
               <a:extLst>
                 <a:ext uri="{91240B29-F687-4f45-9708-019B960494DF}">
-                  <a14:hiddenLine xmlns="" xmlns:a14="http://schemas.microsoft.com/office/drawing/2010/main" w="9525">
+                  <a14:hiddenLine xmlns:a14="http://schemas.microsoft.com/office/drawing/2010/main" xmlns="" w="9525">
                     <a:solidFill>
                       <a:srgbClr val="000000"/>
                     </a:solidFill>
@@ -10351,7 +10360,7 @@
               </a:ln>
               <a:extLst>
                 <a:ext uri="{91240B29-F687-4f45-9708-019B960494DF}">
-                  <a14:hiddenLine xmlns="" xmlns:a14="http://schemas.microsoft.com/office/drawing/2010/main" w="9525">
+                  <a14:hiddenLine xmlns:a14="http://schemas.microsoft.com/office/drawing/2010/main" xmlns="" w="9525">
                     <a:solidFill>
                       <a:srgbClr val="000000"/>
                     </a:solidFill>
@@ -10416,7 +10425,7 @@
               </a:ln>
               <a:extLst>
                 <a:ext uri="{91240B29-F687-4f45-9708-019B960494DF}">
-                  <a14:hiddenLine xmlns="" xmlns:a14="http://schemas.microsoft.com/office/drawing/2010/main" w="9525">
+                  <a14:hiddenLine xmlns:a14="http://schemas.microsoft.com/office/drawing/2010/main" xmlns="" w="9525">
                     <a:solidFill>
                       <a:srgbClr val="000000"/>
                     </a:solidFill>
@@ -10506,7 +10515,7 @@
               </a:ln>
               <a:extLst>
                 <a:ext uri="{91240B29-F687-4f45-9708-019B960494DF}">
-                  <a14:hiddenLine xmlns="" xmlns:a14="http://schemas.microsoft.com/office/drawing/2010/main" w="9525">
+                  <a14:hiddenLine xmlns:a14="http://schemas.microsoft.com/office/drawing/2010/main" xmlns="" w="9525">
                     <a:solidFill>
                       <a:srgbClr val="000000"/>
                     </a:solidFill>
@@ -10568,7 +10577,7 @@
               </a:ln>
               <a:extLst>
                 <a:ext uri="{91240B29-F687-4f45-9708-019B960494DF}">
-                  <a14:hiddenLine xmlns="" xmlns:a14="http://schemas.microsoft.com/office/drawing/2010/main" w="9525">
+                  <a14:hiddenLine xmlns:a14="http://schemas.microsoft.com/office/drawing/2010/main" xmlns="" w="9525">
                     <a:solidFill>
                       <a:srgbClr val="000000"/>
                     </a:solidFill>
@@ -10658,7 +10667,7 @@
               </a:ln>
               <a:extLst>
                 <a:ext uri="{91240B29-F687-4f45-9708-019B960494DF}">
-                  <a14:hiddenLine xmlns="" xmlns:a14="http://schemas.microsoft.com/office/drawing/2010/main" w="9525">
+                  <a14:hiddenLine xmlns:a14="http://schemas.microsoft.com/office/drawing/2010/main" xmlns="" w="9525">
                     <a:solidFill>
                       <a:srgbClr val="000000"/>
                     </a:solidFill>
@@ -10723,7 +10732,7 @@
               </a:ln>
               <a:extLst>
                 <a:ext uri="{91240B29-F687-4f45-9708-019B960494DF}">
-                  <a14:hiddenLine xmlns="" xmlns:a14="http://schemas.microsoft.com/office/drawing/2010/main" w="9525">
+                  <a14:hiddenLine xmlns:a14="http://schemas.microsoft.com/office/drawing/2010/main" xmlns="" w="9525">
                     <a:solidFill>
                       <a:srgbClr val="000000"/>
                     </a:solidFill>
@@ -10785,7 +10794,7 @@
               </a:ln>
               <a:extLst>
                 <a:ext uri="{91240B29-F687-4f45-9708-019B960494DF}">
-                  <a14:hiddenLine xmlns="" xmlns:a14="http://schemas.microsoft.com/office/drawing/2010/main" w="9525">
+                  <a14:hiddenLine xmlns:a14="http://schemas.microsoft.com/office/drawing/2010/main" xmlns="" w="9525">
                     <a:solidFill>
                       <a:srgbClr val="000000"/>
                     </a:solidFill>
@@ -10875,7 +10884,7 @@
               </a:ln>
               <a:extLst>
                 <a:ext uri="{91240B29-F687-4f45-9708-019B960494DF}">
-                  <a14:hiddenLine xmlns="" xmlns:a14="http://schemas.microsoft.com/office/drawing/2010/main" w="9525">
+                  <a14:hiddenLine xmlns:a14="http://schemas.microsoft.com/office/drawing/2010/main" xmlns="" w="9525">
                     <a:solidFill>
                       <a:srgbClr val="000000"/>
                     </a:solidFill>
@@ -10965,7 +10974,7 @@
               </a:ln>
               <a:extLst>
                 <a:ext uri="{91240B29-F687-4f45-9708-019B960494DF}">
-                  <a14:hiddenLine xmlns="" xmlns:a14="http://schemas.microsoft.com/office/drawing/2010/main" w="9525">
+                  <a14:hiddenLine xmlns:a14="http://schemas.microsoft.com/office/drawing/2010/main" xmlns="" w="9525">
                     <a:solidFill>
                       <a:srgbClr val="000000"/>
                     </a:solidFill>
@@ -11030,7 +11039,7 @@
               </a:ln>
               <a:extLst>
                 <a:ext uri="{91240B29-F687-4f45-9708-019B960494DF}">
-                  <a14:hiddenLine xmlns="" xmlns:a14="http://schemas.microsoft.com/office/drawing/2010/main" w="9525">
+                  <a14:hiddenLine xmlns:a14="http://schemas.microsoft.com/office/drawing/2010/main" xmlns="" w="9525">
                     <a:solidFill>
                       <a:srgbClr val="000000"/>
                     </a:solidFill>
@@ -11150,7 +11159,7 @@
               </a:ln>
               <a:extLst>
                 <a:ext uri="{91240B29-F687-4f45-9708-019B960494DF}">
-                  <a14:hiddenLine xmlns="" xmlns:a14="http://schemas.microsoft.com/office/drawing/2010/main" w="9525">
+                  <a14:hiddenLine xmlns:a14="http://schemas.microsoft.com/office/drawing/2010/main" xmlns="" w="9525">
                     <a:solidFill>
                       <a:srgbClr val="000000"/>
                     </a:solidFill>
@@ -11248,7 +11257,7 @@
               </a:ln>
               <a:extLst>
                 <a:ext uri="{91240B29-F687-4f45-9708-019B960494DF}">
-                  <a14:hiddenLine xmlns="" xmlns:a14="http://schemas.microsoft.com/office/drawing/2010/main" w="9525">
+                  <a14:hiddenLine xmlns:a14="http://schemas.microsoft.com/office/drawing/2010/main" xmlns="" w="9525">
                     <a:solidFill>
                       <a:srgbClr val="000000"/>
                     </a:solidFill>
@@ -11363,7 +11372,7 @@
               </a:ln>
               <a:extLst>
                 <a:ext uri="{91240B29-F687-4f45-9708-019B960494DF}">
-                  <a14:hiddenLine xmlns="" xmlns:a14="http://schemas.microsoft.com/office/drawing/2010/main" w="9525">
+                  <a14:hiddenLine xmlns:a14="http://schemas.microsoft.com/office/drawing/2010/main" xmlns="" w="9525">
                     <a:solidFill>
                       <a:srgbClr val="000000"/>
                     </a:solidFill>
@@ -11453,7 +11462,7 @@
               </a:ln>
               <a:extLst>
                 <a:ext uri="{91240B29-F687-4f45-9708-019B960494DF}">
-                  <a14:hiddenLine xmlns="" xmlns:a14="http://schemas.microsoft.com/office/drawing/2010/main" w="9525">
+                  <a14:hiddenLine xmlns:a14="http://schemas.microsoft.com/office/drawing/2010/main" xmlns="" w="9525">
                     <a:solidFill>
                       <a:srgbClr val="000000"/>
                     </a:solidFill>
@@ -11518,7 +11527,7 @@
               </a:ln>
               <a:extLst>
                 <a:ext uri="{91240B29-F687-4f45-9708-019B960494DF}">
-                  <a14:hiddenLine xmlns="" xmlns:a14="http://schemas.microsoft.com/office/drawing/2010/main" w="9525">
+                  <a14:hiddenLine xmlns:a14="http://schemas.microsoft.com/office/drawing/2010/main" xmlns="" w="9525">
                     <a:solidFill>
                       <a:srgbClr val="000000"/>
                     </a:solidFill>
@@ -11608,7 +11617,7 @@
               </a:ln>
               <a:extLst>
                 <a:ext uri="{91240B29-F687-4f45-9708-019B960494DF}">
-                  <a14:hiddenLine xmlns="" xmlns:a14="http://schemas.microsoft.com/office/drawing/2010/main" w="9525">
+                  <a14:hiddenLine xmlns:a14="http://schemas.microsoft.com/office/drawing/2010/main" xmlns="" w="9525">
                     <a:solidFill>
                       <a:srgbClr val="000000"/>
                     </a:solidFill>
@@ -11676,7 +11685,7 @@
               </a:ln>
               <a:extLst>
                 <a:ext uri="{91240B29-F687-4f45-9708-019B960494DF}">
-                  <a14:hiddenLine xmlns="" xmlns:a14="http://schemas.microsoft.com/office/drawing/2010/main" w="9525">
+                  <a14:hiddenLine xmlns:a14="http://schemas.microsoft.com/office/drawing/2010/main" xmlns="" w="9525">
                     <a:solidFill>
                       <a:srgbClr val="000000"/>
                     </a:solidFill>
@@ -11766,7 +11775,7 @@
               </a:ln>
               <a:extLst>
                 <a:ext uri="{91240B29-F687-4f45-9708-019B960494DF}">
-                  <a14:hiddenLine xmlns="" xmlns:a14="http://schemas.microsoft.com/office/drawing/2010/main" w="9525">
+                  <a14:hiddenLine xmlns:a14="http://schemas.microsoft.com/office/drawing/2010/main" xmlns="" w="9525">
                     <a:solidFill>
                       <a:srgbClr val="000000"/>
                     </a:solidFill>
@@ -11834,7 +11843,7 @@
               </a:ln>
               <a:extLst>
                 <a:ext uri="{91240B29-F687-4f45-9708-019B960494DF}">
-                  <a14:hiddenLine xmlns="" xmlns:a14="http://schemas.microsoft.com/office/drawing/2010/main" w="9525">
+                  <a14:hiddenLine xmlns:a14="http://schemas.microsoft.com/office/drawing/2010/main" xmlns="" w="9525">
                     <a:solidFill>
                       <a:srgbClr val="000000"/>
                     </a:solidFill>
@@ -11924,7 +11933,7 @@
               </a:ln>
               <a:extLst>
                 <a:ext uri="{91240B29-F687-4f45-9708-019B960494DF}">
-                  <a14:hiddenLine xmlns="" xmlns:a14="http://schemas.microsoft.com/office/drawing/2010/main" w="9525">
+                  <a14:hiddenLine xmlns:a14="http://schemas.microsoft.com/office/drawing/2010/main" xmlns="" w="9525">
                     <a:solidFill>
                       <a:srgbClr val="000000"/>
                     </a:solidFill>
@@ -11958,7 +11967,7 @@
               </a:ln>
               <a:extLst>
                 <a:ext uri="{91240B29-F687-4f45-9708-019B960494DF}">
-                  <a14:hiddenLine xmlns="" xmlns:a14="http://schemas.microsoft.com/office/drawing/2010/main" w="9525">
+                  <a14:hiddenLine xmlns:a14="http://schemas.microsoft.com/office/drawing/2010/main" xmlns="" w="9525">
                     <a:solidFill>
                       <a:srgbClr val="000000"/>
                     </a:solidFill>
@@ -12100,7 +12109,7 @@
             <a:fld id="{A37D6D71-8B28-4ED6-B932-04B197003D23}" type="datetimeFigureOut">
               <a:rPr lang="en-US" smtClean="0"/>
               <a:pPr algn="r"/>
-              <a:t>2/16/2021</a:t>
+              <a:t>2/20/2021</a:t>
             </a:fld>
             <a:endParaRPr lang="en-US" spc="50" dirty="0"/>
           </a:p>
@@ -12727,6 +12736,1025 @@
           <a:chExt cx="0" cy="0"/>
         </a:xfrm>
       </p:grpSpPr>
+      <p:pic>
+        <p:nvPicPr>
+          <p:cNvPr id="4" name="Onlinemedier 3" title="PlacePart">
+            <a:hlinkClick r:id="" action="ppaction://media"/>
+            <a:extLst>
+              <a:ext uri="{FF2B5EF4-FFF2-40B4-BE49-F238E27FC236}">
+                <a16:creationId xmlns:a16="http://schemas.microsoft.com/office/drawing/2014/main" id="{1D489889-44B2-4D7A-9D7F-CE8D221063B9}"/>
+              </a:ext>
+            </a:extLst>
+          </p:cNvPr>
+          <p:cNvPicPr>
+            <a:picLocks noRot="1" noChangeAspect="1"/>
+          </p:cNvPicPr>
+          <p:nvPr>
+            <a:videoFile r:link="rId1"/>
+          </p:nvPr>
+        </p:nvPicPr>
+        <p:blipFill>
+          <a:blip r:embed="rId3"/>
+          <a:stretch>
+            <a:fillRect/>
+          </a:stretch>
+        </p:blipFill>
+        <p:spPr>
+          <a:xfrm>
+            <a:off x="136013" y="0"/>
+            <a:ext cx="11694296" cy="6607277"/>
+          </a:xfrm>
+          <a:prstGeom prst="rect">
+            <a:avLst/>
+          </a:prstGeom>
+        </p:spPr>
+      </p:pic>
+    </p:spTree>
+    <p:extLst>
+      <p:ext uri="{BB962C8B-B14F-4D97-AF65-F5344CB8AC3E}">
+        <p14:creationId xmlns:p14="http://schemas.microsoft.com/office/powerpoint/2010/main" val="1132559072"/>
+      </p:ext>
+    </p:extLst>
+  </p:cSld>
+  <p:clrMapOvr>
+    <a:masterClrMapping/>
+  </p:clrMapOvr>
+  <p:timing>
+    <p:tnLst>
+      <p:par>
+        <p:cTn id="1" dur="indefinite" restart="never" nodeType="tmRoot">
+          <p:childTnLst>
+            <p:seq concurrent="1" nextAc="seek">
+              <p:cTn id="2" dur="indefinite" nodeType="mainSeq">
+                <p:childTnLst>
+                  <p:par>
+                    <p:cTn id="3" fill="hold">
+                      <p:stCondLst>
+                        <p:cond delay="indefinite"/>
+                      </p:stCondLst>
+                      <p:childTnLst>
+                        <p:par>
+                          <p:cTn id="4" fill="hold">
+                            <p:stCondLst>
+                              <p:cond delay="0"/>
+                            </p:stCondLst>
+                            <p:childTnLst>
+                              <p:par>
+                                <p:cTn id="5" presetID="1" presetClass="mediacall" presetSubtype="0" fill="hold" nodeType="clickEffect">
+                                  <p:stCondLst>
+                                    <p:cond delay="0"/>
+                                  </p:stCondLst>
+                                  <p:childTnLst>
+                                    <p:cmd type="call" cmd="playFrom(0.0)">
+                                      <p:cBhvr>
+                                        <p:cTn id="6" dur="1" fill="hold"/>
+                                        <p:tgtEl>
+                                          <p:spTgt spid="4"/>
+                                        </p:tgtEl>
+                                      </p:cBhvr>
+                                    </p:cmd>
+                                  </p:childTnLst>
+                                </p:cTn>
+                              </p:par>
+                            </p:childTnLst>
+                          </p:cTn>
+                        </p:par>
+                      </p:childTnLst>
+                    </p:cTn>
+                  </p:par>
+                </p:childTnLst>
+              </p:cTn>
+              <p:prevCondLst>
+                <p:cond evt="onPrev" delay="0">
+                  <p:tgtEl>
+                    <p:sldTgt/>
+                  </p:tgtEl>
+                </p:cond>
+              </p:prevCondLst>
+              <p:nextCondLst>
+                <p:cond evt="onNext" delay="0">
+                  <p:tgtEl>
+                    <p:sldTgt/>
+                  </p:tgtEl>
+                </p:cond>
+              </p:nextCondLst>
+            </p:seq>
+            <p:video>
+              <p:cMediaNode vol="80000">
+                <p:cTn id="7" fill="hold" display="0">
+                  <p:stCondLst>
+                    <p:cond delay="indefinite"/>
+                  </p:stCondLst>
+                </p:cTn>
+                <p:tgtEl>
+                  <p:spTgt spid="4"/>
+                </p:tgtEl>
+              </p:cMediaNode>
+            </p:video>
+            <p:seq concurrent="1" nextAc="seek">
+              <p:cTn id="8" restart="whenNotActive" fill="hold" evtFilter="cancelBubble" nodeType="interactiveSeq">
+                <p:stCondLst>
+                  <p:cond evt="onClick" delay="0">
+                    <p:tgtEl>
+                      <p:spTgt spid="4"/>
+                    </p:tgtEl>
+                  </p:cond>
+                </p:stCondLst>
+                <p:endSync evt="end" delay="0">
+                  <p:rtn val="all"/>
+                </p:endSync>
+                <p:childTnLst>
+                  <p:par>
+                    <p:cTn id="9" fill="hold">
+                      <p:stCondLst>
+                        <p:cond delay="0"/>
+                      </p:stCondLst>
+                      <p:childTnLst>
+                        <p:par>
+                          <p:cTn id="10" fill="hold">
+                            <p:stCondLst>
+                              <p:cond delay="0"/>
+                            </p:stCondLst>
+                            <p:childTnLst>
+                              <p:par>
+                                <p:cTn id="11" presetID="2" presetClass="mediacall" presetSubtype="0" fill="hold" nodeType="clickEffect">
+                                  <p:stCondLst>
+                                    <p:cond delay="0"/>
+                                  </p:stCondLst>
+                                  <p:childTnLst>
+                                    <p:cmd type="call" cmd="togglePause">
+                                      <p:cBhvr>
+                                        <p:cTn id="12" dur="1" fill="hold"/>
+                                        <p:tgtEl>
+                                          <p:spTgt spid="4"/>
+                                        </p:tgtEl>
+                                      </p:cBhvr>
+                                    </p:cmd>
+                                  </p:childTnLst>
+                                </p:cTn>
+                              </p:par>
+                            </p:childTnLst>
+                          </p:cTn>
+                        </p:par>
+                      </p:childTnLst>
+                    </p:cTn>
+                  </p:par>
+                </p:childTnLst>
+              </p:cTn>
+              <p:nextCondLst>
+                <p:cond evt="onClick" delay="0">
+                  <p:tgtEl>
+                    <p:spTgt spid="4"/>
+                  </p:tgtEl>
+                </p:cond>
+              </p:nextCondLst>
+            </p:seq>
+          </p:childTnLst>
+        </p:cTn>
+      </p:par>
+    </p:tnLst>
+  </p:timing>
+</p:sld>
+</file>
+
+<file path=ppt/slides/slide11.xml><?xml version="1.0" encoding="utf-8"?>
+<p:sld xmlns:a="http://schemas.openxmlformats.org/drawingml/2006/main" xmlns:r="http://schemas.openxmlformats.org/officeDocument/2006/relationships" xmlns:p="http://schemas.openxmlformats.org/presentationml/2006/main">
+  <p:cSld>
+    <p:spTree>
+      <p:nvGrpSpPr>
+        <p:cNvPr id="1" name=""/>
+        <p:cNvGrpSpPr/>
+        <p:nvPr/>
+      </p:nvGrpSpPr>
+      <p:grpSpPr>
+        <a:xfrm>
+          <a:off x="0" y="0"/>
+          <a:ext cx="0" cy="0"/>
+          <a:chOff x="0" y="0"/>
+          <a:chExt cx="0" cy="0"/>
+        </a:xfrm>
+      </p:grpSpPr>
+      <p:sp>
+        <p:nvSpPr>
+          <p:cNvPr id="2" name="Titel 1">
+            <a:extLst>
+              <a:ext uri="{FF2B5EF4-FFF2-40B4-BE49-F238E27FC236}">
+                <a16:creationId xmlns:a16="http://schemas.microsoft.com/office/drawing/2014/main" id="{4871BB09-C0C3-4227-904D-7B575B664C81}"/>
+              </a:ext>
+            </a:extLst>
+          </p:cNvPr>
+          <p:cNvSpPr>
+            <a:spLocks noGrp="1"/>
+          </p:cNvSpPr>
+          <p:nvPr>
+            <p:ph type="title"/>
+          </p:nvPr>
+        </p:nvSpPr>
+        <p:spPr/>
+        <p:txBody>
+          <a:bodyPr/>
+          <a:lstStyle/>
+          <a:p>
+            <a:r>
+              <a:rPr lang="en-GB" dirty="0" err="1"/>
+              <a:t>Symboler</a:t>
+            </a:r>
+            <a:endParaRPr lang="LID4096" dirty="0"/>
+          </a:p>
+        </p:txBody>
+      </p:sp>
+      <p:sp>
+        <p:nvSpPr>
+          <p:cNvPr id="3" name="Pladsholder til indhold 2">
+            <a:extLst>
+              <a:ext uri="{FF2B5EF4-FFF2-40B4-BE49-F238E27FC236}">
+                <a16:creationId xmlns:a16="http://schemas.microsoft.com/office/drawing/2014/main" id="{F02D0880-EA49-4DC4-BE70-6B25B56C801D}"/>
+              </a:ext>
+            </a:extLst>
+          </p:cNvPr>
+          <p:cNvSpPr>
+            <a:spLocks noGrp="1"/>
+          </p:cNvSpPr>
+          <p:nvPr>
+            <p:ph idx="1"/>
+          </p:nvPr>
+        </p:nvSpPr>
+        <p:spPr/>
+        <p:txBody>
+          <a:bodyPr/>
+          <a:lstStyle/>
+          <a:p>
+            <a:r>
+              <a:rPr lang="en-GB" dirty="0"/>
+              <a:t>Power </a:t>
+            </a:r>
+            <a:r>
+              <a:rPr lang="en-GB" dirty="0" err="1"/>
+              <a:t>objekter</a:t>
+            </a:r>
+            <a:r>
+              <a:rPr lang="en-GB" dirty="0"/>
+              <a:t>/</a:t>
+            </a:r>
+            <a:r>
+              <a:rPr lang="en-GB" dirty="0" err="1"/>
+              <a:t>symboler</a:t>
+            </a:r>
+            <a:r>
+              <a:rPr lang="en-GB" dirty="0"/>
+              <a:t> [P]</a:t>
+            </a:r>
+          </a:p>
+          <a:p>
+            <a:r>
+              <a:rPr lang="en-GB" dirty="0" err="1"/>
+              <a:t>Hieraki</a:t>
+            </a:r>
+            <a:r>
+              <a:rPr lang="en-GB" dirty="0"/>
+              <a:t> </a:t>
+            </a:r>
+            <a:r>
+              <a:rPr lang="en-GB" dirty="0" err="1"/>
+              <a:t>porte</a:t>
+            </a:r>
+            <a:endParaRPr lang="en-GB" dirty="0"/>
+          </a:p>
+          <a:p>
+            <a:r>
+              <a:rPr lang="en-GB" dirty="0" err="1"/>
+              <a:t>Globale</a:t>
+            </a:r>
+            <a:r>
+              <a:rPr lang="en-GB" dirty="0"/>
+              <a:t> Nets</a:t>
+            </a:r>
+          </a:p>
+          <a:p>
+            <a:r>
+              <a:rPr lang="en-GB" dirty="0" err="1"/>
+              <a:t>Lokale</a:t>
+            </a:r>
+            <a:r>
+              <a:rPr lang="en-GB" dirty="0"/>
+              <a:t> Net</a:t>
+            </a:r>
+          </a:p>
+          <a:p>
+            <a:r>
+              <a:rPr lang="en-GB" dirty="0" err="1"/>
+              <a:t>Symboler</a:t>
+            </a:r>
+            <a:r>
+              <a:rPr lang="en-GB" dirty="0"/>
+              <a:t> </a:t>
+            </a:r>
+            <a:r>
+              <a:rPr lang="en-GB" dirty="0" err="1"/>
+              <a:t>repræsentere</a:t>
+            </a:r>
+            <a:r>
+              <a:rPr lang="en-GB" dirty="0"/>
+              <a:t> </a:t>
+            </a:r>
+            <a:r>
+              <a:rPr lang="en-GB" dirty="0" err="1"/>
+              <a:t>ikke</a:t>
+            </a:r>
+            <a:r>
+              <a:rPr lang="en-GB" dirty="0"/>
+              <a:t> </a:t>
+            </a:r>
+            <a:r>
+              <a:rPr lang="en-GB" dirty="0" err="1"/>
+              <a:t>komponeter</a:t>
+            </a:r>
+            <a:endParaRPr lang="LID4096" dirty="0"/>
+          </a:p>
+        </p:txBody>
+      </p:sp>
+    </p:spTree>
+    <p:extLst>
+      <p:ext uri="{BB962C8B-B14F-4D97-AF65-F5344CB8AC3E}">
+        <p14:creationId xmlns:p14="http://schemas.microsoft.com/office/powerpoint/2010/main" val="3057534901"/>
+      </p:ext>
+    </p:extLst>
+  </p:cSld>
+  <p:clrMapOvr>
+    <a:masterClrMapping/>
+  </p:clrMapOvr>
+</p:sld>
+</file>
+
+<file path=ppt/slides/slide12.xml><?xml version="1.0" encoding="utf-8"?>
+<p:sld xmlns:a="http://schemas.openxmlformats.org/drawingml/2006/main" xmlns:r="http://schemas.openxmlformats.org/officeDocument/2006/relationships" xmlns:p="http://schemas.openxmlformats.org/presentationml/2006/main">
+  <p:cSld>
+    <p:spTree>
+      <p:nvGrpSpPr>
+        <p:cNvPr id="1" name=""/>
+        <p:cNvGrpSpPr/>
+        <p:nvPr/>
+      </p:nvGrpSpPr>
+      <p:grpSpPr>
+        <a:xfrm>
+          <a:off x="0" y="0"/>
+          <a:ext cx="0" cy="0"/>
+          <a:chOff x="0" y="0"/>
+          <a:chExt cx="0" cy="0"/>
+        </a:xfrm>
+      </p:grpSpPr>
+      <p:pic>
+        <p:nvPicPr>
+          <p:cNvPr id="4" name="Onlinemedier 3" title="Symboler">
+            <a:hlinkClick r:id="" action="ppaction://media"/>
+            <a:extLst>
+              <a:ext uri="{FF2B5EF4-FFF2-40B4-BE49-F238E27FC236}">
+                <a16:creationId xmlns:a16="http://schemas.microsoft.com/office/drawing/2014/main" id="{A95AC4C7-4A9A-48AF-8C8E-FE23ABD5ED5A}"/>
+              </a:ext>
+            </a:extLst>
+          </p:cNvPr>
+          <p:cNvPicPr>
+            <a:picLocks noRot="1" noChangeAspect="1"/>
+          </p:cNvPicPr>
+          <p:nvPr>
+            <a:videoFile r:link="rId1"/>
+          </p:nvPr>
+        </p:nvPicPr>
+        <p:blipFill>
+          <a:blip r:embed="rId3"/>
+          <a:stretch>
+            <a:fillRect/>
+          </a:stretch>
+        </p:blipFill>
+        <p:spPr>
+          <a:xfrm>
+            <a:off x="0" y="0"/>
+            <a:ext cx="12138053" cy="6858000"/>
+          </a:xfrm>
+          <a:prstGeom prst="rect">
+            <a:avLst/>
+          </a:prstGeom>
+        </p:spPr>
+      </p:pic>
+    </p:spTree>
+    <p:extLst>
+      <p:ext uri="{BB962C8B-B14F-4D97-AF65-F5344CB8AC3E}">
+        <p14:creationId xmlns:p14="http://schemas.microsoft.com/office/powerpoint/2010/main" val="375173442"/>
+      </p:ext>
+    </p:extLst>
+  </p:cSld>
+  <p:clrMapOvr>
+    <a:masterClrMapping/>
+  </p:clrMapOvr>
+  <p:timing>
+    <p:tnLst>
+      <p:par>
+        <p:cTn id="1" dur="indefinite" restart="never" nodeType="tmRoot">
+          <p:childTnLst>
+            <p:seq concurrent="1" nextAc="seek">
+              <p:cTn id="2" dur="indefinite" nodeType="mainSeq">
+                <p:childTnLst>
+                  <p:par>
+                    <p:cTn id="3" fill="hold">
+                      <p:stCondLst>
+                        <p:cond delay="indefinite"/>
+                      </p:stCondLst>
+                      <p:childTnLst>
+                        <p:par>
+                          <p:cTn id="4" fill="hold">
+                            <p:stCondLst>
+                              <p:cond delay="0"/>
+                            </p:stCondLst>
+                            <p:childTnLst>
+                              <p:par>
+                                <p:cTn id="5" presetID="1" presetClass="mediacall" presetSubtype="0" fill="hold" nodeType="clickEffect">
+                                  <p:stCondLst>
+                                    <p:cond delay="0"/>
+                                  </p:stCondLst>
+                                  <p:childTnLst>
+                                    <p:cmd type="call" cmd="playFrom(0.0)">
+                                      <p:cBhvr>
+                                        <p:cTn id="6" dur="1" fill="hold"/>
+                                        <p:tgtEl>
+                                          <p:spTgt spid="4"/>
+                                        </p:tgtEl>
+                                      </p:cBhvr>
+                                    </p:cmd>
+                                  </p:childTnLst>
+                                </p:cTn>
+                              </p:par>
+                            </p:childTnLst>
+                          </p:cTn>
+                        </p:par>
+                      </p:childTnLst>
+                    </p:cTn>
+                  </p:par>
+                </p:childTnLst>
+              </p:cTn>
+              <p:prevCondLst>
+                <p:cond evt="onPrev" delay="0">
+                  <p:tgtEl>
+                    <p:sldTgt/>
+                  </p:tgtEl>
+                </p:cond>
+              </p:prevCondLst>
+              <p:nextCondLst>
+                <p:cond evt="onNext" delay="0">
+                  <p:tgtEl>
+                    <p:sldTgt/>
+                  </p:tgtEl>
+                </p:cond>
+              </p:nextCondLst>
+            </p:seq>
+            <p:video>
+              <p:cMediaNode vol="80000">
+                <p:cTn id="7" fill="hold" display="0">
+                  <p:stCondLst>
+                    <p:cond delay="indefinite"/>
+                  </p:stCondLst>
+                </p:cTn>
+                <p:tgtEl>
+                  <p:spTgt spid="4"/>
+                </p:tgtEl>
+              </p:cMediaNode>
+            </p:video>
+            <p:seq concurrent="1" nextAc="seek">
+              <p:cTn id="8" restart="whenNotActive" fill="hold" evtFilter="cancelBubble" nodeType="interactiveSeq">
+                <p:stCondLst>
+                  <p:cond evt="onClick" delay="0">
+                    <p:tgtEl>
+                      <p:spTgt spid="4"/>
+                    </p:tgtEl>
+                  </p:cond>
+                </p:stCondLst>
+                <p:endSync evt="end" delay="0">
+                  <p:rtn val="all"/>
+                </p:endSync>
+                <p:childTnLst>
+                  <p:par>
+                    <p:cTn id="9" fill="hold">
+                      <p:stCondLst>
+                        <p:cond delay="0"/>
+                      </p:stCondLst>
+                      <p:childTnLst>
+                        <p:par>
+                          <p:cTn id="10" fill="hold">
+                            <p:stCondLst>
+                              <p:cond delay="0"/>
+                            </p:stCondLst>
+                            <p:childTnLst>
+                              <p:par>
+                                <p:cTn id="11" presetID="2" presetClass="mediacall" presetSubtype="0" fill="hold" nodeType="clickEffect">
+                                  <p:stCondLst>
+                                    <p:cond delay="0"/>
+                                  </p:stCondLst>
+                                  <p:childTnLst>
+                                    <p:cmd type="call" cmd="togglePause">
+                                      <p:cBhvr>
+                                        <p:cTn id="12" dur="1" fill="hold"/>
+                                        <p:tgtEl>
+                                          <p:spTgt spid="4"/>
+                                        </p:tgtEl>
+                                      </p:cBhvr>
+                                    </p:cmd>
+                                  </p:childTnLst>
+                                </p:cTn>
+                              </p:par>
+                            </p:childTnLst>
+                          </p:cTn>
+                        </p:par>
+                      </p:childTnLst>
+                    </p:cTn>
+                  </p:par>
+                </p:childTnLst>
+              </p:cTn>
+              <p:nextCondLst>
+                <p:cond evt="onClick" delay="0">
+                  <p:tgtEl>
+                    <p:spTgt spid="4"/>
+                  </p:tgtEl>
+                </p:cond>
+              </p:nextCondLst>
+            </p:seq>
+          </p:childTnLst>
+        </p:cTn>
+      </p:par>
+    </p:tnLst>
+  </p:timing>
+</p:sld>
+</file>
+
+<file path=ppt/slides/slide13.xml><?xml version="1.0" encoding="utf-8"?>
+<p:sld xmlns:a="http://schemas.openxmlformats.org/drawingml/2006/main" xmlns:r="http://schemas.openxmlformats.org/officeDocument/2006/relationships" xmlns:p="http://schemas.openxmlformats.org/presentationml/2006/main">
+  <p:cSld>
+    <p:spTree>
+      <p:nvGrpSpPr>
+        <p:cNvPr id="1" name=""/>
+        <p:cNvGrpSpPr/>
+        <p:nvPr/>
+      </p:nvGrpSpPr>
+      <p:grpSpPr>
+        <a:xfrm>
+          <a:off x="0" y="0"/>
+          <a:ext cx="0" cy="0"/>
+          <a:chOff x="0" y="0"/>
+          <a:chExt cx="0" cy="0"/>
+        </a:xfrm>
+      </p:grpSpPr>
+      <p:sp>
+        <p:nvSpPr>
+          <p:cNvPr id="2" name="Titel 1">
+            <a:extLst>
+              <a:ext uri="{FF2B5EF4-FFF2-40B4-BE49-F238E27FC236}">
+                <a16:creationId xmlns:a16="http://schemas.microsoft.com/office/drawing/2014/main" id="{F8E74CE5-47E7-4B9A-BD58-06E5310234D7}"/>
+              </a:ext>
+            </a:extLst>
+          </p:cNvPr>
+          <p:cNvSpPr>
+            <a:spLocks noGrp="1"/>
+          </p:cNvSpPr>
+          <p:nvPr>
+            <p:ph type="title"/>
+          </p:nvPr>
+        </p:nvSpPr>
+        <p:spPr/>
+        <p:txBody>
+          <a:bodyPr/>
+          <a:lstStyle/>
+          <a:p>
+            <a:r>
+              <a:rPr lang="en-GB" dirty="0" err="1"/>
+              <a:t>Forbindelser</a:t>
+            </a:r>
+            <a:endParaRPr lang="LID4096" dirty="0"/>
+          </a:p>
+        </p:txBody>
+      </p:sp>
+      <p:sp>
+        <p:nvSpPr>
+          <p:cNvPr id="3" name="Pladsholder til indhold 2">
+            <a:extLst>
+              <a:ext uri="{FF2B5EF4-FFF2-40B4-BE49-F238E27FC236}">
+                <a16:creationId xmlns:a16="http://schemas.microsoft.com/office/drawing/2014/main" id="{5449F343-0D18-4E4C-B2DE-5A0AC83AA8B5}"/>
+              </a:ext>
+            </a:extLst>
+          </p:cNvPr>
+          <p:cNvSpPr>
+            <a:spLocks noGrp="1"/>
+          </p:cNvSpPr>
+          <p:nvPr>
+            <p:ph idx="1"/>
+          </p:nvPr>
+        </p:nvSpPr>
+        <p:spPr/>
+        <p:txBody>
+          <a:bodyPr/>
+          <a:lstStyle/>
+          <a:p>
+            <a:pPr marL="0" indent="0">
+              <a:buNone/>
+            </a:pPr>
+            <a:r>
+              <a:rPr lang="en-GB" dirty="0" err="1"/>
+              <a:t>Inden</a:t>
+            </a:r>
+            <a:r>
+              <a:rPr lang="en-GB" dirty="0"/>
+              <a:t> for same side </a:t>
+            </a:r>
+            <a:r>
+              <a:rPr lang="en-GB" dirty="0" err="1"/>
+              <a:t>kan</a:t>
+            </a:r>
+            <a:r>
+              <a:rPr lang="en-GB" dirty="0"/>
+              <a:t> </a:t>
+            </a:r>
+            <a:r>
+              <a:rPr lang="en-GB" dirty="0" err="1"/>
+              <a:t>komponenter</a:t>
+            </a:r>
+            <a:r>
+              <a:rPr lang="en-GB" dirty="0"/>
+              <a:t> </a:t>
+            </a:r>
+            <a:r>
+              <a:rPr lang="en-GB" dirty="0" err="1"/>
+              <a:t>forbindes</a:t>
+            </a:r>
+            <a:r>
+              <a:rPr lang="en-GB" dirty="0"/>
+              <a:t> </a:t>
+            </a:r>
+            <a:r>
+              <a:rPr lang="en-GB" dirty="0" err="1"/>
+              <a:t>på</a:t>
+            </a:r>
+            <a:r>
+              <a:rPr lang="en-GB" dirty="0"/>
+              <a:t> to </a:t>
+            </a:r>
+            <a:r>
+              <a:rPr lang="en-GB" dirty="0" err="1"/>
+              <a:t>måder</a:t>
+            </a:r>
+            <a:endParaRPr lang="en-GB" dirty="0"/>
+          </a:p>
+          <a:p>
+            <a:pPr lvl="1"/>
+            <a:r>
+              <a:rPr lang="en-GB" dirty="0" err="1"/>
+              <a:t>Forbindelse</a:t>
+            </a:r>
+            <a:r>
+              <a:rPr lang="en-GB" dirty="0"/>
+              <a:t> med wire [W]</a:t>
+            </a:r>
+          </a:p>
+          <a:p>
+            <a:pPr lvl="1"/>
+            <a:r>
+              <a:rPr lang="en-GB" dirty="0" err="1"/>
+              <a:t>Forbindelse</a:t>
+            </a:r>
+            <a:r>
+              <a:rPr lang="en-GB" dirty="0"/>
+              <a:t> med same </a:t>
+            </a:r>
+            <a:r>
+              <a:rPr lang="en-GB" dirty="0" err="1"/>
+              <a:t>netnavn</a:t>
+            </a:r>
+            <a:endParaRPr lang="en-GB" dirty="0"/>
+          </a:p>
+          <a:p>
+            <a:pPr marL="457200" lvl="1" indent="0">
+              <a:buNone/>
+            </a:pPr>
+            <a:endParaRPr lang="en-GB" dirty="0"/>
+          </a:p>
+          <a:p>
+            <a:pPr marL="457200" lvl="1" indent="0">
+              <a:buNone/>
+            </a:pPr>
+            <a:r>
+              <a:rPr lang="en-GB" dirty="0"/>
+              <a:t>Power </a:t>
+            </a:r>
+            <a:r>
+              <a:rPr lang="en-GB" dirty="0" err="1"/>
+              <a:t>forbindelse</a:t>
+            </a:r>
+            <a:r>
+              <a:rPr lang="en-GB" dirty="0"/>
+              <a:t> </a:t>
+            </a:r>
+            <a:r>
+              <a:rPr lang="en-GB" dirty="0" err="1"/>
+              <a:t>skabes</a:t>
+            </a:r>
+            <a:r>
+              <a:rPr lang="en-GB" dirty="0"/>
+              <a:t> </a:t>
+            </a:r>
+            <a:r>
+              <a:rPr lang="en-GB" dirty="0" err="1"/>
+              <a:t>vha</a:t>
+            </a:r>
+            <a:r>
+              <a:rPr lang="en-GB" dirty="0"/>
+              <a:t> </a:t>
+            </a:r>
+            <a:r>
+              <a:rPr lang="en-GB" dirty="0" err="1"/>
+              <a:t>navnet</a:t>
+            </a:r>
+            <a:r>
+              <a:rPr lang="en-GB" dirty="0"/>
+              <a:t> og </a:t>
+            </a:r>
+            <a:r>
+              <a:rPr lang="en-GB" dirty="0" err="1"/>
+              <a:t>ikke</a:t>
+            </a:r>
+            <a:r>
+              <a:rPr lang="en-GB" dirty="0"/>
+              <a:t> det </a:t>
+            </a:r>
+            <a:r>
+              <a:rPr lang="en-GB" dirty="0" err="1"/>
+              <a:t>grafiske</a:t>
+            </a:r>
+            <a:r>
+              <a:rPr lang="en-GB" dirty="0"/>
+              <a:t> </a:t>
+            </a:r>
+            <a:r>
+              <a:rPr lang="en-GB" dirty="0" err="1"/>
+              <a:t>udseende</a:t>
+            </a:r>
+            <a:endParaRPr lang="en-GB" dirty="0"/>
+          </a:p>
+        </p:txBody>
+      </p:sp>
+      <p:pic>
+        <p:nvPicPr>
+          <p:cNvPr id="5" name="Billede 4">
+            <a:extLst>
+              <a:ext uri="{FF2B5EF4-FFF2-40B4-BE49-F238E27FC236}">
+                <a16:creationId xmlns:a16="http://schemas.microsoft.com/office/drawing/2014/main" id="{54660B3F-F5DD-48E6-B341-A1B307861580}"/>
+              </a:ext>
+            </a:extLst>
+          </p:cNvPr>
+          <p:cNvPicPr>
+            <a:picLocks noChangeAspect="1"/>
+          </p:cNvPicPr>
+          <p:nvPr/>
+        </p:nvPicPr>
+        <p:blipFill>
+          <a:blip r:embed="rId2"/>
+          <a:stretch>
+            <a:fillRect/>
+          </a:stretch>
+        </p:blipFill>
+        <p:spPr>
+          <a:xfrm>
+            <a:off x="8565229" y="2015732"/>
+            <a:ext cx="3512890" cy="1629981"/>
+          </a:xfrm>
+          <a:prstGeom prst="rect">
+            <a:avLst/>
+          </a:prstGeom>
+        </p:spPr>
+      </p:pic>
+    </p:spTree>
+    <p:extLst>
+      <p:ext uri="{BB962C8B-B14F-4D97-AF65-F5344CB8AC3E}">
+        <p14:creationId xmlns:p14="http://schemas.microsoft.com/office/powerpoint/2010/main" val="1191913756"/>
+      </p:ext>
+    </p:extLst>
+  </p:cSld>
+  <p:clrMapOvr>
+    <a:masterClrMapping/>
+  </p:clrMapOvr>
+</p:sld>
+</file>
+
+<file path=ppt/slides/slide14.xml><?xml version="1.0" encoding="utf-8"?>
+<p:sld xmlns:a="http://schemas.openxmlformats.org/drawingml/2006/main" xmlns:r="http://schemas.openxmlformats.org/officeDocument/2006/relationships" xmlns:p="http://schemas.openxmlformats.org/presentationml/2006/main">
+  <p:cSld>
+    <p:spTree>
+      <p:nvGrpSpPr>
+        <p:cNvPr id="1" name=""/>
+        <p:cNvGrpSpPr/>
+        <p:nvPr/>
+      </p:nvGrpSpPr>
+      <p:grpSpPr>
+        <a:xfrm>
+          <a:off x="0" y="0"/>
+          <a:ext cx="0" cy="0"/>
+          <a:chOff x="0" y="0"/>
+          <a:chExt cx="0" cy="0"/>
+        </a:xfrm>
+      </p:grpSpPr>
+      <p:pic>
+        <p:nvPicPr>
+          <p:cNvPr id="4" name="Onlinemedier 3" title="forbindelser">
+            <a:hlinkClick r:id="" action="ppaction://media"/>
+            <a:extLst>
+              <a:ext uri="{FF2B5EF4-FFF2-40B4-BE49-F238E27FC236}">
+                <a16:creationId xmlns:a16="http://schemas.microsoft.com/office/drawing/2014/main" id="{9F22FA86-2869-4A9A-97FF-FD2BB648A585}"/>
+              </a:ext>
+            </a:extLst>
+          </p:cNvPr>
+          <p:cNvPicPr>
+            <a:picLocks noRot="1" noChangeAspect="1"/>
+          </p:cNvPicPr>
+          <p:nvPr>
+            <a:videoFile r:link="rId1"/>
+          </p:nvPr>
+        </p:nvPicPr>
+        <p:blipFill>
+          <a:blip r:embed="rId3"/>
+          <a:stretch>
+            <a:fillRect/>
+          </a:stretch>
+        </p:blipFill>
+        <p:spPr>
+          <a:xfrm>
+            <a:off x="0" y="0"/>
+            <a:ext cx="12138053" cy="6858000"/>
+          </a:xfrm>
+          <a:prstGeom prst="rect">
+            <a:avLst/>
+          </a:prstGeom>
+        </p:spPr>
+      </p:pic>
+    </p:spTree>
+    <p:extLst>
+      <p:ext uri="{BB962C8B-B14F-4D97-AF65-F5344CB8AC3E}">
+        <p14:creationId xmlns:p14="http://schemas.microsoft.com/office/powerpoint/2010/main" val="2633876436"/>
+      </p:ext>
+    </p:extLst>
+  </p:cSld>
+  <p:clrMapOvr>
+    <a:masterClrMapping/>
+  </p:clrMapOvr>
+  <p:timing>
+    <p:tnLst>
+      <p:par>
+        <p:cTn id="1" dur="indefinite" restart="never" nodeType="tmRoot">
+          <p:childTnLst>
+            <p:seq concurrent="1" nextAc="seek">
+              <p:cTn id="2" dur="indefinite" nodeType="mainSeq">
+                <p:childTnLst>
+                  <p:par>
+                    <p:cTn id="3" fill="hold">
+                      <p:stCondLst>
+                        <p:cond delay="indefinite"/>
+                      </p:stCondLst>
+                      <p:childTnLst>
+                        <p:par>
+                          <p:cTn id="4" fill="hold">
+                            <p:stCondLst>
+                              <p:cond delay="0"/>
+                            </p:stCondLst>
+                            <p:childTnLst>
+                              <p:par>
+                                <p:cTn id="5" presetID="1" presetClass="mediacall" presetSubtype="0" fill="hold" nodeType="clickEffect">
+                                  <p:stCondLst>
+                                    <p:cond delay="0"/>
+                                  </p:stCondLst>
+                                  <p:childTnLst>
+                                    <p:cmd type="call" cmd="playFrom(0.0)">
+                                      <p:cBhvr>
+                                        <p:cTn id="6" dur="1" fill="hold"/>
+                                        <p:tgtEl>
+                                          <p:spTgt spid="4"/>
+                                        </p:tgtEl>
+                                      </p:cBhvr>
+                                    </p:cmd>
+                                  </p:childTnLst>
+                                </p:cTn>
+                              </p:par>
+                            </p:childTnLst>
+                          </p:cTn>
+                        </p:par>
+                      </p:childTnLst>
+                    </p:cTn>
+                  </p:par>
+                </p:childTnLst>
+              </p:cTn>
+              <p:prevCondLst>
+                <p:cond evt="onPrev" delay="0">
+                  <p:tgtEl>
+                    <p:sldTgt/>
+                  </p:tgtEl>
+                </p:cond>
+              </p:prevCondLst>
+              <p:nextCondLst>
+                <p:cond evt="onNext" delay="0">
+                  <p:tgtEl>
+                    <p:sldTgt/>
+                  </p:tgtEl>
+                </p:cond>
+              </p:nextCondLst>
+            </p:seq>
+            <p:video>
+              <p:cMediaNode vol="80000">
+                <p:cTn id="7" fill="hold" display="0">
+                  <p:stCondLst>
+                    <p:cond delay="indefinite"/>
+                  </p:stCondLst>
+                </p:cTn>
+                <p:tgtEl>
+                  <p:spTgt spid="4"/>
+                </p:tgtEl>
+              </p:cMediaNode>
+            </p:video>
+            <p:seq concurrent="1" nextAc="seek">
+              <p:cTn id="8" restart="whenNotActive" fill="hold" evtFilter="cancelBubble" nodeType="interactiveSeq">
+                <p:stCondLst>
+                  <p:cond evt="onClick" delay="0">
+                    <p:tgtEl>
+                      <p:spTgt spid="4"/>
+                    </p:tgtEl>
+                  </p:cond>
+                </p:stCondLst>
+                <p:endSync evt="end" delay="0">
+                  <p:rtn val="all"/>
+                </p:endSync>
+                <p:childTnLst>
+                  <p:par>
+                    <p:cTn id="9" fill="hold">
+                      <p:stCondLst>
+                        <p:cond delay="0"/>
+                      </p:stCondLst>
+                      <p:childTnLst>
+                        <p:par>
+                          <p:cTn id="10" fill="hold">
+                            <p:stCondLst>
+                              <p:cond delay="0"/>
+                            </p:stCondLst>
+                            <p:childTnLst>
+                              <p:par>
+                                <p:cTn id="11" presetID="2" presetClass="mediacall" presetSubtype="0" fill="hold" nodeType="clickEffect">
+                                  <p:stCondLst>
+                                    <p:cond delay="0"/>
+                                  </p:stCondLst>
+                                  <p:childTnLst>
+                                    <p:cmd type="call" cmd="togglePause">
+                                      <p:cBhvr>
+                                        <p:cTn id="12" dur="1" fill="hold"/>
+                                        <p:tgtEl>
+                                          <p:spTgt spid="4"/>
+                                        </p:tgtEl>
+                                      </p:cBhvr>
+                                    </p:cmd>
+                                  </p:childTnLst>
+                                </p:cTn>
+                              </p:par>
+                            </p:childTnLst>
+                          </p:cTn>
+                        </p:par>
+                      </p:childTnLst>
+                    </p:cTn>
+                  </p:par>
+                </p:childTnLst>
+              </p:cTn>
+              <p:nextCondLst>
+                <p:cond evt="onClick" delay="0">
+                  <p:tgtEl>
+                    <p:spTgt spid="4"/>
+                  </p:tgtEl>
+                </p:cond>
+              </p:nextCondLst>
+            </p:seq>
+          </p:childTnLst>
+        </p:cTn>
+      </p:par>
+    </p:tnLst>
+  </p:timing>
+</p:sld>
+</file>
+
+<file path=ppt/slides/slide15.xml><?xml version="1.0" encoding="utf-8"?>
+<p:sld xmlns:a="http://schemas.openxmlformats.org/drawingml/2006/main" xmlns:r="http://schemas.openxmlformats.org/officeDocument/2006/relationships" xmlns:p="http://schemas.openxmlformats.org/presentationml/2006/main">
+  <p:cSld>
+    <p:spTree>
+      <p:nvGrpSpPr>
+        <p:cNvPr id="1" name=""/>
+        <p:cNvGrpSpPr/>
+        <p:nvPr/>
+      </p:nvGrpSpPr>
+      <p:grpSpPr>
+        <a:xfrm>
+          <a:off x="0" y="0"/>
+          <a:ext cx="0" cy="0"/>
+          <a:chOff x="0" y="0"/>
+          <a:chExt cx="0" cy="0"/>
+        </a:xfrm>
+      </p:grpSpPr>
       <p:sp>
         <p:nvSpPr>
           <p:cNvPr id="2" name="Titel 1">
@@ -12908,7 +13936,205 @@
 </p:sld>
 </file>
 
-<file path=ppt/slides/slide11.xml><?xml version="1.0" encoding="utf-8"?>
+<file path=ppt/slides/slide16.xml><?xml version="1.0" encoding="utf-8"?>
+<p:sld xmlns:a="http://schemas.openxmlformats.org/drawingml/2006/main" xmlns:r="http://schemas.openxmlformats.org/officeDocument/2006/relationships" xmlns:p="http://schemas.openxmlformats.org/presentationml/2006/main">
+  <p:cSld>
+    <p:spTree>
+      <p:nvGrpSpPr>
+        <p:cNvPr id="1" name=""/>
+        <p:cNvGrpSpPr/>
+        <p:nvPr/>
+      </p:nvGrpSpPr>
+      <p:grpSpPr>
+        <a:xfrm>
+          <a:off x="0" y="0"/>
+          <a:ext cx="0" cy="0"/>
+          <a:chOff x="0" y="0"/>
+          <a:chExt cx="0" cy="0"/>
+        </a:xfrm>
+      </p:grpSpPr>
+      <p:pic>
+        <p:nvPicPr>
+          <p:cNvPr id="4" name="Onlinemedier 3" title="Busser">
+            <a:hlinkClick r:id="" action="ppaction://media"/>
+            <a:extLst>
+              <a:ext uri="{FF2B5EF4-FFF2-40B4-BE49-F238E27FC236}">
+                <a16:creationId xmlns:a16="http://schemas.microsoft.com/office/drawing/2014/main" id="{4844C495-E83C-4A98-A19A-E0C2EE6A1413}"/>
+              </a:ext>
+            </a:extLst>
+          </p:cNvPr>
+          <p:cNvPicPr>
+            <a:picLocks noRot="1" noChangeAspect="1"/>
+          </p:cNvPicPr>
+          <p:nvPr>
+            <a:videoFile r:link="rId1"/>
+          </p:nvPr>
+        </p:nvPicPr>
+        <p:blipFill>
+          <a:blip r:embed="rId3"/>
+          <a:stretch>
+            <a:fillRect/>
+          </a:stretch>
+        </p:blipFill>
+        <p:spPr>
+          <a:xfrm>
+            <a:off x="0" y="0"/>
+            <a:ext cx="12138053" cy="6858000"/>
+          </a:xfrm>
+          <a:prstGeom prst="rect">
+            <a:avLst/>
+          </a:prstGeom>
+        </p:spPr>
+      </p:pic>
+    </p:spTree>
+    <p:extLst>
+      <p:ext uri="{BB962C8B-B14F-4D97-AF65-F5344CB8AC3E}">
+        <p14:creationId xmlns:p14="http://schemas.microsoft.com/office/powerpoint/2010/main" val="1588070662"/>
+      </p:ext>
+    </p:extLst>
+  </p:cSld>
+  <p:clrMapOvr>
+    <a:masterClrMapping/>
+  </p:clrMapOvr>
+  <p:timing>
+    <p:tnLst>
+      <p:par>
+        <p:cTn id="1" dur="indefinite" restart="never" nodeType="tmRoot">
+          <p:childTnLst>
+            <p:seq concurrent="1" nextAc="seek">
+              <p:cTn id="2" dur="indefinite" nodeType="mainSeq">
+                <p:childTnLst>
+                  <p:par>
+                    <p:cTn id="3" fill="hold">
+                      <p:stCondLst>
+                        <p:cond delay="indefinite"/>
+                      </p:stCondLst>
+                      <p:childTnLst>
+                        <p:par>
+                          <p:cTn id="4" fill="hold">
+                            <p:stCondLst>
+                              <p:cond delay="0"/>
+                            </p:stCondLst>
+                            <p:childTnLst>
+                              <p:par>
+                                <p:cTn id="5" presetID="1" presetClass="mediacall" presetSubtype="0" fill="hold" nodeType="clickEffect">
+                                  <p:stCondLst>
+                                    <p:cond delay="0"/>
+                                  </p:stCondLst>
+                                  <p:childTnLst>
+                                    <p:cmd type="call" cmd="playFrom(0.0)">
+                                      <p:cBhvr>
+                                        <p:cTn id="6" dur="1" fill="hold"/>
+                                        <p:tgtEl>
+                                          <p:spTgt spid="4"/>
+                                        </p:tgtEl>
+                                      </p:cBhvr>
+                                    </p:cmd>
+                                  </p:childTnLst>
+                                </p:cTn>
+                              </p:par>
+                            </p:childTnLst>
+                          </p:cTn>
+                        </p:par>
+                      </p:childTnLst>
+                    </p:cTn>
+                  </p:par>
+                </p:childTnLst>
+              </p:cTn>
+              <p:prevCondLst>
+                <p:cond evt="onPrev" delay="0">
+                  <p:tgtEl>
+                    <p:sldTgt/>
+                  </p:tgtEl>
+                </p:cond>
+              </p:prevCondLst>
+              <p:nextCondLst>
+                <p:cond evt="onNext" delay="0">
+                  <p:tgtEl>
+                    <p:sldTgt/>
+                  </p:tgtEl>
+                </p:cond>
+              </p:nextCondLst>
+            </p:seq>
+            <p:video>
+              <p:cMediaNode vol="80000">
+                <p:cTn id="7" fill="hold" display="0">
+                  <p:stCondLst>
+                    <p:cond delay="indefinite"/>
+                  </p:stCondLst>
+                </p:cTn>
+                <p:tgtEl>
+                  <p:spTgt spid="4"/>
+                </p:tgtEl>
+              </p:cMediaNode>
+            </p:video>
+            <p:seq concurrent="1" nextAc="seek">
+              <p:cTn id="8" restart="whenNotActive" fill="hold" evtFilter="cancelBubble" nodeType="interactiveSeq">
+                <p:stCondLst>
+                  <p:cond evt="onClick" delay="0">
+                    <p:tgtEl>
+                      <p:spTgt spid="4"/>
+                    </p:tgtEl>
+                  </p:cond>
+                </p:stCondLst>
+                <p:endSync evt="end" delay="0">
+                  <p:rtn val="all"/>
+                </p:endSync>
+                <p:childTnLst>
+                  <p:par>
+                    <p:cTn id="9" fill="hold">
+                      <p:stCondLst>
+                        <p:cond delay="0"/>
+                      </p:stCondLst>
+                      <p:childTnLst>
+                        <p:par>
+                          <p:cTn id="10" fill="hold">
+                            <p:stCondLst>
+                              <p:cond delay="0"/>
+                            </p:stCondLst>
+                            <p:childTnLst>
+                              <p:par>
+                                <p:cTn id="11" presetID="2" presetClass="mediacall" presetSubtype="0" fill="hold" nodeType="clickEffect">
+                                  <p:stCondLst>
+                                    <p:cond delay="0"/>
+                                  </p:stCondLst>
+                                  <p:childTnLst>
+                                    <p:cmd type="call" cmd="togglePause">
+                                      <p:cBhvr>
+                                        <p:cTn id="12" dur="1" fill="hold"/>
+                                        <p:tgtEl>
+                                          <p:spTgt spid="4"/>
+                                        </p:tgtEl>
+                                      </p:cBhvr>
+                                    </p:cmd>
+                                  </p:childTnLst>
+                                </p:cTn>
+                              </p:par>
+                            </p:childTnLst>
+                          </p:cTn>
+                        </p:par>
+                      </p:childTnLst>
+                    </p:cTn>
+                  </p:par>
+                </p:childTnLst>
+              </p:cTn>
+              <p:nextCondLst>
+                <p:cond evt="onClick" delay="0">
+                  <p:tgtEl>
+                    <p:spTgt spid="4"/>
+                  </p:tgtEl>
+                </p:cond>
+              </p:nextCondLst>
+            </p:seq>
+          </p:childTnLst>
+        </p:cTn>
+      </p:par>
+    </p:tnLst>
+  </p:timing>
+</p:sld>
+</file>
+
+<file path=ppt/slides/slide17.xml><?xml version="1.0" encoding="utf-8"?>
 <p:sld xmlns:a="http://schemas.openxmlformats.org/drawingml/2006/main" xmlns:r="http://schemas.openxmlformats.org/officeDocument/2006/relationships" xmlns:p="http://schemas.openxmlformats.org/presentationml/2006/main">
   <p:cSld>
     <p:spTree>
@@ -13064,7 +14290,205 @@
 </p:sld>
 </file>
 
-<file path=ppt/slides/slide12.xml><?xml version="1.0" encoding="utf-8"?>
+<file path=ppt/slides/slide18.xml><?xml version="1.0" encoding="utf-8"?>
+<p:sld xmlns:a="http://schemas.openxmlformats.org/drawingml/2006/main" xmlns:r="http://schemas.openxmlformats.org/officeDocument/2006/relationships" xmlns:p="http://schemas.openxmlformats.org/presentationml/2006/main">
+  <p:cSld>
+    <p:spTree>
+      <p:nvGrpSpPr>
+        <p:cNvPr id="1" name=""/>
+        <p:cNvGrpSpPr/>
+        <p:nvPr/>
+      </p:nvGrpSpPr>
+      <p:grpSpPr>
+        <a:xfrm>
+          <a:off x="0" y="0"/>
+          <a:ext cx="0" cy="0"/>
+          <a:chOff x="0" y="0"/>
+          <a:chExt cx="0" cy="0"/>
+        </a:xfrm>
+      </p:grpSpPr>
+      <p:pic>
+        <p:nvPicPr>
+          <p:cNvPr id="4" name="Onlinemedier 3" title="hierarkist sheet">
+            <a:hlinkClick r:id="" action="ppaction://media"/>
+            <a:extLst>
+              <a:ext uri="{FF2B5EF4-FFF2-40B4-BE49-F238E27FC236}">
+                <a16:creationId xmlns:a16="http://schemas.microsoft.com/office/drawing/2014/main" id="{72F195EF-0DAB-4011-AB3C-2A4E8DE9D937}"/>
+              </a:ext>
+            </a:extLst>
+          </p:cNvPr>
+          <p:cNvPicPr>
+            <a:picLocks noRot="1" noChangeAspect="1"/>
+          </p:cNvPicPr>
+          <p:nvPr>
+            <a:videoFile r:link="rId1"/>
+          </p:nvPr>
+        </p:nvPicPr>
+        <p:blipFill>
+          <a:blip r:embed="rId3"/>
+          <a:stretch>
+            <a:fillRect/>
+          </a:stretch>
+        </p:blipFill>
+        <p:spPr>
+          <a:xfrm>
+            <a:off x="0" y="0"/>
+            <a:ext cx="12138053" cy="6858000"/>
+          </a:xfrm>
+          <a:prstGeom prst="rect">
+            <a:avLst/>
+          </a:prstGeom>
+        </p:spPr>
+      </p:pic>
+    </p:spTree>
+    <p:extLst>
+      <p:ext uri="{BB962C8B-B14F-4D97-AF65-F5344CB8AC3E}">
+        <p14:creationId xmlns:p14="http://schemas.microsoft.com/office/powerpoint/2010/main" val="1736146848"/>
+      </p:ext>
+    </p:extLst>
+  </p:cSld>
+  <p:clrMapOvr>
+    <a:masterClrMapping/>
+  </p:clrMapOvr>
+  <p:timing>
+    <p:tnLst>
+      <p:par>
+        <p:cTn id="1" dur="indefinite" restart="never" nodeType="tmRoot">
+          <p:childTnLst>
+            <p:seq concurrent="1" nextAc="seek">
+              <p:cTn id="2" dur="indefinite" nodeType="mainSeq">
+                <p:childTnLst>
+                  <p:par>
+                    <p:cTn id="3" fill="hold">
+                      <p:stCondLst>
+                        <p:cond delay="indefinite"/>
+                      </p:stCondLst>
+                      <p:childTnLst>
+                        <p:par>
+                          <p:cTn id="4" fill="hold">
+                            <p:stCondLst>
+                              <p:cond delay="0"/>
+                            </p:stCondLst>
+                            <p:childTnLst>
+                              <p:par>
+                                <p:cTn id="5" presetID="1" presetClass="mediacall" presetSubtype="0" fill="hold" nodeType="clickEffect">
+                                  <p:stCondLst>
+                                    <p:cond delay="0"/>
+                                  </p:stCondLst>
+                                  <p:childTnLst>
+                                    <p:cmd type="call" cmd="playFrom(0.0)">
+                                      <p:cBhvr>
+                                        <p:cTn id="6" dur="1" fill="hold"/>
+                                        <p:tgtEl>
+                                          <p:spTgt spid="4"/>
+                                        </p:tgtEl>
+                                      </p:cBhvr>
+                                    </p:cmd>
+                                  </p:childTnLst>
+                                </p:cTn>
+                              </p:par>
+                            </p:childTnLst>
+                          </p:cTn>
+                        </p:par>
+                      </p:childTnLst>
+                    </p:cTn>
+                  </p:par>
+                </p:childTnLst>
+              </p:cTn>
+              <p:prevCondLst>
+                <p:cond evt="onPrev" delay="0">
+                  <p:tgtEl>
+                    <p:sldTgt/>
+                  </p:tgtEl>
+                </p:cond>
+              </p:prevCondLst>
+              <p:nextCondLst>
+                <p:cond evt="onNext" delay="0">
+                  <p:tgtEl>
+                    <p:sldTgt/>
+                  </p:tgtEl>
+                </p:cond>
+              </p:nextCondLst>
+            </p:seq>
+            <p:video>
+              <p:cMediaNode vol="80000">
+                <p:cTn id="7" fill="hold" display="0">
+                  <p:stCondLst>
+                    <p:cond delay="indefinite"/>
+                  </p:stCondLst>
+                </p:cTn>
+                <p:tgtEl>
+                  <p:spTgt spid="4"/>
+                </p:tgtEl>
+              </p:cMediaNode>
+            </p:video>
+            <p:seq concurrent="1" nextAc="seek">
+              <p:cTn id="8" restart="whenNotActive" fill="hold" evtFilter="cancelBubble" nodeType="interactiveSeq">
+                <p:stCondLst>
+                  <p:cond evt="onClick" delay="0">
+                    <p:tgtEl>
+                      <p:spTgt spid="4"/>
+                    </p:tgtEl>
+                  </p:cond>
+                </p:stCondLst>
+                <p:endSync evt="end" delay="0">
+                  <p:rtn val="all"/>
+                </p:endSync>
+                <p:childTnLst>
+                  <p:par>
+                    <p:cTn id="9" fill="hold">
+                      <p:stCondLst>
+                        <p:cond delay="0"/>
+                      </p:stCondLst>
+                      <p:childTnLst>
+                        <p:par>
+                          <p:cTn id="10" fill="hold">
+                            <p:stCondLst>
+                              <p:cond delay="0"/>
+                            </p:stCondLst>
+                            <p:childTnLst>
+                              <p:par>
+                                <p:cTn id="11" presetID="2" presetClass="mediacall" presetSubtype="0" fill="hold" nodeType="clickEffect">
+                                  <p:stCondLst>
+                                    <p:cond delay="0"/>
+                                  </p:stCondLst>
+                                  <p:childTnLst>
+                                    <p:cmd type="call" cmd="togglePause">
+                                      <p:cBhvr>
+                                        <p:cTn id="12" dur="1" fill="hold"/>
+                                        <p:tgtEl>
+                                          <p:spTgt spid="4"/>
+                                        </p:tgtEl>
+                                      </p:cBhvr>
+                                    </p:cmd>
+                                  </p:childTnLst>
+                                </p:cTn>
+                              </p:par>
+                            </p:childTnLst>
+                          </p:cTn>
+                        </p:par>
+                      </p:childTnLst>
+                    </p:cTn>
+                  </p:par>
+                </p:childTnLst>
+              </p:cTn>
+              <p:nextCondLst>
+                <p:cond evt="onClick" delay="0">
+                  <p:tgtEl>
+                    <p:spTgt spid="4"/>
+                  </p:tgtEl>
+                </p:cond>
+              </p:nextCondLst>
+            </p:seq>
+          </p:childTnLst>
+        </p:cTn>
+      </p:par>
+    </p:tnLst>
+  </p:timing>
+</p:sld>
+</file>
+
+<file path=ppt/slides/slide19.xml><?xml version="1.0" encoding="utf-8"?>
 <p:sld xmlns:a="http://schemas.openxmlformats.org/drawingml/2006/main" xmlns:r="http://schemas.openxmlformats.org/officeDocument/2006/relationships" xmlns:p="http://schemas.openxmlformats.org/presentationml/2006/main">
   <p:cSld>
     <p:spTree>
@@ -13155,405 +14579,6 @@
     <p:extLst>
       <p:ext uri="{BB962C8B-B14F-4D97-AF65-F5344CB8AC3E}">
         <p14:creationId xmlns:p14="http://schemas.microsoft.com/office/powerpoint/2010/main" val="4161413516"/>
-      </p:ext>
-    </p:extLst>
-  </p:cSld>
-  <p:clrMapOvr>
-    <a:masterClrMapping/>
-  </p:clrMapOvr>
-</p:sld>
-</file>
-
-<file path=ppt/slides/slide13.xml><?xml version="1.0" encoding="utf-8"?>
-<p:sld xmlns:a="http://schemas.openxmlformats.org/drawingml/2006/main" xmlns:r="http://schemas.openxmlformats.org/officeDocument/2006/relationships" xmlns:p="http://schemas.openxmlformats.org/presentationml/2006/main">
-  <p:cSld>
-    <p:spTree>
-      <p:nvGrpSpPr>
-        <p:cNvPr id="1" name=""/>
-        <p:cNvGrpSpPr/>
-        <p:nvPr/>
-      </p:nvGrpSpPr>
-      <p:grpSpPr>
-        <a:xfrm>
-          <a:off x="0" y="0"/>
-          <a:ext cx="0" cy="0"/>
-          <a:chOff x="0" y="0"/>
-          <a:chExt cx="0" cy="0"/>
-        </a:xfrm>
-      </p:grpSpPr>
-      <p:sp>
-        <p:nvSpPr>
-          <p:cNvPr id="2" name="Titel 1">
-            <a:extLst>
-              <a:ext uri="{FF2B5EF4-FFF2-40B4-BE49-F238E27FC236}">
-                <a16:creationId xmlns:a16="http://schemas.microsoft.com/office/drawing/2014/main" id="{61B4D18C-CC32-48FF-8E94-D56276EB4126}"/>
-              </a:ext>
-            </a:extLst>
-          </p:cNvPr>
-          <p:cNvSpPr>
-            <a:spLocks noGrp="1"/>
-          </p:cNvSpPr>
-          <p:nvPr>
-            <p:ph type="title"/>
-          </p:nvPr>
-        </p:nvSpPr>
-        <p:spPr/>
-        <p:txBody>
-          <a:bodyPr/>
-          <a:lstStyle/>
-          <a:p>
-            <a:r>
-              <a:rPr lang="en-GB" dirty="0"/>
-              <a:t>DRC</a:t>
-            </a:r>
-            <a:endParaRPr lang="LID4096" dirty="0"/>
-          </a:p>
-        </p:txBody>
-      </p:sp>
-      <p:sp>
-        <p:nvSpPr>
-          <p:cNvPr id="3" name="Pladsholder til indhold 2">
-            <a:extLst>
-              <a:ext uri="{FF2B5EF4-FFF2-40B4-BE49-F238E27FC236}">
-                <a16:creationId xmlns:a16="http://schemas.microsoft.com/office/drawing/2014/main" id="{AB3FAF0B-3728-4675-B360-C48385BDBE53}"/>
-              </a:ext>
-            </a:extLst>
-          </p:cNvPr>
-          <p:cNvSpPr>
-            <a:spLocks noGrp="1"/>
-          </p:cNvSpPr>
-          <p:nvPr>
-            <p:ph idx="1"/>
-          </p:nvPr>
-        </p:nvSpPr>
-        <p:spPr/>
-        <p:txBody>
-          <a:bodyPr/>
-          <a:lstStyle/>
-          <a:p>
-            <a:r>
-              <a:rPr lang="en-GB" dirty="0" err="1"/>
-              <a:t>Sikre</a:t>
-            </a:r>
-            <a:r>
-              <a:rPr lang="en-GB" dirty="0"/>
-              <a:t> at du nu </a:t>
-            </a:r>
-            <a:r>
-              <a:rPr lang="en-GB" dirty="0" err="1"/>
-              <a:t>mener</a:t>
-            </a:r>
-            <a:r>
-              <a:rPr lang="en-GB" dirty="0"/>
-              <a:t> det du har </a:t>
-            </a:r>
-            <a:r>
-              <a:rPr lang="en-GB" dirty="0" err="1"/>
-              <a:t>tegnet</a:t>
-            </a:r>
-            <a:endParaRPr lang="en-GB" dirty="0"/>
-          </a:p>
-          <a:p>
-            <a:r>
-              <a:rPr lang="en-GB" dirty="0" err="1"/>
-              <a:t>Undgå</a:t>
-            </a:r>
-            <a:r>
-              <a:rPr lang="en-GB" dirty="0"/>
-              <a:t> at </a:t>
-            </a:r>
-            <a:r>
-              <a:rPr lang="en-GB" dirty="0" err="1"/>
-              <a:t>overse</a:t>
-            </a:r>
-            <a:r>
-              <a:rPr lang="en-GB" dirty="0"/>
-              <a:t> input</a:t>
-            </a:r>
-            <a:endParaRPr lang="LID4096" dirty="0"/>
-          </a:p>
-        </p:txBody>
-      </p:sp>
-      <p:pic>
-        <p:nvPicPr>
-          <p:cNvPr id="5" name="Billede 4">
-            <a:extLst>
-              <a:ext uri="{FF2B5EF4-FFF2-40B4-BE49-F238E27FC236}">
-                <a16:creationId xmlns:a16="http://schemas.microsoft.com/office/drawing/2014/main" id="{81B29ACB-0C30-484E-A017-7D8BBF919720}"/>
-              </a:ext>
-            </a:extLst>
-          </p:cNvPr>
-          <p:cNvPicPr>
-            <a:picLocks noChangeAspect="1"/>
-          </p:cNvPicPr>
-          <p:nvPr/>
-        </p:nvPicPr>
-        <p:blipFill>
-          <a:blip r:embed="rId2"/>
-          <a:stretch>
-            <a:fillRect/>
-          </a:stretch>
-        </p:blipFill>
-        <p:spPr>
-          <a:xfrm>
-            <a:off x="6738103" y="2015732"/>
-            <a:ext cx="4316751" cy="2553515"/>
-          </a:xfrm>
-          <a:prstGeom prst="rect">
-            <a:avLst/>
-          </a:prstGeom>
-        </p:spPr>
-      </p:pic>
-    </p:spTree>
-    <p:extLst>
-      <p:ext uri="{BB962C8B-B14F-4D97-AF65-F5344CB8AC3E}">
-        <p14:creationId xmlns:p14="http://schemas.microsoft.com/office/powerpoint/2010/main" val="2216003879"/>
-      </p:ext>
-    </p:extLst>
-  </p:cSld>
-  <p:clrMapOvr>
-    <a:masterClrMapping/>
-  </p:clrMapOvr>
-</p:sld>
-</file>
-
-<file path=ppt/slides/slide14.xml><?xml version="1.0" encoding="utf-8"?>
-<p:sld xmlns:a="http://schemas.openxmlformats.org/drawingml/2006/main" xmlns:r="http://schemas.openxmlformats.org/officeDocument/2006/relationships" xmlns:p="http://schemas.openxmlformats.org/presentationml/2006/main">
-  <p:cSld>
-    <p:spTree>
-      <p:nvGrpSpPr>
-        <p:cNvPr id="1" name=""/>
-        <p:cNvGrpSpPr/>
-        <p:nvPr/>
-      </p:nvGrpSpPr>
-      <p:grpSpPr>
-        <a:xfrm>
-          <a:off x="0" y="0"/>
-          <a:ext cx="0" cy="0"/>
-          <a:chOff x="0" y="0"/>
-          <a:chExt cx="0" cy="0"/>
-        </a:xfrm>
-      </p:grpSpPr>
-      <p:sp>
-        <p:nvSpPr>
-          <p:cNvPr id="2" name="Titel 1">
-            <a:extLst>
-              <a:ext uri="{FF2B5EF4-FFF2-40B4-BE49-F238E27FC236}">
-                <a16:creationId xmlns:a16="http://schemas.microsoft.com/office/drawing/2014/main" id="{83E1EA1A-EDBC-444C-8488-C6AB29E2878C}"/>
-              </a:ext>
-            </a:extLst>
-          </p:cNvPr>
-          <p:cNvSpPr>
-            <a:spLocks noGrp="1"/>
-          </p:cNvSpPr>
-          <p:nvPr>
-            <p:ph type="title"/>
-          </p:nvPr>
-        </p:nvSpPr>
-        <p:spPr/>
-        <p:txBody>
-          <a:bodyPr/>
-          <a:lstStyle/>
-          <a:p>
-            <a:r>
-              <a:rPr lang="en-GB" dirty="0"/>
-              <a:t>Lib </a:t>
-            </a:r>
-            <a:r>
-              <a:rPr lang="en-GB" dirty="0" err="1"/>
-              <a:t>Symboler</a:t>
-            </a:r>
-            <a:endParaRPr lang="LID4096" dirty="0"/>
-          </a:p>
-        </p:txBody>
-      </p:sp>
-      <p:sp>
-        <p:nvSpPr>
-          <p:cNvPr id="3" name="Pladsholder til indhold 2">
-            <a:extLst>
-              <a:ext uri="{FF2B5EF4-FFF2-40B4-BE49-F238E27FC236}">
-                <a16:creationId xmlns:a16="http://schemas.microsoft.com/office/drawing/2014/main" id="{52B543CC-1729-45D5-83D7-9983FC4F0CCC}"/>
-              </a:ext>
-            </a:extLst>
-          </p:cNvPr>
-          <p:cNvSpPr>
-            <a:spLocks noGrp="1"/>
-          </p:cNvSpPr>
-          <p:nvPr>
-            <p:ph idx="1"/>
-          </p:nvPr>
-        </p:nvSpPr>
-        <p:spPr/>
-        <p:txBody>
-          <a:bodyPr/>
-          <a:lstStyle/>
-          <a:p>
-            <a:r>
-              <a:rPr lang="en-GB" dirty="0"/>
-              <a:t>Lib Editor</a:t>
-            </a:r>
-          </a:p>
-          <a:p>
-            <a:endParaRPr lang="LID4096" dirty="0"/>
-          </a:p>
-        </p:txBody>
-      </p:sp>
-    </p:spTree>
-    <p:extLst>
-      <p:ext uri="{BB962C8B-B14F-4D97-AF65-F5344CB8AC3E}">
-        <p14:creationId xmlns:p14="http://schemas.microsoft.com/office/powerpoint/2010/main" val="3008959822"/>
-      </p:ext>
-    </p:extLst>
-  </p:cSld>
-  <p:clrMapOvr>
-    <a:masterClrMapping/>
-  </p:clrMapOvr>
-</p:sld>
-</file>
-
-<file path=ppt/slides/slide15.xml><?xml version="1.0" encoding="utf-8"?>
-<p:sld xmlns:a="http://schemas.openxmlformats.org/drawingml/2006/main" xmlns:r="http://schemas.openxmlformats.org/officeDocument/2006/relationships" xmlns:p="http://schemas.openxmlformats.org/presentationml/2006/main">
-  <p:cSld>
-    <p:spTree>
-      <p:nvGrpSpPr>
-        <p:cNvPr id="1" name=""/>
-        <p:cNvGrpSpPr/>
-        <p:nvPr/>
-      </p:nvGrpSpPr>
-      <p:grpSpPr>
-        <a:xfrm>
-          <a:off x="0" y="0"/>
-          <a:ext cx="0" cy="0"/>
-          <a:chOff x="0" y="0"/>
-          <a:chExt cx="0" cy="0"/>
-        </a:xfrm>
-      </p:grpSpPr>
-      <p:sp>
-        <p:nvSpPr>
-          <p:cNvPr id="2" name="Titel 1">
-            <a:extLst>
-              <a:ext uri="{FF2B5EF4-FFF2-40B4-BE49-F238E27FC236}">
-                <a16:creationId xmlns:a16="http://schemas.microsoft.com/office/drawing/2014/main" id="{A1F6D4CF-4F5F-4DE1-B0B0-B5CF818241EA}"/>
-              </a:ext>
-            </a:extLst>
-          </p:cNvPr>
-          <p:cNvSpPr>
-            <a:spLocks noGrp="1"/>
-          </p:cNvSpPr>
-          <p:nvPr>
-            <p:ph type="title"/>
-          </p:nvPr>
-        </p:nvSpPr>
-        <p:spPr/>
-        <p:txBody>
-          <a:bodyPr/>
-          <a:lstStyle/>
-          <a:p>
-            <a:r>
-              <a:rPr lang="en-GB" dirty="0"/>
-              <a:t>Test Diagram</a:t>
-            </a:r>
-            <a:endParaRPr lang="LID4096" dirty="0"/>
-          </a:p>
-        </p:txBody>
-      </p:sp>
-      <p:sp>
-        <p:nvSpPr>
-          <p:cNvPr id="3" name="Pladsholder til indhold 2">
-            <a:extLst>
-              <a:ext uri="{FF2B5EF4-FFF2-40B4-BE49-F238E27FC236}">
-                <a16:creationId xmlns:a16="http://schemas.microsoft.com/office/drawing/2014/main" id="{A6DCB2BA-6341-48A6-AB9C-8829A43DCBAC}"/>
-              </a:ext>
-            </a:extLst>
-          </p:cNvPr>
-          <p:cNvSpPr>
-            <a:spLocks noGrp="1"/>
-          </p:cNvSpPr>
-          <p:nvPr>
-            <p:ph idx="1"/>
-          </p:nvPr>
-        </p:nvSpPr>
-        <p:spPr/>
-        <p:txBody>
-          <a:bodyPr/>
-          <a:lstStyle/>
-          <a:p>
-            <a:r>
-              <a:rPr lang="en-GB" dirty="0"/>
-              <a:t>Vi laver et schematic project </a:t>
-            </a:r>
-            <a:r>
-              <a:rPr lang="en-GB" dirty="0" err="1"/>
-              <a:t>fra</a:t>
-            </a:r>
-            <a:r>
-              <a:rPr lang="en-GB" dirty="0"/>
-              <a:t> </a:t>
-            </a:r>
-            <a:r>
-              <a:rPr lang="en-GB" dirty="0" err="1"/>
-              <a:t>bunnden</a:t>
-            </a:r>
-            <a:r>
-              <a:rPr lang="en-GB" dirty="0"/>
-              <a:t>.</a:t>
-            </a:r>
-            <a:endParaRPr lang="LID4096" dirty="0"/>
-          </a:p>
-        </p:txBody>
-      </p:sp>
-      <p:sp>
-        <p:nvSpPr>
-          <p:cNvPr id="4" name="Rektangel 3">
-            <a:extLst>
-              <a:ext uri="{FF2B5EF4-FFF2-40B4-BE49-F238E27FC236}">
-                <a16:creationId xmlns:a16="http://schemas.microsoft.com/office/drawing/2014/main" id="{D275B53F-31E2-4FD4-BD0B-8F3821B241EF}"/>
-              </a:ext>
-            </a:extLst>
-          </p:cNvPr>
-          <p:cNvSpPr/>
-          <p:nvPr/>
-        </p:nvSpPr>
-        <p:spPr>
-          <a:xfrm rot="18393043">
-            <a:off x="5815468" y="2628765"/>
-            <a:ext cx="7226787" cy="923330"/>
-          </a:xfrm>
-          <a:prstGeom prst="rect">
-            <a:avLst/>
-          </a:prstGeom>
-          <a:noFill/>
-        </p:spPr>
-        <p:txBody>
-          <a:bodyPr wrap="none" lIns="91440" tIns="45720" rIns="91440" bIns="45720">
-            <a:spAutoFit/>
-          </a:bodyPr>
-          <a:lstStyle/>
-          <a:p>
-            <a:pPr algn="ctr"/>
-            <a:r>
-              <a:rPr lang="da-DK" sz="5400" b="0" cap="none" spc="0" dirty="0">
-                <a:ln w="0"/>
-                <a:solidFill>
-                  <a:schemeClr val="accent1"/>
-                </a:solidFill>
-                <a:effectLst>
-                  <a:outerShdw blurRad="38100" dist="25400" dir="5400000" algn="ctr" rotWithShape="0">
-                    <a:srgbClr val="6E747A">
-                      <a:alpha val="43000"/>
-                    </a:srgbClr>
-                  </a:outerShdw>
-                </a:effectLst>
-              </a:rPr>
-              <a:t>Opgave: Lav et nyt design</a:t>
-            </a:r>
-          </a:p>
-        </p:txBody>
-      </p:sp>
-    </p:spTree>
-    <p:extLst>
-      <p:ext uri="{BB962C8B-B14F-4D97-AF65-F5344CB8AC3E}">
-        <p14:creationId xmlns:p14="http://schemas.microsoft.com/office/powerpoint/2010/main" val="319711383"/>
       </p:ext>
     </p:extLst>
   </p:cSld>
@@ -13729,7 +14754,7 @@
             </a:ln>
             <a:extLst>
               <a:ext uri="{91240B29-F687-4f45-9708-019B960494DF}">
-                <a14:hiddenLine xmlns:a14="http://schemas.microsoft.com/office/drawing/2010/main" xmlns:p14="http://schemas.microsoft.com/office/powerpoint/2010/main" xmlns:a16="http://schemas.microsoft.com/office/drawing/2014/main" xmlns="" w="9525">
+                <a14:hiddenLine xmlns="" xmlns:a16="http://schemas.microsoft.com/office/drawing/2014/main" xmlns:p14="http://schemas.microsoft.com/office/powerpoint/2010/main" xmlns:a14="http://schemas.microsoft.com/office/drawing/2010/main" w="9525">
                   <a:solidFill>
                     <a:srgbClr val="000000"/>
                   </a:solidFill>
@@ -13834,7 +14859,7 @@
             </a:ln>
             <a:extLst>
               <a:ext uri="{91240B29-F687-4f45-9708-019B960494DF}">
-                <a14:hiddenLine xmlns:a14="http://schemas.microsoft.com/office/drawing/2010/main" xmlns:p14="http://schemas.microsoft.com/office/powerpoint/2010/main" xmlns:a16="http://schemas.microsoft.com/office/drawing/2014/main" xmlns="" w="9525">
+                <a14:hiddenLine xmlns="" xmlns:a16="http://schemas.microsoft.com/office/drawing/2014/main" xmlns:p14="http://schemas.microsoft.com/office/powerpoint/2010/main" xmlns:a14="http://schemas.microsoft.com/office/drawing/2010/main" w="9525">
                   <a:solidFill>
                     <a:srgbClr val="000000"/>
                   </a:solidFill>
@@ -13939,7 +14964,7 @@
             </a:ln>
             <a:extLst>
               <a:ext uri="{91240B29-F687-4f45-9708-019B960494DF}">
-                <a14:hiddenLine xmlns:a14="http://schemas.microsoft.com/office/drawing/2010/main" xmlns:p14="http://schemas.microsoft.com/office/powerpoint/2010/main" xmlns:a16="http://schemas.microsoft.com/office/drawing/2014/main" xmlns="" w="9525">
+                <a14:hiddenLine xmlns="" xmlns:a16="http://schemas.microsoft.com/office/drawing/2014/main" xmlns:p14="http://schemas.microsoft.com/office/powerpoint/2010/main" xmlns:a14="http://schemas.microsoft.com/office/drawing/2010/main" w="9525">
                   <a:solidFill>
                     <a:srgbClr val="000000"/>
                   </a:solidFill>
@@ -14016,7 +15041,7 @@
             </a:ln>
             <a:extLst>
               <a:ext uri="{91240B29-F687-4f45-9708-019B960494DF}">
-                <a14:hiddenLine xmlns:a14="http://schemas.microsoft.com/office/drawing/2010/main" xmlns:p14="http://schemas.microsoft.com/office/powerpoint/2010/main" xmlns:a16="http://schemas.microsoft.com/office/drawing/2014/main" xmlns="" w="9525">
+                <a14:hiddenLine xmlns="" xmlns:a16="http://schemas.microsoft.com/office/drawing/2014/main" xmlns:p14="http://schemas.microsoft.com/office/powerpoint/2010/main" xmlns:a14="http://schemas.microsoft.com/office/drawing/2010/main" w="9525">
                   <a:solidFill>
                     <a:srgbClr val="000000"/>
                   </a:solidFill>
@@ -14121,7 +15146,7 @@
             </a:ln>
             <a:extLst>
               <a:ext uri="{91240B29-F687-4f45-9708-019B960494DF}">
-                <a14:hiddenLine xmlns:a14="http://schemas.microsoft.com/office/drawing/2010/main" xmlns:p14="http://schemas.microsoft.com/office/powerpoint/2010/main" xmlns:a16="http://schemas.microsoft.com/office/drawing/2014/main" xmlns="" w="9525">
+                <a14:hiddenLine xmlns="" xmlns:a16="http://schemas.microsoft.com/office/drawing/2014/main" xmlns:p14="http://schemas.microsoft.com/office/powerpoint/2010/main" xmlns:a14="http://schemas.microsoft.com/office/drawing/2010/main" w="9525">
                   <a:solidFill>
                     <a:srgbClr val="000000"/>
                   </a:solidFill>
@@ -14198,7 +15223,7 @@
             </a:ln>
             <a:extLst>
               <a:ext uri="{91240B29-F687-4f45-9708-019B960494DF}">
-                <a14:hiddenLine xmlns:a14="http://schemas.microsoft.com/office/drawing/2010/main" xmlns:p14="http://schemas.microsoft.com/office/powerpoint/2010/main" xmlns:a16="http://schemas.microsoft.com/office/drawing/2014/main" xmlns="" w="9525">
+                <a14:hiddenLine xmlns="" xmlns:a16="http://schemas.microsoft.com/office/drawing/2014/main" xmlns:p14="http://schemas.microsoft.com/office/powerpoint/2010/main" xmlns:a14="http://schemas.microsoft.com/office/drawing/2010/main" w="9525">
                   <a:solidFill>
                     <a:srgbClr val="000000"/>
                   </a:solidFill>
@@ -14275,7 +15300,7 @@
             </a:ln>
             <a:extLst>
               <a:ext uri="{91240B29-F687-4f45-9708-019B960494DF}">
-                <a14:hiddenLine xmlns:a14="http://schemas.microsoft.com/office/drawing/2010/main" xmlns:p14="http://schemas.microsoft.com/office/powerpoint/2010/main" xmlns:a16="http://schemas.microsoft.com/office/drawing/2014/main" xmlns="" w="9525">
+                <a14:hiddenLine xmlns="" xmlns:a16="http://schemas.microsoft.com/office/drawing/2014/main" xmlns:p14="http://schemas.microsoft.com/office/powerpoint/2010/main" xmlns:a14="http://schemas.microsoft.com/office/drawing/2010/main" w="9525">
                   <a:solidFill>
                     <a:srgbClr val="000000"/>
                   </a:solidFill>
@@ -14380,7 +15405,7 @@
             </a:ln>
             <a:extLst>
               <a:ext uri="{91240B29-F687-4f45-9708-019B960494DF}">
-                <a14:hiddenLine xmlns:a14="http://schemas.microsoft.com/office/drawing/2010/main" xmlns:p14="http://schemas.microsoft.com/office/powerpoint/2010/main" xmlns:a16="http://schemas.microsoft.com/office/drawing/2014/main" xmlns="" w="9525">
+                <a14:hiddenLine xmlns="" xmlns:a16="http://schemas.microsoft.com/office/drawing/2014/main" xmlns:p14="http://schemas.microsoft.com/office/powerpoint/2010/main" xmlns:a14="http://schemas.microsoft.com/office/drawing/2010/main" w="9525">
                   <a:solidFill>
                     <a:srgbClr val="000000"/>
                   </a:solidFill>
@@ -14485,7 +15510,7 @@
             </a:ln>
             <a:extLst>
               <a:ext uri="{91240B29-F687-4f45-9708-019B960494DF}">
-                <a14:hiddenLine xmlns:a14="http://schemas.microsoft.com/office/drawing/2010/main" xmlns:p14="http://schemas.microsoft.com/office/powerpoint/2010/main" xmlns:a16="http://schemas.microsoft.com/office/drawing/2014/main" xmlns="" w="9525">
+                <a14:hiddenLine xmlns="" xmlns:a16="http://schemas.microsoft.com/office/drawing/2014/main" xmlns:p14="http://schemas.microsoft.com/office/powerpoint/2010/main" xmlns:a14="http://schemas.microsoft.com/office/drawing/2010/main" w="9525">
                   <a:solidFill>
                     <a:srgbClr val="000000"/>
                   </a:solidFill>
@@ -14562,7 +15587,7 @@
             </a:ln>
             <a:extLst>
               <a:ext uri="{91240B29-F687-4f45-9708-019B960494DF}">
-                <a14:hiddenLine xmlns:a14="http://schemas.microsoft.com/office/drawing/2010/main" xmlns:p14="http://schemas.microsoft.com/office/powerpoint/2010/main" xmlns:a16="http://schemas.microsoft.com/office/drawing/2014/main" xmlns="" w="9525">
+                <a14:hiddenLine xmlns="" xmlns:a16="http://schemas.microsoft.com/office/drawing/2014/main" xmlns:p14="http://schemas.microsoft.com/office/powerpoint/2010/main" xmlns:a14="http://schemas.microsoft.com/office/drawing/2010/main" w="9525">
                   <a:solidFill>
                     <a:srgbClr val="000000"/>
                   </a:solidFill>
@@ -14687,7 +15712,7 @@
             </a:ln>
             <a:extLst>
               <a:ext uri="{91240B29-F687-4f45-9708-019B960494DF}">
-                <a14:hiddenLine xmlns:a14="http://schemas.microsoft.com/office/drawing/2010/main" xmlns:p14="http://schemas.microsoft.com/office/powerpoint/2010/main" xmlns:a16="http://schemas.microsoft.com/office/drawing/2014/main" xmlns="" w="9525">
+                <a14:hiddenLine xmlns="" xmlns:a16="http://schemas.microsoft.com/office/drawing/2014/main" xmlns:p14="http://schemas.microsoft.com/office/powerpoint/2010/main" xmlns:a14="http://schemas.microsoft.com/office/drawing/2010/main" w="9525">
                   <a:solidFill>
                     <a:srgbClr val="000000"/>
                   </a:solidFill>
@@ -14801,7 +15826,7 @@
             </a:ln>
             <a:extLst>
               <a:ext uri="{91240B29-F687-4f45-9708-019B960494DF}">
-                <a14:hiddenLine xmlns:a14="http://schemas.microsoft.com/office/drawing/2010/main" xmlns:p14="http://schemas.microsoft.com/office/powerpoint/2010/main" xmlns:a16="http://schemas.microsoft.com/office/drawing/2014/main" xmlns="" w="9525">
+                <a14:hiddenLine xmlns="" xmlns:a16="http://schemas.microsoft.com/office/drawing/2014/main" xmlns:p14="http://schemas.microsoft.com/office/powerpoint/2010/main" xmlns:a14="http://schemas.microsoft.com/office/drawing/2010/main" w="9525">
                   <a:solidFill>
                     <a:srgbClr val="000000"/>
                   </a:solidFill>
@@ -14878,7 +15903,7 @@
             </a:ln>
             <a:extLst>
               <a:ext uri="{91240B29-F687-4f45-9708-019B960494DF}">
-                <a14:hiddenLine xmlns:a14="http://schemas.microsoft.com/office/drawing/2010/main" xmlns:p14="http://schemas.microsoft.com/office/powerpoint/2010/main" xmlns:a16="http://schemas.microsoft.com/office/drawing/2014/main" xmlns="" w="9525">
+                <a14:hiddenLine xmlns="" xmlns:a16="http://schemas.microsoft.com/office/drawing/2014/main" xmlns:p14="http://schemas.microsoft.com/office/powerpoint/2010/main" xmlns:a14="http://schemas.microsoft.com/office/drawing/2010/main" w="9525">
                   <a:solidFill>
                     <a:srgbClr val="000000"/>
                   </a:solidFill>
@@ -14955,7 +15980,7 @@
             </a:ln>
             <a:extLst>
               <a:ext uri="{91240B29-F687-4f45-9708-019B960494DF}">
-                <a14:hiddenLine xmlns:a14="http://schemas.microsoft.com/office/drawing/2010/main" xmlns:p14="http://schemas.microsoft.com/office/powerpoint/2010/main" xmlns:a16="http://schemas.microsoft.com/office/drawing/2014/main" xmlns="" w="9525">
+                <a14:hiddenLine xmlns="" xmlns:a16="http://schemas.microsoft.com/office/drawing/2014/main" xmlns:p14="http://schemas.microsoft.com/office/powerpoint/2010/main" xmlns:a14="http://schemas.microsoft.com/office/drawing/2010/main" w="9525">
                   <a:solidFill>
                     <a:srgbClr val="000000"/>
                   </a:solidFill>
@@ -15060,7 +16085,7 @@
             </a:ln>
             <a:extLst>
               <a:ext uri="{91240B29-F687-4f45-9708-019B960494DF}">
-                <a14:hiddenLine xmlns:a14="http://schemas.microsoft.com/office/drawing/2010/main" xmlns:p14="http://schemas.microsoft.com/office/powerpoint/2010/main" xmlns:a16="http://schemas.microsoft.com/office/drawing/2014/main" xmlns="" w="9525">
+                <a14:hiddenLine xmlns="" xmlns:a16="http://schemas.microsoft.com/office/drawing/2014/main" xmlns:p14="http://schemas.microsoft.com/office/powerpoint/2010/main" xmlns:a14="http://schemas.microsoft.com/office/drawing/2010/main" w="9525">
                   <a:solidFill>
                     <a:srgbClr val="000000"/>
                   </a:solidFill>
@@ -15109,7 +16134,7 @@
             </a:ln>
             <a:extLst>
               <a:ext uri="{91240B29-F687-4f45-9708-019B960494DF}">
-                <a14:hiddenLine xmlns:a14="http://schemas.microsoft.com/office/drawing/2010/main" xmlns:p14="http://schemas.microsoft.com/office/powerpoint/2010/main" xmlns:a16="http://schemas.microsoft.com/office/drawing/2014/main" xmlns="" w="9525">
+                <a14:hiddenLine xmlns="" xmlns:a16="http://schemas.microsoft.com/office/drawing/2014/main" xmlns:p14="http://schemas.microsoft.com/office/powerpoint/2010/main" xmlns:a14="http://schemas.microsoft.com/office/drawing/2010/main" w="9525">
                   <a:solidFill>
                     <a:srgbClr val="000000"/>
                   </a:solidFill>
@@ -15189,7 +16214,7 @@
             </a:ln>
             <a:extLst>
               <a:ext uri="{91240B29-F687-4f45-9708-019B960494DF}">
-                <a14:hiddenLine xmlns:a14="http://schemas.microsoft.com/office/drawing/2010/main" xmlns:p14="http://schemas.microsoft.com/office/powerpoint/2010/main" xmlns:a16="http://schemas.microsoft.com/office/drawing/2014/main" xmlns="" w="9525">
+                <a14:hiddenLine xmlns="" xmlns:a16="http://schemas.microsoft.com/office/drawing/2014/main" xmlns:p14="http://schemas.microsoft.com/office/powerpoint/2010/main" xmlns:a14="http://schemas.microsoft.com/office/drawing/2010/main" w="9525">
                   <a:solidFill>
                     <a:srgbClr val="000000"/>
                   </a:solidFill>
@@ -15294,7 +16319,7 @@
             </a:ln>
             <a:extLst>
               <a:ext uri="{91240B29-F687-4f45-9708-019B960494DF}">
-                <a14:hiddenLine xmlns:a14="http://schemas.microsoft.com/office/drawing/2010/main" xmlns:p14="http://schemas.microsoft.com/office/powerpoint/2010/main" xmlns:a16="http://schemas.microsoft.com/office/drawing/2014/main" xmlns="" w="9525">
+                <a14:hiddenLine xmlns="" xmlns:a16="http://schemas.microsoft.com/office/drawing/2014/main" xmlns:p14="http://schemas.microsoft.com/office/powerpoint/2010/main" xmlns:a14="http://schemas.microsoft.com/office/drawing/2010/main" w="9525">
                   <a:solidFill>
                     <a:srgbClr val="000000"/>
                   </a:solidFill>
@@ -15371,7 +16396,7 @@
             </a:ln>
             <a:extLst>
               <a:ext uri="{91240B29-F687-4f45-9708-019B960494DF}">
-                <a14:hiddenLine xmlns:a14="http://schemas.microsoft.com/office/drawing/2010/main" xmlns:p14="http://schemas.microsoft.com/office/powerpoint/2010/main" xmlns:a16="http://schemas.microsoft.com/office/drawing/2014/main" xmlns="" w="9525">
+                <a14:hiddenLine xmlns="" xmlns:a16="http://schemas.microsoft.com/office/drawing/2014/main" xmlns:p14="http://schemas.microsoft.com/office/powerpoint/2010/main" xmlns:a14="http://schemas.microsoft.com/office/drawing/2010/main" w="9525">
                   <a:solidFill>
                     <a:srgbClr val="000000"/>
                   </a:solidFill>
@@ -15476,7 +16501,7 @@
             </a:ln>
             <a:extLst>
               <a:ext uri="{91240B29-F687-4f45-9708-019B960494DF}">
-                <a14:hiddenLine xmlns:a14="http://schemas.microsoft.com/office/drawing/2010/main" xmlns:p14="http://schemas.microsoft.com/office/powerpoint/2010/main" xmlns:a16="http://schemas.microsoft.com/office/drawing/2014/main" xmlns="" w="9525">
+                <a14:hiddenLine xmlns="" xmlns:a16="http://schemas.microsoft.com/office/drawing/2014/main" xmlns:p14="http://schemas.microsoft.com/office/powerpoint/2010/main" xmlns:a14="http://schemas.microsoft.com/office/drawing/2010/main" w="9525">
                   <a:solidFill>
                     <a:srgbClr val="000000"/>
                   </a:solidFill>
@@ -15556,7 +16581,7 @@
             </a:ln>
             <a:extLst>
               <a:ext uri="{91240B29-F687-4f45-9708-019B960494DF}">
-                <a14:hiddenLine xmlns:a14="http://schemas.microsoft.com/office/drawing/2010/main" xmlns:p14="http://schemas.microsoft.com/office/powerpoint/2010/main" xmlns:a16="http://schemas.microsoft.com/office/drawing/2014/main" xmlns="" w="9525">
+                <a14:hiddenLine xmlns="" xmlns:a16="http://schemas.microsoft.com/office/drawing/2014/main" xmlns:p14="http://schemas.microsoft.com/office/powerpoint/2010/main" xmlns:a14="http://schemas.microsoft.com/office/drawing/2010/main" w="9525">
                   <a:solidFill>
                     <a:srgbClr val="000000"/>
                   </a:solidFill>
@@ -15633,7 +16658,7 @@
             </a:ln>
             <a:extLst>
               <a:ext uri="{91240B29-F687-4f45-9708-019B960494DF}">
-                <a14:hiddenLine xmlns:a14="http://schemas.microsoft.com/office/drawing/2010/main" xmlns:p14="http://schemas.microsoft.com/office/powerpoint/2010/main" xmlns:a16="http://schemas.microsoft.com/office/drawing/2014/main" xmlns="" w="9525">
+                <a14:hiddenLine xmlns="" xmlns:a16="http://schemas.microsoft.com/office/drawing/2014/main" xmlns:p14="http://schemas.microsoft.com/office/powerpoint/2010/main" xmlns:a14="http://schemas.microsoft.com/office/drawing/2010/main" w="9525">
                   <a:solidFill>
                     <a:srgbClr val="000000"/>
                   </a:solidFill>
@@ -15738,7 +16763,7 @@
             </a:ln>
             <a:extLst>
               <a:ext uri="{91240B29-F687-4f45-9708-019B960494DF}">
-                <a14:hiddenLine xmlns:a14="http://schemas.microsoft.com/office/drawing/2010/main" xmlns:p14="http://schemas.microsoft.com/office/powerpoint/2010/main" xmlns:a16="http://schemas.microsoft.com/office/drawing/2014/main" xmlns="" w="9525">
+                <a14:hiddenLine xmlns="" xmlns:a16="http://schemas.microsoft.com/office/drawing/2014/main" xmlns:p14="http://schemas.microsoft.com/office/powerpoint/2010/main" xmlns:a14="http://schemas.microsoft.com/office/drawing/2010/main" w="9525">
                   <a:solidFill>
                     <a:srgbClr val="000000"/>
                   </a:solidFill>
@@ -15843,7 +16868,7 @@
             </a:ln>
             <a:extLst>
               <a:ext uri="{91240B29-F687-4f45-9708-019B960494DF}">
-                <a14:hiddenLine xmlns:a14="http://schemas.microsoft.com/office/drawing/2010/main" xmlns:p14="http://schemas.microsoft.com/office/powerpoint/2010/main" xmlns:a16="http://schemas.microsoft.com/office/drawing/2014/main" xmlns="" w="9525">
+                <a14:hiddenLine xmlns="" xmlns:a16="http://schemas.microsoft.com/office/drawing/2014/main" xmlns:p14="http://schemas.microsoft.com/office/powerpoint/2010/main" xmlns:a14="http://schemas.microsoft.com/office/drawing/2010/main" w="9525">
                   <a:solidFill>
                     <a:srgbClr val="000000"/>
                   </a:solidFill>
@@ -15923,7 +16948,7 @@
             </a:ln>
             <a:extLst>
               <a:ext uri="{91240B29-F687-4f45-9708-019B960494DF}">
-                <a14:hiddenLine xmlns:a14="http://schemas.microsoft.com/office/drawing/2010/main" xmlns:p14="http://schemas.microsoft.com/office/powerpoint/2010/main" xmlns:a16="http://schemas.microsoft.com/office/drawing/2014/main" xmlns="" w="9525">
+                <a14:hiddenLine xmlns="" xmlns:a16="http://schemas.microsoft.com/office/drawing/2014/main" xmlns:p14="http://schemas.microsoft.com/office/powerpoint/2010/main" xmlns:a14="http://schemas.microsoft.com/office/drawing/2010/main" w="9525">
                   <a:solidFill>
                     <a:srgbClr val="000000"/>
                   </a:solidFill>
@@ -16058,7 +17083,7 @@
             </a:ln>
             <a:extLst>
               <a:ext uri="{91240B29-F687-4f45-9708-019B960494DF}">
-                <a14:hiddenLine xmlns:a14="http://schemas.microsoft.com/office/drawing/2010/main" xmlns:p14="http://schemas.microsoft.com/office/powerpoint/2010/main" xmlns:a16="http://schemas.microsoft.com/office/drawing/2014/main" xmlns="" w="9525">
+                <a14:hiddenLine xmlns="" xmlns:a16="http://schemas.microsoft.com/office/drawing/2014/main" xmlns:p14="http://schemas.microsoft.com/office/powerpoint/2010/main" xmlns:a14="http://schemas.microsoft.com/office/drawing/2010/main" w="9525">
                   <a:solidFill>
                     <a:srgbClr val="000000"/>
                   </a:solidFill>
@@ -16457,6 +17482,801 @@
 </p:sld>
 </file>
 
+<file path=ppt/slides/slide20.xml><?xml version="1.0" encoding="utf-8"?>
+<p:sld xmlns:a="http://schemas.openxmlformats.org/drawingml/2006/main" xmlns:r="http://schemas.openxmlformats.org/officeDocument/2006/relationships" xmlns:p="http://schemas.openxmlformats.org/presentationml/2006/main">
+  <p:cSld>
+    <p:spTree>
+      <p:nvGrpSpPr>
+        <p:cNvPr id="1" name=""/>
+        <p:cNvGrpSpPr/>
+        <p:nvPr/>
+      </p:nvGrpSpPr>
+      <p:grpSpPr>
+        <a:xfrm>
+          <a:off x="0" y="0"/>
+          <a:ext cx="0" cy="0"/>
+          <a:chOff x="0" y="0"/>
+          <a:chExt cx="0" cy="0"/>
+        </a:xfrm>
+      </p:grpSpPr>
+      <p:pic>
+        <p:nvPicPr>
+          <p:cNvPr id="4" name="Onlinemedier 3" title="footprint">
+            <a:hlinkClick r:id="" action="ppaction://media"/>
+            <a:extLst>
+              <a:ext uri="{FF2B5EF4-FFF2-40B4-BE49-F238E27FC236}">
+                <a16:creationId xmlns:a16="http://schemas.microsoft.com/office/drawing/2014/main" id="{FF134629-156C-4EBC-8F97-4DD0E8638D5B}"/>
+              </a:ext>
+            </a:extLst>
+          </p:cNvPr>
+          <p:cNvPicPr>
+            <a:picLocks noRot="1" noChangeAspect="1"/>
+          </p:cNvPicPr>
+          <p:nvPr>
+            <a:videoFile r:link="rId1"/>
+          </p:nvPr>
+        </p:nvPicPr>
+        <p:blipFill>
+          <a:blip r:embed="rId3"/>
+          <a:stretch>
+            <a:fillRect/>
+          </a:stretch>
+        </p:blipFill>
+        <p:spPr>
+          <a:xfrm>
+            <a:off x="0" y="0"/>
+            <a:ext cx="12138053" cy="6858000"/>
+          </a:xfrm>
+          <a:prstGeom prst="rect">
+            <a:avLst/>
+          </a:prstGeom>
+        </p:spPr>
+      </p:pic>
+    </p:spTree>
+    <p:extLst>
+      <p:ext uri="{BB962C8B-B14F-4D97-AF65-F5344CB8AC3E}">
+        <p14:creationId xmlns:p14="http://schemas.microsoft.com/office/powerpoint/2010/main" val="979933834"/>
+      </p:ext>
+    </p:extLst>
+  </p:cSld>
+  <p:clrMapOvr>
+    <a:masterClrMapping/>
+  </p:clrMapOvr>
+  <p:timing>
+    <p:tnLst>
+      <p:par>
+        <p:cTn id="1" dur="indefinite" restart="never" nodeType="tmRoot">
+          <p:childTnLst>
+            <p:seq concurrent="1" nextAc="seek">
+              <p:cTn id="2" dur="indefinite" nodeType="mainSeq">
+                <p:childTnLst>
+                  <p:par>
+                    <p:cTn id="3" fill="hold">
+                      <p:stCondLst>
+                        <p:cond delay="indefinite"/>
+                      </p:stCondLst>
+                      <p:childTnLst>
+                        <p:par>
+                          <p:cTn id="4" fill="hold">
+                            <p:stCondLst>
+                              <p:cond delay="0"/>
+                            </p:stCondLst>
+                            <p:childTnLst>
+                              <p:par>
+                                <p:cTn id="5" presetID="1" presetClass="mediacall" presetSubtype="0" fill="hold" nodeType="clickEffect">
+                                  <p:stCondLst>
+                                    <p:cond delay="0"/>
+                                  </p:stCondLst>
+                                  <p:childTnLst>
+                                    <p:cmd type="call" cmd="playFrom(0.0)">
+                                      <p:cBhvr>
+                                        <p:cTn id="6" dur="1" fill="hold"/>
+                                        <p:tgtEl>
+                                          <p:spTgt spid="4"/>
+                                        </p:tgtEl>
+                                      </p:cBhvr>
+                                    </p:cmd>
+                                  </p:childTnLst>
+                                </p:cTn>
+                              </p:par>
+                            </p:childTnLst>
+                          </p:cTn>
+                        </p:par>
+                      </p:childTnLst>
+                    </p:cTn>
+                  </p:par>
+                </p:childTnLst>
+              </p:cTn>
+              <p:prevCondLst>
+                <p:cond evt="onPrev" delay="0">
+                  <p:tgtEl>
+                    <p:sldTgt/>
+                  </p:tgtEl>
+                </p:cond>
+              </p:prevCondLst>
+              <p:nextCondLst>
+                <p:cond evt="onNext" delay="0">
+                  <p:tgtEl>
+                    <p:sldTgt/>
+                  </p:tgtEl>
+                </p:cond>
+              </p:nextCondLst>
+            </p:seq>
+            <p:video>
+              <p:cMediaNode vol="80000">
+                <p:cTn id="7" fill="hold" display="0">
+                  <p:stCondLst>
+                    <p:cond delay="indefinite"/>
+                  </p:stCondLst>
+                </p:cTn>
+                <p:tgtEl>
+                  <p:spTgt spid="4"/>
+                </p:tgtEl>
+              </p:cMediaNode>
+            </p:video>
+            <p:seq concurrent="1" nextAc="seek">
+              <p:cTn id="8" restart="whenNotActive" fill="hold" evtFilter="cancelBubble" nodeType="interactiveSeq">
+                <p:stCondLst>
+                  <p:cond evt="onClick" delay="0">
+                    <p:tgtEl>
+                      <p:spTgt spid="4"/>
+                    </p:tgtEl>
+                  </p:cond>
+                </p:stCondLst>
+                <p:endSync evt="end" delay="0">
+                  <p:rtn val="all"/>
+                </p:endSync>
+                <p:childTnLst>
+                  <p:par>
+                    <p:cTn id="9" fill="hold">
+                      <p:stCondLst>
+                        <p:cond delay="0"/>
+                      </p:stCondLst>
+                      <p:childTnLst>
+                        <p:par>
+                          <p:cTn id="10" fill="hold">
+                            <p:stCondLst>
+                              <p:cond delay="0"/>
+                            </p:stCondLst>
+                            <p:childTnLst>
+                              <p:par>
+                                <p:cTn id="11" presetID="2" presetClass="mediacall" presetSubtype="0" fill="hold" nodeType="clickEffect">
+                                  <p:stCondLst>
+                                    <p:cond delay="0"/>
+                                  </p:stCondLst>
+                                  <p:childTnLst>
+                                    <p:cmd type="call" cmd="togglePause">
+                                      <p:cBhvr>
+                                        <p:cTn id="12" dur="1" fill="hold"/>
+                                        <p:tgtEl>
+                                          <p:spTgt spid="4"/>
+                                        </p:tgtEl>
+                                      </p:cBhvr>
+                                    </p:cmd>
+                                  </p:childTnLst>
+                                </p:cTn>
+                              </p:par>
+                            </p:childTnLst>
+                          </p:cTn>
+                        </p:par>
+                      </p:childTnLst>
+                    </p:cTn>
+                  </p:par>
+                </p:childTnLst>
+              </p:cTn>
+              <p:nextCondLst>
+                <p:cond evt="onClick" delay="0">
+                  <p:tgtEl>
+                    <p:spTgt spid="4"/>
+                  </p:tgtEl>
+                </p:cond>
+              </p:nextCondLst>
+            </p:seq>
+          </p:childTnLst>
+        </p:cTn>
+      </p:par>
+    </p:tnLst>
+  </p:timing>
+</p:sld>
+</file>
+
+<file path=ppt/slides/slide21.xml><?xml version="1.0" encoding="utf-8"?>
+<p:sld xmlns:a="http://schemas.openxmlformats.org/drawingml/2006/main" xmlns:r="http://schemas.openxmlformats.org/officeDocument/2006/relationships" xmlns:p="http://schemas.openxmlformats.org/presentationml/2006/main">
+  <p:cSld>
+    <p:spTree>
+      <p:nvGrpSpPr>
+        <p:cNvPr id="1" name=""/>
+        <p:cNvGrpSpPr/>
+        <p:nvPr/>
+      </p:nvGrpSpPr>
+      <p:grpSpPr>
+        <a:xfrm>
+          <a:off x="0" y="0"/>
+          <a:ext cx="0" cy="0"/>
+          <a:chOff x="0" y="0"/>
+          <a:chExt cx="0" cy="0"/>
+        </a:xfrm>
+      </p:grpSpPr>
+      <p:sp>
+        <p:nvSpPr>
+          <p:cNvPr id="2" name="Titel 1">
+            <a:extLst>
+              <a:ext uri="{FF2B5EF4-FFF2-40B4-BE49-F238E27FC236}">
+                <a16:creationId xmlns:a16="http://schemas.microsoft.com/office/drawing/2014/main" id="{61B4D18C-CC32-48FF-8E94-D56276EB4126}"/>
+              </a:ext>
+            </a:extLst>
+          </p:cNvPr>
+          <p:cNvSpPr>
+            <a:spLocks noGrp="1"/>
+          </p:cNvSpPr>
+          <p:nvPr>
+            <p:ph type="title"/>
+          </p:nvPr>
+        </p:nvSpPr>
+        <p:spPr/>
+        <p:txBody>
+          <a:bodyPr/>
+          <a:lstStyle/>
+          <a:p>
+            <a:r>
+              <a:rPr lang="en-GB" dirty="0"/>
+              <a:t>DRC</a:t>
+            </a:r>
+            <a:endParaRPr lang="LID4096" dirty="0"/>
+          </a:p>
+        </p:txBody>
+      </p:sp>
+      <p:sp>
+        <p:nvSpPr>
+          <p:cNvPr id="3" name="Pladsholder til indhold 2">
+            <a:extLst>
+              <a:ext uri="{FF2B5EF4-FFF2-40B4-BE49-F238E27FC236}">
+                <a16:creationId xmlns:a16="http://schemas.microsoft.com/office/drawing/2014/main" id="{AB3FAF0B-3728-4675-B360-C48385BDBE53}"/>
+              </a:ext>
+            </a:extLst>
+          </p:cNvPr>
+          <p:cNvSpPr>
+            <a:spLocks noGrp="1"/>
+          </p:cNvSpPr>
+          <p:nvPr>
+            <p:ph idx="1"/>
+          </p:nvPr>
+        </p:nvSpPr>
+        <p:spPr/>
+        <p:txBody>
+          <a:bodyPr/>
+          <a:lstStyle/>
+          <a:p>
+            <a:r>
+              <a:rPr lang="en-GB" dirty="0" err="1"/>
+              <a:t>Sikre</a:t>
+            </a:r>
+            <a:r>
+              <a:rPr lang="en-GB" dirty="0"/>
+              <a:t> at du nu </a:t>
+            </a:r>
+            <a:r>
+              <a:rPr lang="en-GB" dirty="0" err="1"/>
+              <a:t>mener</a:t>
+            </a:r>
+            <a:r>
+              <a:rPr lang="en-GB" dirty="0"/>
+              <a:t> det du har </a:t>
+            </a:r>
+            <a:r>
+              <a:rPr lang="en-GB" dirty="0" err="1"/>
+              <a:t>tegnet</a:t>
+            </a:r>
+            <a:endParaRPr lang="en-GB" dirty="0"/>
+          </a:p>
+          <a:p>
+            <a:r>
+              <a:rPr lang="en-GB" dirty="0" err="1"/>
+              <a:t>Undgå</a:t>
+            </a:r>
+            <a:r>
+              <a:rPr lang="en-GB" dirty="0"/>
+              <a:t> at </a:t>
+            </a:r>
+            <a:r>
+              <a:rPr lang="en-GB" dirty="0" err="1"/>
+              <a:t>overse</a:t>
+            </a:r>
+            <a:r>
+              <a:rPr lang="en-GB" dirty="0"/>
+              <a:t> input</a:t>
+            </a:r>
+            <a:endParaRPr lang="LID4096" dirty="0"/>
+          </a:p>
+        </p:txBody>
+      </p:sp>
+      <p:pic>
+        <p:nvPicPr>
+          <p:cNvPr id="5" name="Billede 4">
+            <a:extLst>
+              <a:ext uri="{FF2B5EF4-FFF2-40B4-BE49-F238E27FC236}">
+                <a16:creationId xmlns:a16="http://schemas.microsoft.com/office/drawing/2014/main" id="{81B29ACB-0C30-484E-A017-7D8BBF919720}"/>
+              </a:ext>
+            </a:extLst>
+          </p:cNvPr>
+          <p:cNvPicPr>
+            <a:picLocks noChangeAspect="1"/>
+          </p:cNvPicPr>
+          <p:nvPr/>
+        </p:nvPicPr>
+        <p:blipFill>
+          <a:blip r:embed="rId2"/>
+          <a:stretch>
+            <a:fillRect/>
+          </a:stretch>
+        </p:blipFill>
+        <p:spPr>
+          <a:xfrm>
+            <a:off x="6738103" y="2015732"/>
+            <a:ext cx="4316751" cy="2553515"/>
+          </a:xfrm>
+          <a:prstGeom prst="rect">
+            <a:avLst/>
+          </a:prstGeom>
+        </p:spPr>
+      </p:pic>
+    </p:spTree>
+    <p:extLst>
+      <p:ext uri="{BB962C8B-B14F-4D97-AF65-F5344CB8AC3E}">
+        <p14:creationId xmlns:p14="http://schemas.microsoft.com/office/powerpoint/2010/main" val="2216003879"/>
+      </p:ext>
+    </p:extLst>
+  </p:cSld>
+  <p:clrMapOvr>
+    <a:masterClrMapping/>
+  </p:clrMapOvr>
+</p:sld>
+</file>
+
+<file path=ppt/slides/slide22.xml><?xml version="1.0" encoding="utf-8"?>
+<p:sld xmlns:a="http://schemas.openxmlformats.org/drawingml/2006/main" xmlns:r="http://schemas.openxmlformats.org/officeDocument/2006/relationships" xmlns:p="http://schemas.openxmlformats.org/presentationml/2006/main">
+  <p:cSld>
+    <p:spTree>
+      <p:nvGrpSpPr>
+        <p:cNvPr id="1" name=""/>
+        <p:cNvGrpSpPr/>
+        <p:nvPr/>
+      </p:nvGrpSpPr>
+      <p:grpSpPr>
+        <a:xfrm>
+          <a:off x="0" y="0"/>
+          <a:ext cx="0" cy="0"/>
+          <a:chOff x="0" y="0"/>
+          <a:chExt cx="0" cy="0"/>
+        </a:xfrm>
+      </p:grpSpPr>
+      <p:sp>
+        <p:nvSpPr>
+          <p:cNvPr id="2" name="Titel 1">
+            <a:extLst>
+              <a:ext uri="{FF2B5EF4-FFF2-40B4-BE49-F238E27FC236}">
+                <a16:creationId xmlns:a16="http://schemas.microsoft.com/office/drawing/2014/main" id="{83E1EA1A-EDBC-444C-8488-C6AB29E2878C}"/>
+              </a:ext>
+            </a:extLst>
+          </p:cNvPr>
+          <p:cNvSpPr>
+            <a:spLocks noGrp="1"/>
+          </p:cNvSpPr>
+          <p:nvPr>
+            <p:ph type="title"/>
+          </p:nvPr>
+        </p:nvSpPr>
+        <p:spPr/>
+        <p:txBody>
+          <a:bodyPr/>
+          <a:lstStyle/>
+          <a:p>
+            <a:r>
+              <a:rPr lang="en-GB" dirty="0"/>
+              <a:t>Lib </a:t>
+            </a:r>
+            <a:r>
+              <a:rPr lang="en-GB" dirty="0" err="1"/>
+              <a:t>Symboler</a:t>
+            </a:r>
+            <a:endParaRPr lang="LID4096" dirty="0"/>
+          </a:p>
+        </p:txBody>
+      </p:sp>
+      <p:sp>
+        <p:nvSpPr>
+          <p:cNvPr id="3" name="Pladsholder til indhold 2">
+            <a:extLst>
+              <a:ext uri="{FF2B5EF4-FFF2-40B4-BE49-F238E27FC236}">
+                <a16:creationId xmlns:a16="http://schemas.microsoft.com/office/drawing/2014/main" id="{52B543CC-1729-45D5-83D7-9983FC4F0CCC}"/>
+              </a:ext>
+            </a:extLst>
+          </p:cNvPr>
+          <p:cNvSpPr>
+            <a:spLocks noGrp="1"/>
+          </p:cNvSpPr>
+          <p:nvPr>
+            <p:ph idx="1"/>
+          </p:nvPr>
+        </p:nvSpPr>
+        <p:spPr/>
+        <p:txBody>
+          <a:bodyPr/>
+          <a:lstStyle/>
+          <a:p>
+            <a:r>
+              <a:rPr lang="en-GB" dirty="0"/>
+              <a:t>Lib Editor</a:t>
+            </a:r>
+          </a:p>
+          <a:p>
+            <a:endParaRPr lang="LID4096" dirty="0"/>
+          </a:p>
+        </p:txBody>
+      </p:sp>
+    </p:spTree>
+    <p:extLst>
+      <p:ext uri="{BB962C8B-B14F-4D97-AF65-F5344CB8AC3E}">
+        <p14:creationId xmlns:p14="http://schemas.microsoft.com/office/powerpoint/2010/main" val="3008959822"/>
+      </p:ext>
+    </p:extLst>
+  </p:cSld>
+  <p:clrMapOvr>
+    <a:masterClrMapping/>
+  </p:clrMapOvr>
+</p:sld>
+</file>
+
+<file path=ppt/slides/slide23.xml><?xml version="1.0" encoding="utf-8"?>
+<p:sld xmlns:a="http://schemas.openxmlformats.org/drawingml/2006/main" xmlns:r="http://schemas.openxmlformats.org/officeDocument/2006/relationships" xmlns:p="http://schemas.openxmlformats.org/presentationml/2006/main">
+  <p:cSld>
+    <p:spTree>
+      <p:nvGrpSpPr>
+        <p:cNvPr id="1" name=""/>
+        <p:cNvGrpSpPr/>
+        <p:nvPr/>
+      </p:nvGrpSpPr>
+      <p:grpSpPr>
+        <a:xfrm>
+          <a:off x="0" y="0"/>
+          <a:ext cx="0" cy="0"/>
+          <a:chOff x="0" y="0"/>
+          <a:chExt cx="0" cy="0"/>
+        </a:xfrm>
+      </p:grpSpPr>
+      <p:pic>
+        <p:nvPicPr>
+          <p:cNvPr id="4" name="Onlinemedier 3" title="lib symbol">
+            <a:hlinkClick r:id="" action="ppaction://media"/>
+            <a:extLst>
+              <a:ext uri="{FF2B5EF4-FFF2-40B4-BE49-F238E27FC236}">
+                <a16:creationId xmlns:a16="http://schemas.microsoft.com/office/drawing/2014/main" id="{314D0244-93E6-48FF-B429-BC767C529B6B}"/>
+              </a:ext>
+            </a:extLst>
+          </p:cNvPr>
+          <p:cNvPicPr>
+            <a:picLocks noRot="1" noChangeAspect="1"/>
+          </p:cNvPicPr>
+          <p:nvPr>
+            <a:videoFile r:link="rId1"/>
+          </p:nvPr>
+        </p:nvPicPr>
+        <p:blipFill>
+          <a:blip r:embed="rId3"/>
+          <a:stretch>
+            <a:fillRect/>
+          </a:stretch>
+        </p:blipFill>
+        <p:spPr>
+          <a:xfrm>
+            <a:off x="0" y="0"/>
+            <a:ext cx="12138053" cy="6858000"/>
+          </a:xfrm>
+          <a:prstGeom prst="rect">
+            <a:avLst/>
+          </a:prstGeom>
+        </p:spPr>
+      </p:pic>
+    </p:spTree>
+    <p:extLst>
+      <p:ext uri="{BB962C8B-B14F-4D97-AF65-F5344CB8AC3E}">
+        <p14:creationId xmlns:p14="http://schemas.microsoft.com/office/powerpoint/2010/main" val="807404255"/>
+      </p:ext>
+    </p:extLst>
+  </p:cSld>
+  <p:clrMapOvr>
+    <a:masterClrMapping/>
+  </p:clrMapOvr>
+  <p:timing>
+    <p:tnLst>
+      <p:par>
+        <p:cTn id="1" dur="indefinite" restart="never" nodeType="tmRoot">
+          <p:childTnLst>
+            <p:seq concurrent="1" nextAc="seek">
+              <p:cTn id="2" dur="indefinite" nodeType="mainSeq">
+                <p:childTnLst>
+                  <p:par>
+                    <p:cTn id="3" fill="hold">
+                      <p:stCondLst>
+                        <p:cond delay="indefinite"/>
+                      </p:stCondLst>
+                      <p:childTnLst>
+                        <p:par>
+                          <p:cTn id="4" fill="hold">
+                            <p:stCondLst>
+                              <p:cond delay="0"/>
+                            </p:stCondLst>
+                            <p:childTnLst>
+                              <p:par>
+                                <p:cTn id="5" presetID="1" presetClass="mediacall" presetSubtype="0" fill="hold" nodeType="clickEffect">
+                                  <p:stCondLst>
+                                    <p:cond delay="0"/>
+                                  </p:stCondLst>
+                                  <p:childTnLst>
+                                    <p:cmd type="call" cmd="playFrom(0.0)">
+                                      <p:cBhvr>
+                                        <p:cTn id="6" dur="1" fill="hold"/>
+                                        <p:tgtEl>
+                                          <p:spTgt spid="4"/>
+                                        </p:tgtEl>
+                                      </p:cBhvr>
+                                    </p:cmd>
+                                  </p:childTnLst>
+                                </p:cTn>
+                              </p:par>
+                            </p:childTnLst>
+                          </p:cTn>
+                        </p:par>
+                      </p:childTnLst>
+                    </p:cTn>
+                  </p:par>
+                </p:childTnLst>
+              </p:cTn>
+              <p:prevCondLst>
+                <p:cond evt="onPrev" delay="0">
+                  <p:tgtEl>
+                    <p:sldTgt/>
+                  </p:tgtEl>
+                </p:cond>
+              </p:prevCondLst>
+              <p:nextCondLst>
+                <p:cond evt="onNext" delay="0">
+                  <p:tgtEl>
+                    <p:sldTgt/>
+                  </p:tgtEl>
+                </p:cond>
+              </p:nextCondLst>
+            </p:seq>
+            <p:video>
+              <p:cMediaNode vol="80000">
+                <p:cTn id="7" fill="hold" display="0">
+                  <p:stCondLst>
+                    <p:cond delay="indefinite"/>
+                  </p:stCondLst>
+                </p:cTn>
+                <p:tgtEl>
+                  <p:spTgt spid="4"/>
+                </p:tgtEl>
+              </p:cMediaNode>
+            </p:video>
+            <p:seq concurrent="1" nextAc="seek">
+              <p:cTn id="8" restart="whenNotActive" fill="hold" evtFilter="cancelBubble" nodeType="interactiveSeq">
+                <p:stCondLst>
+                  <p:cond evt="onClick" delay="0">
+                    <p:tgtEl>
+                      <p:spTgt spid="4"/>
+                    </p:tgtEl>
+                  </p:cond>
+                </p:stCondLst>
+                <p:endSync evt="end" delay="0">
+                  <p:rtn val="all"/>
+                </p:endSync>
+                <p:childTnLst>
+                  <p:par>
+                    <p:cTn id="9" fill="hold">
+                      <p:stCondLst>
+                        <p:cond delay="0"/>
+                      </p:stCondLst>
+                      <p:childTnLst>
+                        <p:par>
+                          <p:cTn id="10" fill="hold">
+                            <p:stCondLst>
+                              <p:cond delay="0"/>
+                            </p:stCondLst>
+                            <p:childTnLst>
+                              <p:par>
+                                <p:cTn id="11" presetID="2" presetClass="mediacall" presetSubtype="0" fill="hold" nodeType="clickEffect">
+                                  <p:stCondLst>
+                                    <p:cond delay="0"/>
+                                  </p:stCondLst>
+                                  <p:childTnLst>
+                                    <p:cmd type="call" cmd="togglePause">
+                                      <p:cBhvr>
+                                        <p:cTn id="12" dur="1" fill="hold"/>
+                                        <p:tgtEl>
+                                          <p:spTgt spid="4"/>
+                                        </p:tgtEl>
+                                      </p:cBhvr>
+                                    </p:cmd>
+                                  </p:childTnLst>
+                                </p:cTn>
+                              </p:par>
+                            </p:childTnLst>
+                          </p:cTn>
+                        </p:par>
+                      </p:childTnLst>
+                    </p:cTn>
+                  </p:par>
+                </p:childTnLst>
+              </p:cTn>
+              <p:nextCondLst>
+                <p:cond evt="onClick" delay="0">
+                  <p:tgtEl>
+                    <p:spTgt spid="4"/>
+                  </p:tgtEl>
+                </p:cond>
+              </p:nextCondLst>
+            </p:seq>
+          </p:childTnLst>
+        </p:cTn>
+      </p:par>
+    </p:tnLst>
+  </p:timing>
+</p:sld>
+</file>
+
+<file path=ppt/slides/slide24.xml><?xml version="1.0" encoding="utf-8"?>
+<p:sld xmlns:a="http://schemas.openxmlformats.org/drawingml/2006/main" xmlns:r="http://schemas.openxmlformats.org/officeDocument/2006/relationships" xmlns:p="http://schemas.openxmlformats.org/presentationml/2006/main">
+  <p:cSld>
+    <p:spTree>
+      <p:nvGrpSpPr>
+        <p:cNvPr id="1" name=""/>
+        <p:cNvGrpSpPr/>
+        <p:nvPr/>
+      </p:nvGrpSpPr>
+      <p:grpSpPr>
+        <a:xfrm>
+          <a:off x="0" y="0"/>
+          <a:ext cx="0" cy="0"/>
+          <a:chOff x="0" y="0"/>
+          <a:chExt cx="0" cy="0"/>
+        </a:xfrm>
+      </p:grpSpPr>
+      <p:sp>
+        <p:nvSpPr>
+          <p:cNvPr id="2" name="Titel 1">
+            <a:extLst>
+              <a:ext uri="{FF2B5EF4-FFF2-40B4-BE49-F238E27FC236}">
+                <a16:creationId xmlns:a16="http://schemas.microsoft.com/office/drawing/2014/main" id="{A1F6D4CF-4F5F-4DE1-B0B0-B5CF818241EA}"/>
+              </a:ext>
+            </a:extLst>
+          </p:cNvPr>
+          <p:cNvSpPr>
+            <a:spLocks noGrp="1"/>
+          </p:cNvSpPr>
+          <p:nvPr>
+            <p:ph type="title"/>
+          </p:nvPr>
+        </p:nvSpPr>
+        <p:spPr/>
+        <p:txBody>
+          <a:bodyPr/>
+          <a:lstStyle/>
+          <a:p>
+            <a:r>
+              <a:rPr lang="en-GB" dirty="0"/>
+              <a:t>Test Diagram</a:t>
+            </a:r>
+            <a:endParaRPr lang="LID4096" dirty="0"/>
+          </a:p>
+        </p:txBody>
+      </p:sp>
+      <p:sp>
+        <p:nvSpPr>
+          <p:cNvPr id="3" name="Pladsholder til indhold 2">
+            <a:extLst>
+              <a:ext uri="{FF2B5EF4-FFF2-40B4-BE49-F238E27FC236}">
+                <a16:creationId xmlns:a16="http://schemas.microsoft.com/office/drawing/2014/main" id="{A6DCB2BA-6341-48A6-AB9C-8829A43DCBAC}"/>
+              </a:ext>
+            </a:extLst>
+          </p:cNvPr>
+          <p:cNvSpPr>
+            <a:spLocks noGrp="1"/>
+          </p:cNvSpPr>
+          <p:nvPr>
+            <p:ph idx="1"/>
+          </p:nvPr>
+        </p:nvSpPr>
+        <p:spPr/>
+        <p:txBody>
+          <a:bodyPr/>
+          <a:lstStyle/>
+          <a:p>
+            <a:r>
+              <a:rPr lang="en-GB" dirty="0"/>
+              <a:t>Vi laver et schematic project </a:t>
+            </a:r>
+            <a:r>
+              <a:rPr lang="en-GB" dirty="0" err="1"/>
+              <a:t>fra</a:t>
+            </a:r>
+            <a:r>
+              <a:rPr lang="en-GB" dirty="0"/>
+              <a:t> </a:t>
+            </a:r>
+            <a:r>
+              <a:rPr lang="en-GB" dirty="0" err="1"/>
+              <a:t>bunnden</a:t>
+            </a:r>
+            <a:r>
+              <a:rPr lang="en-GB" dirty="0"/>
+              <a:t>.</a:t>
+            </a:r>
+            <a:endParaRPr lang="LID4096" dirty="0"/>
+          </a:p>
+        </p:txBody>
+      </p:sp>
+      <p:sp>
+        <p:nvSpPr>
+          <p:cNvPr id="4" name="Rektangel 3">
+            <a:extLst>
+              <a:ext uri="{FF2B5EF4-FFF2-40B4-BE49-F238E27FC236}">
+                <a16:creationId xmlns:a16="http://schemas.microsoft.com/office/drawing/2014/main" id="{D275B53F-31E2-4FD4-BD0B-8F3821B241EF}"/>
+              </a:ext>
+            </a:extLst>
+          </p:cNvPr>
+          <p:cNvSpPr/>
+          <p:nvPr/>
+        </p:nvSpPr>
+        <p:spPr>
+          <a:xfrm rot="18393043">
+            <a:off x="5815468" y="2628765"/>
+            <a:ext cx="7226787" cy="923330"/>
+          </a:xfrm>
+          <a:prstGeom prst="rect">
+            <a:avLst/>
+          </a:prstGeom>
+          <a:noFill/>
+        </p:spPr>
+        <p:txBody>
+          <a:bodyPr wrap="none" lIns="91440" tIns="45720" rIns="91440" bIns="45720">
+            <a:spAutoFit/>
+          </a:bodyPr>
+          <a:lstStyle/>
+          <a:p>
+            <a:pPr algn="ctr"/>
+            <a:r>
+              <a:rPr lang="da-DK" sz="5400" b="0" cap="none" spc="0" dirty="0">
+                <a:ln w="0"/>
+                <a:solidFill>
+                  <a:schemeClr val="accent1"/>
+                </a:solidFill>
+                <a:effectLst>
+                  <a:outerShdw blurRad="38100" dist="25400" dir="5400000" algn="ctr" rotWithShape="0">
+                    <a:srgbClr val="6E747A">
+                      <a:alpha val="43000"/>
+                    </a:srgbClr>
+                  </a:outerShdw>
+                </a:effectLst>
+              </a:rPr>
+              <a:t>Opgave: Lav et nyt design</a:t>
+            </a:r>
+          </a:p>
+        </p:txBody>
+      </p:sp>
+    </p:spTree>
+    <p:extLst>
+      <p:ext uri="{BB962C8B-B14F-4D97-AF65-F5344CB8AC3E}">
+        <p14:creationId xmlns:p14="http://schemas.microsoft.com/office/powerpoint/2010/main" val="319711383"/>
+      </p:ext>
+    </p:extLst>
+  </p:cSld>
+  <p:clrMapOvr>
+    <a:masterClrMapping/>
+  </p:clrMapOvr>
+</p:sld>
+</file>
+
 <file path=ppt/slides/slide3.xml><?xml version="1.0" encoding="utf-8"?>
 <p:sld xmlns:a="http://schemas.openxmlformats.org/drawingml/2006/main" xmlns:r="http://schemas.openxmlformats.org/officeDocument/2006/relationships" xmlns:p="http://schemas.openxmlformats.org/presentationml/2006/main">
   <p:cSld>
@@ -16689,6 +18509,146 @@
           <a:chExt cx="0" cy="0"/>
         </a:xfrm>
       </p:grpSpPr>
+      <p:pic>
+        <p:nvPicPr>
+          <p:cNvPr id="6" name="Onlinemedier 5" title="åbning af projekt">
+            <a:hlinkClick r:id="" action="ppaction://media"/>
+            <a:extLst>
+              <a:ext uri="{FF2B5EF4-FFF2-40B4-BE49-F238E27FC236}">
+                <a16:creationId xmlns:a16="http://schemas.microsoft.com/office/drawing/2014/main" id="{0E0C5D63-4C6F-4BD4-84D3-6892797391B7}"/>
+              </a:ext>
+            </a:extLst>
+          </p:cNvPr>
+          <p:cNvPicPr>
+            <a:picLocks noRot="1" noChangeAspect="1"/>
+          </p:cNvPicPr>
+          <p:nvPr>
+            <a:videoFile r:link="rId1"/>
+          </p:nvPr>
+        </p:nvPicPr>
+        <p:blipFill>
+          <a:blip r:embed="rId3"/>
+          <a:stretch>
+            <a:fillRect/>
+          </a:stretch>
+        </p:blipFill>
+        <p:spPr>
+          <a:xfrm>
+            <a:off x="0" y="0"/>
+            <a:ext cx="12138052" cy="6858000"/>
+          </a:xfrm>
+          <a:prstGeom prst="rect">
+            <a:avLst/>
+          </a:prstGeom>
+        </p:spPr>
+      </p:pic>
+    </p:spTree>
+    <p:extLst>
+      <p:ext uri="{BB962C8B-B14F-4D97-AF65-F5344CB8AC3E}">
+        <p14:creationId xmlns:p14="http://schemas.microsoft.com/office/powerpoint/2010/main" val="250210552"/>
+      </p:ext>
+    </p:extLst>
+  </p:cSld>
+  <p:clrMapOvr>
+    <a:masterClrMapping/>
+  </p:clrMapOvr>
+  <p:timing>
+    <p:tnLst>
+      <p:par>
+        <p:cTn id="1" dur="indefinite" restart="never" nodeType="tmRoot">
+          <p:childTnLst>
+            <p:seq concurrent="1" nextAc="seek">
+              <p:cTn id="2" dur="indefinite" nodeType="mainSeq">
+                <p:childTnLst>
+                  <p:par>
+                    <p:cTn id="3" fill="hold">
+                      <p:stCondLst>
+                        <p:cond delay="indefinite"/>
+                      </p:stCondLst>
+                      <p:childTnLst>
+                        <p:par>
+                          <p:cTn id="4" fill="hold">
+                            <p:stCondLst>
+                              <p:cond delay="0"/>
+                            </p:stCondLst>
+                            <p:childTnLst>
+                              <p:par>
+                                <p:cTn id="5" presetID="1" presetClass="mediacall" presetSubtype="0" fill="hold" nodeType="clickEffect">
+                                  <p:stCondLst>
+                                    <p:cond delay="0"/>
+                                  </p:stCondLst>
+                                  <p:childTnLst>
+                                    <p:cmd type="call" cmd="playFrom(0.0)">
+                                      <p:cBhvr>
+                                        <p:cTn id="6" dur="1" fill="hold"/>
+                                        <p:tgtEl>
+                                          <p:spTgt spid="6"/>
+                                        </p:tgtEl>
+                                      </p:cBhvr>
+                                    </p:cmd>
+                                  </p:childTnLst>
+                                </p:cTn>
+                              </p:par>
+                            </p:childTnLst>
+                          </p:cTn>
+                        </p:par>
+                      </p:childTnLst>
+                    </p:cTn>
+                  </p:par>
+                </p:childTnLst>
+              </p:cTn>
+              <p:prevCondLst>
+                <p:cond evt="onPrev" delay="0">
+                  <p:tgtEl>
+                    <p:sldTgt/>
+                  </p:tgtEl>
+                </p:cond>
+              </p:prevCondLst>
+              <p:nextCondLst>
+                <p:cond evt="onNext" delay="0">
+                  <p:tgtEl>
+                    <p:sldTgt/>
+                  </p:tgtEl>
+                </p:cond>
+              </p:nextCondLst>
+            </p:seq>
+            <p:video>
+              <p:cMediaNode vol="80000">
+                <p:cTn id="7" fill="hold" display="0">
+                  <p:stCondLst>
+                    <p:cond delay="indefinite"/>
+                  </p:stCondLst>
+                </p:cTn>
+                <p:tgtEl>
+                  <p:spTgt spid="6"/>
+                </p:tgtEl>
+              </p:cMediaNode>
+            </p:video>
+          </p:childTnLst>
+        </p:cTn>
+      </p:par>
+    </p:tnLst>
+  </p:timing>
+</p:sld>
+</file>
+
+<file path=ppt/slides/slide5.xml><?xml version="1.0" encoding="utf-8"?>
+<p:sld xmlns:a="http://schemas.openxmlformats.org/drawingml/2006/main" xmlns:r="http://schemas.openxmlformats.org/officeDocument/2006/relationships" xmlns:p="http://schemas.openxmlformats.org/presentationml/2006/main">
+  <p:cSld>
+    <p:spTree>
+      <p:nvGrpSpPr>
+        <p:cNvPr id="1" name=""/>
+        <p:cNvGrpSpPr/>
+        <p:nvPr/>
+      </p:nvGrpSpPr>
+      <p:grpSpPr>
+        <a:xfrm>
+          <a:off x="0" y="0"/>
+          <a:ext cx="0" cy="0"/>
+          <a:chOff x="0" y="0"/>
+          <a:chExt cx="0" cy="0"/>
+        </a:xfrm>
+      </p:grpSpPr>
       <p:sp>
         <p:nvSpPr>
           <p:cNvPr id="2" name="Titel 1">
@@ -16891,7 +18851,205 @@
 </p:sld>
 </file>
 
-<file path=ppt/slides/slide5.xml><?xml version="1.0" encoding="utf-8"?>
+<file path=ppt/slides/slide6.xml><?xml version="1.0" encoding="utf-8"?>
+<p:sld xmlns:a="http://schemas.openxmlformats.org/drawingml/2006/main" xmlns:r="http://schemas.openxmlformats.org/officeDocument/2006/relationships" xmlns:p="http://schemas.openxmlformats.org/presentationml/2006/main">
+  <p:cSld>
+    <p:spTree>
+      <p:nvGrpSpPr>
+        <p:cNvPr id="1" name=""/>
+        <p:cNvGrpSpPr/>
+        <p:nvPr/>
+      </p:nvGrpSpPr>
+      <p:grpSpPr>
+        <a:xfrm>
+          <a:off x="0" y="0"/>
+          <a:ext cx="0" cy="0"/>
+          <a:chOff x="0" y="0"/>
+          <a:chExt cx="0" cy="0"/>
+        </a:xfrm>
+      </p:grpSpPr>
+      <p:pic>
+        <p:nvPicPr>
+          <p:cNvPr id="5" name="Onlinemedier 4" title="Grundlæggende">
+            <a:hlinkClick r:id="" action="ppaction://media"/>
+            <a:extLst>
+              <a:ext uri="{FF2B5EF4-FFF2-40B4-BE49-F238E27FC236}">
+                <a16:creationId xmlns:a16="http://schemas.microsoft.com/office/drawing/2014/main" id="{164565B2-A426-4D98-8E7E-5BE85182AF79}"/>
+              </a:ext>
+            </a:extLst>
+          </p:cNvPr>
+          <p:cNvPicPr>
+            <a:picLocks noRot="1" noChangeAspect="1"/>
+          </p:cNvPicPr>
+          <p:nvPr>
+            <a:videoFile r:link="rId1"/>
+          </p:nvPr>
+        </p:nvPicPr>
+        <p:blipFill>
+          <a:blip r:embed="rId3"/>
+          <a:stretch>
+            <a:fillRect/>
+          </a:stretch>
+        </p:blipFill>
+        <p:spPr>
+          <a:xfrm>
+            <a:off x="91955" y="37618"/>
+            <a:ext cx="12071473" cy="6820382"/>
+          </a:xfrm>
+          <a:prstGeom prst="rect">
+            <a:avLst/>
+          </a:prstGeom>
+        </p:spPr>
+      </p:pic>
+    </p:spTree>
+    <p:extLst>
+      <p:ext uri="{BB962C8B-B14F-4D97-AF65-F5344CB8AC3E}">
+        <p14:creationId xmlns:p14="http://schemas.microsoft.com/office/powerpoint/2010/main" val="2068859579"/>
+      </p:ext>
+    </p:extLst>
+  </p:cSld>
+  <p:clrMapOvr>
+    <a:masterClrMapping/>
+  </p:clrMapOvr>
+  <p:timing>
+    <p:tnLst>
+      <p:par>
+        <p:cTn id="1" dur="indefinite" restart="never" nodeType="tmRoot">
+          <p:childTnLst>
+            <p:seq concurrent="1" nextAc="seek">
+              <p:cTn id="2" dur="indefinite" nodeType="mainSeq">
+                <p:childTnLst>
+                  <p:par>
+                    <p:cTn id="3" fill="hold">
+                      <p:stCondLst>
+                        <p:cond delay="indefinite"/>
+                      </p:stCondLst>
+                      <p:childTnLst>
+                        <p:par>
+                          <p:cTn id="4" fill="hold">
+                            <p:stCondLst>
+                              <p:cond delay="0"/>
+                            </p:stCondLst>
+                            <p:childTnLst>
+                              <p:par>
+                                <p:cTn id="5" presetID="1" presetClass="mediacall" presetSubtype="0" fill="hold" nodeType="clickEffect">
+                                  <p:stCondLst>
+                                    <p:cond delay="0"/>
+                                  </p:stCondLst>
+                                  <p:childTnLst>
+                                    <p:cmd type="call" cmd="playFrom(0.0)">
+                                      <p:cBhvr>
+                                        <p:cTn id="6" dur="1" fill="hold"/>
+                                        <p:tgtEl>
+                                          <p:spTgt spid="5"/>
+                                        </p:tgtEl>
+                                      </p:cBhvr>
+                                    </p:cmd>
+                                  </p:childTnLst>
+                                </p:cTn>
+                              </p:par>
+                            </p:childTnLst>
+                          </p:cTn>
+                        </p:par>
+                      </p:childTnLst>
+                    </p:cTn>
+                  </p:par>
+                </p:childTnLst>
+              </p:cTn>
+              <p:prevCondLst>
+                <p:cond evt="onPrev" delay="0">
+                  <p:tgtEl>
+                    <p:sldTgt/>
+                  </p:tgtEl>
+                </p:cond>
+              </p:prevCondLst>
+              <p:nextCondLst>
+                <p:cond evt="onNext" delay="0">
+                  <p:tgtEl>
+                    <p:sldTgt/>
+                  </p:tgtEl>
+                </p:cond>
+              </p:nextCondLst>
+            </p:seq>
+            <p:video>
+              <p:cMediaNode vol="80000">
+                <p:cTn id="7" fill="hold" display="0">
+                  <p:stCondLst>
+                    <p:cond delay="indefinite"/>
+                  </p:stCondLst>
+                </p:cTn>
+                <p:tgtEl>
+                  <p:spTgt spid="5"/>
+                </p:tgtEl>
+              </p:cMediaNode>
+            </p:video>
+            <p:seq concurrent="1" nextAc="seek">
+              <p:cTn id="8" restart="whenNotActive" fill="hold" evtFilter="cancelBubble" nodeType="interactiveSeq">
+                <p:stCondLst>
+                  <p:cond evt="onClick" delay="0">
+                    <p:tgtEl>
+                      <p:spTgt spid="5"/>
+                    </p:tgtEl>
+                  </p:cond>
+                </p:stCondLst>
+                <p:endSync evt="end" delay="0">
+                  <p:rtn val="all"/>
+                </p:endSync>
+                <p:childTnLst>
+                  <p:par>
+                    <p:cTn id="9" fill="hold">
+                      <p:stCondLst>
+                        <p:cond delay="0"/>
+                      </p:stCondLst>
+                      <p:childTnLst>
+                        <p:par>
+                          <p:cTn id="10" fill="hold">
+                            <p:stCondLst>
+                              <p:cond delay="0"/>
+                            </p:stCondLst>
+                            <p:childTnLst>
+                              <p:par>
+                                <p:cTn id="11" presetID="2" presetClass="mediacall" presetSubtype="0" fill="hold" nodeType="clickEffect">
+                                  <p:stCondLst>
+                                    <p:cond delay="0"/>
+                                  </p:stCondLst>
+                                  <p:childTnLst>
+                                    <p:cmd type="call" cmd="togglePause">
+                                      <p:cBhvr>
+                                        <p:cTn id="12" dur="1" fill="hold"/>
+                                        <p:tgtEl>
+                                          <p:spTgt spid="5"/>
+                                        </p:tgtEl>
+                                      </p:cBhvr>
+                                    </p:cmd>
+                                  </p:childTnLst>
+                                </p:cTn>
+                              </p:par>
+                            </p:childTnLst>
+                          </p:cTn>
+                        </p:par>
+                      </p:childTnLst>
+                    </p:cTn>
+                  </p:par>
+                </p:childTnLst>
+              </p:cTn>
+              <p:nextCondLst>
+                <p:cond evt="onClick" delay="0">
+                  <p:tgtEl>
+                    <p:spTgt spid="5"/>
+                  </p:tgtEl>
+                </p:cond>
+              </p:nextCondLst>
+            </p:seq>
+          </p:childTnLst>
+        </p:cTn>
+      </p:par>
+    </p:tnLst>
+  </p:timing>
+</p:sld>
+</file>
+
+<file path=ppt/slides/slide7.xml><?xml version="1.0" encoding="utf-8"?>
 <p:sld xmlns:a="http://schemas.openxmlformats.org/drawingml/2006/main" xmlns:r="http://schemas.openxmlformats.org/officeDocument/2006/relationships" xmlns:p="http://schemas.openxmlformats.org/presentationml/2006/main">
   <p:cSld>
     <p:spTree>
@@ -17367,7 +19525,7 @@
 </p:sld>
 </file>
 
-<file path=ppt/slides/slide6.xml><?xml version="1.0" encoding="utf-8"?>
+<file path=ppt/slides/slide8.xml><?xml version="1.0" encoding="utf-8"?>
 <p:sld xmlns:a="http://schemas.openxmlformats.org/drawingml/2006/main" xmlns:r="http://schemas.openxmlformats.org/officeDocument/2006/relationships" xmlns:p="http://schemas.openxmlformats.org/presentationml/2006/main">
   <p:cSld>
     <p:spTree>
@@ -17563,7 +19721,7 @@
 </p:sld>
 </file>
 
-<file path=ppt/slides/slide7.xml><?xml version="1.0" encoding="utf-8"?>
+<file path=ppt/slides/slide9.xml><?xml version="1.0" encoding="utf-8"?>
 <p:sld xmlns:a="http://schemas.openxmlformats.org/drawingml/2006/main" xmlns:r="http://schemas.openxmlformats.org/officeDocument/2006/relationships" xmlns:p="http://schemas.openxmlformats.org/presentationml/2006/main">
   <p:cSld>
     <p:spTree>
@@ -17754,431 +19912,6 @@
     <p:extLst>
       <p:ext uri="{BB962C8B-B14F-4D97-AF65-F5344CB8AC3E}">
         <p14:creationId xmlns:p14="http://schemas.microsoft.com/office/powerpoint/2010/main" val="2809637473"/>
-      </p:ext>
-    </p:extLst>
-  </p:cSld>
-  <p:clrMapOvr>
-    <a:masterClrMapping/>
-  </p:clrMapOvr>
-</p:sld>
-</file>
-
-<file path=ppt/slides/slide8.xml><?xml version="1.0" encoding="utf-8"?>
-<p:sld xmlns:a="http://schemas.openxmlformats.org/drawingml/2006/main" xmlns:r="http://schemas.openxmlformats.org/officeDocument/2006/relationships" xmlns:p="http://schemas.openxmlformats.org/presentationml/2006/main">
-  <p:cSld>
-    <p:spTree>
-      <p:nvGrpSpPr>
-        <p:cNvPr id="1" name=""/>
-        <p:cNvGrpSpPr/>
-        <p:nvPr/>
-      </p:nvGrpSpPr>
-      <p:grpSpPr>
-        <a:xfrm>
-          <a:off x="0" y="0"/>
-          <a:ext cx="0" cy="0"/>
-          <a:chOff x="0" y="0"/>
-          <a:chExt cx="0" cy="0"/>
-        </a:xfrm>
-      </p:grpSpPr>
-      <p:sp>
-        <p:nvSpPr>
-          <p:cNvPr id="2" name="Titel 1">
-            <a:extLst>
-              <a:ext uri="{FF2B5EF4-FFF2-40B4-BE49-F238E27FC236}">
-                <a16:creationId xmlns:a16="http://schemas.microsoft.com/office/drawing/2014/main" id="{4871BB09-C0C3-4227-904D-7B575B664C81}"/>
-              </a:ext>
-            </a:extLst>
-          </p:cNvPr>
-          <p:cNvSpPr>
-            <a:spLocks noGrp="1"/>
-          </p:cNvSpPr>
-          <p:nvPr>
-            <p:ph type="title"/>
-          </p:nvPr>
-        </p:nvSpPr>
-        <p:spPr/>
-        <p:txBody>
-          <a:bodyPr/>
-          <a:lstStyle/>
-          <a:p>
-            <a:r>
-              <a:rPr lang="en-GB" dirty="0" err="1"/>
-              <a:t>Symboler</a:t>
-            </a:r>
-            <a:endParaRPr lang="LID4096" dirty="0"/>
-          </a:p>
-        </p:txBody>
-      </p:sp>
-      <p:sp>
-        <p:nvSpPr>
-          <p:cNvPr id="3" name="Pladsholder til indhold 2">
-            <a:extLst>
-              <a:ext uri="{FF2B5EF4-FFF2-40B4-BE49-F238E27FC236}">
-                <a16:creationId xmlns:a16="http://schemas.microsoft.com/office/drawing/2014/main" id="{F02D0880-EA49-4DC4-BE70-6B25B56C801D}"/>
-              </a:ext>
-            </a:extLst>
-          </p:cNvPr>
-          <p:cNvSpPr>
-            <a:spLocks noGrp="1"/>
-          </p:cNvSpPr>
-          <p:nvPr>
-            <p:ph idx="1"/>
-          </p:nvPr>
-        </p:nvSpPr>
-        <p:spPr/>
-        <p:txBody>
-          <a:bodyPr/>
-          <a:lstStyle/>
-          <a:p>
-            <a:r>
-              <a:rPr lang="en-GB" dirty="0"/>
-              <a:t>Power </a:t>
-            </a:r>
-            <a:r>
-              <a:rPr lang="en-GB" dirty="0" err="1"/>
-              <a:t>objekter</a:t>
-            </a:r>
-            <a:r>
-              <a:rPr lang="en-GB" dirty="0"/>
-              <a:t>/</a:t>
-            </a:r>
-            <a:r>
-              <a:rPr lang="en-GB" dirty="0" err="1"/>
-              <a:t>symboler</a:t>
-            </a:r>
-            <a:r>
-              <a:rPr lang="en-GB" dirty="0"/>
-              <a:t> [P]</a:t>
-            </a:r>
-          </a:p>
-          <a:p>
-            <a:r>
-              <a:rPr lang="en-GB" dirty="0" err="1"/>
-              <a:t>Hieraki</a:t>
-            </a:r>
-            <a:r>
-              <a:rPr lang="en-GB" dirty="0"/>
-              <a:t> </a:t>
-            </a:r>
-            <a:r>
-              <a:rPr lang="en-GB" dirty="0" err="1"/>
-              <a:t>porte</a:t>
-            </a:r>
-            <a:endParaRPr lang="en-GB" dirty="0"/>
-          </a:p>
-          <a:p>
-            <a:r>
-              <a:rPr lang="en-GB" dirty="0" err="1"/>
-              <a:t>Globale</a:t>
-            </a:r>
-            <a:r>
-              <a:rPr lang="en-GB" dirty="0"/>
-              <a:t> Nets</a:t>
-            </a:r>
-          </a:p>
-          <a:p>
-            <a:r>
-              <a:rPr lang="en-GB" dirty="0" err="1"/>
-              <a:t>Lokale</a:t>
-            </a:r>
-            <a:r>
-              <a:rPr lang="en-GB" dirty="0"/>
-              <a:t> Net</a:t>
-            </a:r>
-          </a:p>
-          <a:p>
-            <a:r>
-              <a:rPr lang="en-GB" dirty="0" err="1"/>
-              <a:t>Symboler</a:t>
-            </a:r>
-            <a:r>
-              <a:rPr lang="en-GB" dirty="0"/>
-              <a:t> </a:t>
-            </a:r>
-            <a:r>
-              <a:rPr lang="en-GB" dirty="0" err="1"/>
-              <a:t>repræsentere</a:t>
-            </a:r>
-            <a:r>
-              <a:rPr lang="en-GB" dirty="0"/>
-              <a:t> </a:t>
-            </a:r>
-            <a:r>
-              <a:rPr lang="en-GB" dirty="0" err="1"/>
-              <a:t>ikke</a:t>
-            </a:r>
-            <a:r>
-              <a:rPr lang="en-GB" dirty="0"/>
-              <a:t> </a:t>
-            </a:r>
-            <a:r>
-              <a:rPr lang="en-GB" dirty="0" err="1"/>
-              <a:t>komponeter</a:t>
-            </a:r>
-            <a:endParaRPr lang="LID4096" dirty="0"/>
-          </a:p>
-        </p:txBody>
-      </p:sp>
-    </p:spTree>
-    <p:extLst>
-      <p:ext uri="{BB962C8B-B14F-4D97-AF65-F5344CB8AC3E}">
-        <p14:creationId xmlns:p14="http://schemas.microsoft.com/office/powerpoint/2010/main" val="3057534901"/>
-      </p:ext>
-    </p:extLst>
-  </p:cSld>
-  <p:clrMapOvr>
-    <a:masterClrMapping/>
-  </p:clrMapOvr>
-</p:sld>
-</file>
-
-<file path=ppt/slides/slide9.xml><?xml version="1.0" encoding="utf-8"?>
-<p:sld xmlns:a="http://schemas.openxmlformats.org/drawingml/2006/main" xmlns:r="http://schemas.openxmlformats.org/officeDocument/2006/relationships" xmlns:p="http://schemas.openxmlformats.org/presentationml/2006/main">
-  <p:cSld>
-    <p:spTree>
-      <p:nvGrpSpPr>
-        <p:cNvPr id="1" name=""/>
-        <p:cNvGrpSpPr/>
-        <p:nvPr/>
-      </p:nvGrpSpPr>
-      <p:grpSpPr>
-        <a:xfrm>
-          <a:off x="0" y="0"/>
-          <a:ext cx="0" cy="0"/>
-          <a:chOff x="0" y="0"/>
-          <a:chExt cx="0" cy="0"/>
-        </a:xfrm>
-      </p:grpSpPr>
-      <p:sp>
-        <p:nvSpPr>
-          <p:cNvPr id="2" name="Titel 1">
-            <a:extLst>
-              <a:ext uri="{FF2B5EF4-FFF2-40B4-BE49-F238E27FC236}">
-                <a16:creationId xmlns:a16="http://schemas.microsoft.com/office/drawing/2014/main" id="{F8E74CE5-47E7-4B9A-BD58-06E5310234D7}"/>
-              </a:ext>
-            </a:extLst>
-          </p:cNvPr>
-          <p:cNvSpPr>
-            <a:spLocks noGrp="1"/>
-          </p:cNvSpPr>
-          <p:nvPr>
-            <p:ph type="title"/>
-          </p:nvPr>
-        </p:nvSpPr>
-        <p:spPr/>
-        <p:txBody>
-          <a:bodyPr/>
-          <a:lstStyle/>
-          <a:p>
-            <a:r>
-              <a:rPr lang="en-GB" dirty="0" err="1"/>
-              <a:t>Forbindelser</a:t>
-            </a:r>
-            <a:endParaRPr lang="LID4096" dirty="0"/>
-          </a:p>
-        </p:txBody>
-      </p:sp>
-      <p:sp>
-        <p:nvSpPr>
-          <p:cNvPr id="3" name="Pladsholder til indhold 2">
-            <a:extLst>
-              <a:ext uri="{FF2B5EF4-FFF2-40B4-BE49-F238E27FC236}">
-                <a16:creationId xmlns:a16="http://schemas.microsoft.com/office/drawing/2014/main" id="{5449F343-0D18-4E4C-B2DE-5A0AC83AA8B5}"/>
-              </a:ext>
-            </a:extLst>
-          </p:cNvPr>
-          <p:cNvSpPr>
-            <a:spLocks noGrp="1"/>
-          </p:cNvSpPr>
-          <p:nvPr>
-            <p:ph idx="1"/>
-          </p:nvPr>
-        </p:nvSpPr>
-        <p:spPr/>
-        <p:txBody>
-          <a:bodyPr/>
-          <a:lstStyle/>
-          <a:p>
-            <a:pPr marL="0" indent="0">
-              <a:buNone/>
-            </a:pPr>
-            <a:r>
-              <a:rPr lang="en-GB" dirty="0" err="1"/>
-              <a:t>Inden</a:t>
-            </a:r>
-            <a:r>
-              <a:rPr lang="en-GB" dirty="0"/>
-              <a:t> for same side </a:t>
-            </a:r>
-            <a:r>
-              <a:rPr lang="en-GB" dirty="0" err="1"/>
-              <a:t>kan</a:t>
-            </a:r>
-            <a:r>
-              <a:rPr lang="en-GB" dirty="0"/>
-              <a:t> </a:t>
-            </a:r>
-            <a:r>
-              <a:rPr lang="en-GB" dirty="0" err="1"/>
-              <a:t>komponenter</a:t>
-            </a:r>
-            <a:r>
-              <a:rPr lang="en-GB" dirty="0"/>
-              <a:t> </a:t>
-            </a:r>
-            <a:r>
-              <a:rPr lang="en-GB" dirty="0" err="1"/>
-              <a:t>forbindes</a:t>
-            </a:r>
-            <a:r>
-              <a:rPr lang="en-GB" dirty="0"/>
-              <a:t> </a:t>
-            </a:r>
-            <a:r>
-              <a:rPr lang="en-GB" dirty="0" err="1"/>
-              <a:t>på</a:t>
-            </a:r>
-            <a:r>
-              <a:rPr lang="en-GB" dirty="0"/>
-              <a:t> to </a:t>
-            </a:r>
-            <a:r>
-              <a:rPr lang="en-GB" dirty="0" err="1"/>
-              <a:t>måder</a:t>
-            </a:r>
-            <a:endParaRPr lang="en-GB" dirty="0"/>
-          </a:p>
-          <a:p>
-            <a:pPr lvl="1"/>
-            <a:r>
-              <a:rPr lang="en-GB" dirty="0" err="1"/>
-              <a:t>Forbindelse</a:t>
-            </a:r>
-            <a:r>
-              <a:rPr lang="en-GB" dirty="0"/>
-              <a:t> med wire [W]</a:t>
-            </a:r>
-          </a:p>
-          <a:p>
-            <a:pPr lvl="1"/>
-            <a:r>
-              <a:rPr lang="en-GB" dirty="0" err="1"/>
-              <a:t>Forbindelse</a:t>
-            </a:r>
-            <a:r>
-              <a:rPr lang="en-GB" dirty="0"/>
-              <a:t> med same </a:t>
-            </a:r>
-            <a:r>
-              <a:rPr lang="en-GB" dirty="0" err="1"/>
-              <a:t>netnavn</a:t>
-            </a:r>
-            <a:endParaRPr lang="en-GB" dirty="0"/>
-          </a:p>
-          <a:p>
-            <a:pPr marL="457200" lvl="1" indent="0">
-              <a:buNone/>
-            </a:pPr>
-            <a:endParaRPr lang="en-GB" dirty="0"/>
-          </a:p>
-          <a:p>
-            <a:pPr marL="457200" lvl="1" indent="0">
-              <a:buNone/>
-            </a:pPr>
-            <a:r>
-              <a:rPr lang="en-GB" dirty="0"/>
-              <a:t>Power </a:t>
-            </a:r>
-            <a:r>
-              <a:rPr lang="en-GB" dirty="0" err="1"/>
-              <a:t>forbindelse</a:t>
-            </a:r>
-            <a:r>
-              <a:rPr lang="en-GB" dirty="0"/>
-              <a:t> </a:t>
-            </a:r>
-            <a:r>
-              <a:rPr lang="en-GB" dirty="0" err="1"/>
-              <a:t>skabes</a:t>
-            </a:r>
-            <a:r>
-              <a:rPr lang="en-GB" dirty="0"/>
-              <a:t> </a:t>
-            </a:r>
-            <a:r>
-              <a:rPr lang="en-GB" dirty="0" err="1"/>
-              <a:t>vha</a:t>
-            </a:r>
-            <a:r>
-              <a:rPr lang="en-GB" dirty="0"/>
-              <a:t> </a:t>
-            </a:r>
-            <a:r>
-              <a:rPr lang="en-GB" dirty="0" err="1"/>
-              <a:t>navnet</a:t>
-            </a:r>
-            <a:r>
-              <a:rPr lang="en-GB" dirty="0"/>
-              <a:t> og </a:t>
-            </a:r>
-            <a:r>
-              <a:rPr lang="en-GB" dirty="0" err="1"/>
-              <a:t>ikke</a:t>
-            </a:r>
-            <a:r>
-              <a:rPr lang="en-GB" dirty="0"/>
-              <a:t> det </a:t>
-            </a:r>
-            <a:r>
-              <a:rPr lang="en-GB" dirty="0" err="1"/>
-              <a:t>grafiske</a:t>
-            </a:r>
-            <a:r>
-              <a:rPr lang="en-GB" dirty="0"/>
-              <a:t> </a:t>
-            </a:r>
-            <a:r>
-              <a:rPr lang="en-GB" dirty="0" err="1"/>
-              <a:t>udseende</a:t>
-            </a:r>
-            <a:endParaRPr lang="en-GB" dirty="0"/>
-          </a:p>
-        </p:txBody>
-      </p:sp>
-      <p:pic>
-        <p:nvPicPr>
-          <p:cNvPr id="5" name="Billede 4">
-            <a:extLst>
-              <a:ext uri="{FF2B5EF4-FFF2-40B4-BE49-F238E27FC236}">
-                <a16:creationId xmlns:a16="http://schemas.microsoft.com/office/drawing/2014/main" id="{54660B3F-F5DD-48E6-B341-A1B307861580}"/>
-              </a:ext>
-            </a:extLst>
-          </p:cNvPr>
-          <p:cNvPicPr>
-            <a:picLocks noChangeAspect="1"/>
-          </p:cNvPicPr>
-          <p:nvPr/>
-        </p:nvPicPr>
-        <p:blipFill>
-          <a:blip r:embed="rId2"/>
-          <a:stretch>
-            <a:fillRect/>
-          </a:stretch>
-        </p:blipFill>
-        <p:spPr>
-          <a:xfrm>
-            <a:off x="8565229" y="2015732"/>
-            <a:ext cx="3512890" cy="1629981"/>
-          </a:xfrm>
-          <a:prstGeom prst="rect">
-            <a:avLst/>
-          </a:prstGeom>
-        </p:spPr>
-      </p:pic>
-    </p:spTree>
-    <p:extLst>
-      <p:ext uri="{BB962C8B-B14F-4D97-AF65-F5344CB8AC3E}">
-        <p14:creationId xmlns:p14="http://schemas.microsoft.com/office/powerpoint/2010/main" val="1191913756"/>
       </p:ext>
     </p:extLst>
   </p:cSld>

</xml_diff>